<commit_message>
added sub sys and math modelling
see problem statement ppt
</commit_message>
<xml_diff>
--- a/DOCS/PPT's/Problem statement.pptx
+++ b/DOCS/PPT's/Problem statement.pptx
@@ -4,6 +4,9 @@
   <p:sldMasterIdLst>
     <p:sldMasterId id="2147483731" r:id="rId1"/>
   </p:sldMasterIdLst>
+  <p:notesMasterIdLst>
+    <p:notesMasterId r:id="rId24"/>
+  </p:notesMasterIdLst>
   <p:sldIdLst>
     <p:sldId id="256" r:id="rId2"/>
     <p:sldId id="257" r:id="rId3"/>
@@ -16,7 +19,17 @@
     <p:sldId id="269" r:id="rId10"/>
     <p:sldId id="266" r:id="rId11"/>
     <p:sldId id="270" r:id="rId12"/>
-    <p:sldId id="268" r:id="rId13"/>
+    <p:sldId id="276" r:id="rId13"/>
+    <p:sldId id="271" r:id="rId14"/>
+    <p:sldId id="272" r:id="rId15"/>
+    <p:sldId id="273" r:id="rId16"/>
+    <p:sldId id="274" r:id="rId17"/>
+    <p:sldId id="275" r:id="rId18"/>
+    <p:sldId id="277" r:id="rId19"/>
+    <p:sldId id="278" r:id="rId20"/>
+    <p:sldId id="279" r:id="rId21"/>
+    <p:sldId id="280" r:id="rId22"/>
+    <p:sldId id="268" r:id="rId23"/>
   </p:sldIdLst>
   <p:sldSz cx="12192000" cy="6858000"/>
   <p:notesSz cx="6858000" cy="9144000"/>
@@ -123,6 +136,523 @@
 </p:presentation>
 </file>
 
+<file path=ppt/notesMasters/notesMaster1.xml><?xml version="1.0" encoding="utf-8"?>
+<p:notesMaster xmlns:a="http://schemas.openxmlformats.org/drawingml/2006/main" xmlns:r="http://schemas.openxmlformats.org/officeDocument/2006/relationships" xmlns:p="http://schemas.openxmlformats.org/presentationml/2006/main">
+  <p:cSld>
+    <p:bg>
+      <p:bgRef idx="1001">
+        <a:schemeClr val="bg1"/>
+      </p:bgRef>
+    </p:bg>
+    <p:spTree>
+      <p:nvGrpSpPr>
+        <p:cNvPr id="1" name=""/>
+        <p:cNvGrpSpPr/>
+        <p:nvPr/>
+      </p:nvGrpSpPr>
+      <p:grpSpPr>
+        <a:xfrm>
+          <a:off x="0" y="0"/>
+          <a:ext cx="0" cy="0"/>
+          <a:chOff x="0" y="0"/>
+          <a:chExt cx="0" cy="0"/>
+        </a:xfrm>
+      </p:grpSpPr>
+      <p:sp>
+        <p:nvSpPr>
+          <p:cNvPr id="2" name="Header Placeholder 1"/>
+          <p:cNvSpPr>
+            <a:spLocks noGrp="1"/>
+          </p:cNvSpPr>
+          <p:nvPr>
+            <p:ph type="hdr" sz="quarter"/>
+          </p:nvPr>
+        </p:nvSpPr>
+        <p:spPr>
+          <a:xfrm>
+            <a:off x="0" y="0"/>
+            <a:ext cx="2971800" cy="458788"/>
+          </a:xfrm>
+          <a:prstGeom prst="rect">
+            <a:avLst/>
+          </a:prstGeom>
+        </p:spPr>
+        <p:txBody>
+          <a:bodyPr vert="horz" lIns="91440" tIns="45720" rIns="91440" bIns="45720" rtlCol="0"/>
+          <a:lstStyle>
+            <a:lvl1pPr algn="l">
+              <a:defRPr sz="1200"/>
+            </a:lvl1pPr>
+          </a:lstStyle>
+          <a:p>
+            <a:endParaRPr lang="en-US"/>
+          </a:p>
+        </p:txBody>
+      </p:sp>
+      <p:sp>
+        <p:nvSpPr>
+          <p:cNvPr id="3" name="Date Placeholder 2"/>
+          <p:cNvSpPr>
+            <a:spLocks noGrp="1"/>
+          </p:cNvSpPr>
+          <p:nvPr>
+            <p:ph type="dt" idx="1"/>
+          </p:nvPr>
+        </p:nvSpPr>
+        <p:spPr>
+          <a:xfrm>
+            <a:off x="3884613" y="0"/>
+            <a:ext cx="2971800" cy="458788"/>
+          </a:xfrm>
+          <a:prstGeom prst="rect">
+            <a:avLst/>
+          </a:prstGeom>
+        </p:spPr>
+        <p:txBody>
+          <a:bodyPr vert="horz" lIns="91440" tIns="45720" rIns="91440" bIns="45720" rtlCol="0"/>
+          <a:lstStyle>
+            <a:lvl1pPr algn="r">
+              <a:defRPr sz="1200"/>
+            </a:lvl1pPr>
+          </a:lstStyle>
+          <a:p>
+            <a:fld id="{0BF09A51-2706-4120-AE06-4F74D3241115}" type="datetimeFigureOut">
+              <a:rPr lang="en-US" smtClean="0"/>
+              <a:t>10/25/2020</a:t>
+            </a:fld>
+            <a:endParaRPr lang="en-US"/>
+          </a:p>
+        </p:txBody>
+      </p:sp>
+      <p:sp>
+        <p:nvSpPr>
+          <p:cNvPr id="4" name="Slide Image Placeholder 3"/>
+          <p:cNvSpPr>
+            <a:spLocks noGrp="1" noRot="1" noChangeAspect="1"/>
+          </p:cNvSpPr>
+          <p:nvPr>
+            <p:ph type="sldImg" idx="2"/>
+          </p:nvPr>
+        </p:nvSpPr>
+        <p:spPr>
+          <a:xfrm>
+            <a:off x="685800" y="1143000"/>
+            <a:ext cx="5486400" cy="3086100"/>
+          </a:xfrm>
+          <a:prstGeom prst="rect">
+            <a:avLst/>
+          </a:prstGeom>
+          <a:noFill/>
+          <a:ln w="12700">
+            <a:solidFill>
+              <a:prstClr val="black"/>
+            </a:solidFill>
+          </a:ln>
+        </p:spPr>
+        <p:txBody>
+          <a:bodyPr vert="horz" lIns="91440" tIns="45720" rIns="91440" bIns="45720" rtlCol="0" anchor="ctr"/>
+          <a:lstStyle/>
+          <a:p>
+            <a:endParaRPr lang="en-US"/>
+          </a:p>
+        </p:txBody>
+      </p:sp>
+      <p:sp>
+        <p:nvSpPr>
+          <p:cNvPr id="5" name="Notes Placeholder 4"/>
+          <p:cNvSpPr>
+            <a:spLocks noGrp="1"/>
+          </p:cNvSpPr>
+          <p:nvPr>
+            <p:ph type="body" sz="quarter" idx="3"/>
+          </p:nvPr>
+        </p:nvSpPr>
+        <p:spPr>
+          <a:xfrm>
+            <a:off x="685800" y="4400550"/>
+            <a:ext cx="5486400" cy="3600450"/>
+          </a:xfrm>
+          <a:prstGeom prst="rect">
+            <a:avLst/>
+          </a:prstGeom>
+        </p:spPr>
+        <p:txBody>
+          <a:bodyPr vert="horz" lIns="91440" tIns="45720" rIns="91440" bIns="45720" rtlCol="0"/>
+          <a:lstStyle/>
+          <a:p>
+            <a:pPr lvl="0"/>
+            <a:r>
+              <a:rPr lang="en-US"/>
+              <a:t>Click to edit Master text styles</a:t>
+            </a:r>
+          </a:p>
+          <a:p>
+            <a:pPr lvl="1"/>
+            <a:r>
+              <a:rPr lang="en-US"/>
+              <a:t>Second level</a:t>
+            </a:r>
+          </a:p>
+          <a:p>
+            <a:pPr lvl="2"/>
+            <a:r>
+              <a:rPr lang="en-US"/>
+              <a:t>Third level</a:t>
+            </a:r>
+          </a:p>
+          <a:p>
+            <a:pPr lvl="3"/>
+            <a:r>
+              <a:rPr lang="en-US"/>
+              <a:t>Fourth level</a:t>
+            </a:r>
+          </a:p>
+          <a:p>
+            <a:pPr lvl="4"/>
+            <a:r>
+              <a:rPr lang="en-US"/>
+              <a:t>Fifth level</a:t>
+            </a:r>
+          </a:p>
+        </p:txBody>
+      </p:sp>
+      <p:sp>
+        <p:nvSpPr>
+          <p:cNvPr id="6" name="Footer Placeholder 5"/>
+          <p:cNvSpPr>
+            <a:spLocks noGrp="1"/>
+          </p:cNvSpPr>
+          <p:nvPr>
+            <p:ph type="ftr" sz="quarter" idx="4"/>
+          </p:nvPr>
+        </p:nvSpPr>
+        <p:spPr>
+          <a:xfrm>
+            <a:off x="0" y="8685213"/>
+            <a:ext cx="2971800" cy="458787"/>
+          </a:xfrm>
+          <a:prstGeom prst="rect">
+            <a:avLst/>
+          </a:prstGeom>
+        </p:spPr>
+        <p:txBody>
+          <a:bodyPr vert="horz" lIns="91440" tIns="45720" rIns="91440" bIns="45720" rtlCol="0" anchor="b"/>
+          <a:lstStyle>
+            <a:lvl1pPr algn="l">
+              <a:defRPr sz="1200"/>
+            </a:lvl1pPr>
+          </a:lstStyle>
+          <a:p>
+            <a:endParaRPr lang="en-US"/>
+          </a:p>
+        </p:txBody>
+      </p:sp>
+      <p:sp>
+        <p:nvSpPr>
+          <p:cNvPr id="7" name="Slide Number Placeholder 6"/>
+          <p:cNvSpPr>
+            <a:spLocks noGrp="1"/>
+          </p:cNvSpPr>
+          <p:nvPr>
+            <p:ph type="sldNum" sz="quarter" idx="5"/>
+          </p:nvPr>
+        </p:nvSpPr>
+        <p:spPr>
+          <a:xfrm>
+            <a:off x="3884613" y="8685213"/>
+            <a:ext cx="2971800" cy="458787"/>
+          </a:xfrm>
+          <a:prstGeom prst="rect">
+            <a:avLst/>
+          </a:prstGeom>
+        </p:spPr>
+        <p:txBody>
+          <a:bodyPr vert="horz" lIns="91440" tIns="45720" rIns="91440" bIns="45720" rtlCol="0" anchor="b"/>
+          <a:lstStyle>
+            <a:lvl1pPr algn="r">
+              <a:defRPr sz="1200"/>
+            </a:lvl1pPr>
+          </a:lstStyle>
+          <a:p>
+            <a:fld id="{7FF964DC-1A71-460C-AA01-7C47DBFAAE3D}" type="slidenum">
+              <a:rPr lang="en-US" smtClean="0"/>
+              <a:t>‹#›</a:t>
+            </a:fld>
+            <a:endParaRPr lang="en-US"/>
+          </a:p>
+        </p:txBody>
+      </p:sp>
+    </p:spTree>
+    <p:extLst>
+      <p:ext uri="{BB962C8B-B14F-4D97-AF65-F5344CB8AC3E}">
+        <p14:creationId xmlns:p14="http://schemas.microsoft.com/office/powerpoint/2010/main" val="2487873762"/>
+      </p:ext>
+    </p:extLst>
+  </p:cSld>
+  <p:clrMap bg1="lt1" tx1="dk1" bg2="lt2" tx2="dk2" accent1="accent1" accent2="accent2" accent3="accent3" accent4="accent4" accent5="accent5" accent6="accent6" hlink="hlink" folHlink="folHlink"/>
+  <p:notesStyle>
+    <a:lvl1pPr marL="0" algn="l" defTabSz="914400" rtl="0" eaLnBrk="1" latinLnBrk="0" hangingPunct="1">
+      <a:defRPr sz="1200" kern="1200">
+        <a:solidFill>
+          <a:schemeClr val="tx1"/>
+        </a:solidFill>
+        <a:latin typeface="+mn-lt"/>
+        <a:ea typeface="+mn-ea"/>
+        <a:cs typeface="+mn-cs"/>
+      </a:defRPr>
+    </a:lvl1pPr>
+    <a:lvl2pPr marL="457200" algn="l" defTabSz="914400" rtl="0" eaLnBrk="1" latinLnBrk="0" hangingPunct="1">
+      <a:defRPr sz="1200" kern="1200">
+        <a:solidFill>
+          <a:schemeClr val="tx1"/>
+        </a:solidFill>
+        <a:latin typeface="+mn-lt"/>
+        <a:ea typeface="+mn-ea"/>
+        <a:cs typeface="+mn-cs"/>
+      </a:defRPr>
+    </a:lvl2pPr>
+    <a:lvl3pPr marL="914400" algn="l" defTabSz="914400" rtl="0" eaLnBrk="1" latinLnBrk="0" hangingPunct="1">
+      <a:defRPr sz="1200" kern="1200">
+        <a:solidFill>
+          <a:schemeClr val="tx1"/>
+        </a:solidFill>
+        <a:latin typeface="+mn-lt"/>
+        <a:ea typeface="+mn-ea"/>
+        <a:cs typeface="+mn-cs"/>
+      </a:defRPr>
+    </a:lvl3pPr>
+    <a:lvl4pPr marL="1371600" algn="l" defTabSz="914400" rtl="0" eaLnBrk="1" latinLnBrk="0" hangingPunct="1">
+      <a:defRPr sz="1200" kern="1200">
+        <a:solidFill>
+          <a:schemeClr val="tx1"/>
+        </a:solidFill>
+        <a:latin typeface="+mn-lt"/>
+        <a:ea typeface="+mn-ea"/>
+        <a:cs typeface="+mn-cs"/>
+      </a:defRPr>
+    </a:lvl4pPr>
+    <a:lvl5pPr marL="1828800" algn="l" defTabSz="914400" rtl="0" eaLnBrk="1" latinLnBrk="0" hangingPunct="1">
+      <a:defRPr sz="1200" kern="1200">
+        <a:solidFill>
+          <a:schemeClr val="tx1"/>
+        </a:solidFill>
+        <a:latin typeface="+mn-lt"/>
+        <a:ea typeface="+mn-ea"/>
+        <a:cs typeface="+mn-cs"/>
+      </a:defRPr>
+    </a:lvl5pPr>
+    <a:lvl6pPr marL="2286000" algn="l" defTabSz="914400" rtl="0" eaLnBrk="1" latinLnBrk="0" hangingPunct="1">
+      <a:defRPr sz="1200" kern="1200">
+        <a:solidFill>
+          <a:schemeClr val="tx1"/>
+        </a:solidFill>
+        <a:latin typeface="+mn-lt"/>
+        <a:ea typeface="+mn-ea"/>
+        <a:cs typeface="+mn-cs"/>
+      </a:defRPr>
+    </a:lvl6pPr>
+    <a:lvl7pPr marL="2743200" algn="l" defTabSz="914400" rtl="0" eaLnBrk="1" latinLnBrk="0" hangingPunct="1">
+      <a:defRPr sz="1200" kern="1200">
+        <a:solidFill>
+          <a:schemeClr val="tx1"/>
+        </a:solidFill>
+        <a:latin typeface="+mn-lt"/>
+        <a:ea typeface="+mn-ea"/>
+        <a:cs typeface="+mn-cs"/>
+      </a:defRPr>
+    </a:lvl7pPr>
+    <a:lvl8pPr marL="3200400" algn="l" defTabSz="914400" rtl="0" eaLnBrk="1" latinLnBrk="0" hangingPunct="1">
+      <a:defRPr sz="1200" kern="1200">
+        <a:solidFill>
+          <a:schemeClr val="tx1"/>
+        </a:solidFill>
+        <a:latin typeface="+mn-lt"/>
+        <a:ea typeface="+mn-ea"/>
+        <a:cs typeface="+mn-cs"/>
+      </a:defRPr>
+    </a:lvl8pPr>
+    <a:lvl9pPr marL="3657600" algn="l" defTabSz="914400" rtl="0" eaLnBrk="1" latinLnBrk="0" hangingPunct="1">
+      <a:defRPr sz="1200" kern="1200">
+        <a:solidFill>
+          <a:schemeClr val="tx1"/>
+        </a:solidFill>
+        <a:latin typeface="+mn-lt"/>
+        <a:ea typeface="+mn-ea"/>
+        <a:cs typeface="+mn-cs"/>
+      </a:defRPr>
+    </a:lvl9pPr>
+  </p:notesStyle>
+</p:notesMaster>
+</file>
+
+<file path=ppt/notesSlides/notesSlide1.xml><?xml version="1.0" encoding="utf-8"?>
+<p:notes xmlns:a="http://schemas.openxmlformats.org/drawingml/2006/main" xmlns:r="http://schemas.openxmlformats.org/officeDocument/2006/relationships" xmlns:p="http://schemas.openxmlformats.org/presentationml/2006/main">
+  <p:cSld>
+    <p:spTree>
+      <p:nvGrpSpPr>
+        <p:cNvPr id="1" name=""/>
+        <p:cNvGrpSpPr/>
+        <p:nvPr/>
+      </p:nvGrpSpPr>
+      <p:grpSpPr>
+        <a:xfrm>
+          <a:off x="0" y="0"/>
+          <a:ext cx="0" cy="0"/>
+          <a:chOff x="0" y="0"/>
+          <a:chExt cx="0" cy="0"/>
+        </a:xfrm>
+      </p:grpSpPr>
+      <p:sp>
+        <p:nvSpPr>
+          <p:cNvPr id="2" name="Slide Image Placeholder 1"/>
+          <p:cNvSpPr>
+            <a:spLocks noGrp="1" noRot="1" noChangeAspect="1"/>
+          </p:cNvSpPr>
+          <p:nvPr>
+            <p:ph type="sldImg"/>
+          </p:nvPr>
+        </p:nvSpPr>
+        <p:spPr/>
+      </p:sp>
+      <p:sp>
+        <p:nvSpPr>
+          <p:cNvPr id="3" name="Notes Placeholder 2"/>
+          <p:cNvSpPr>
+            <a:spLocks noGrp="1"/>
+          </p:cNvSpPr>
+          <p:nvPr>
+            <p:ph type="body" idx="1"/>
+          </p:nvPr>
+        </p:nvSpPr>
+        <p:spPr/>
+        <p:txBody>
+          <a:bodyPr/>
+          <a:lstStyle/>
+          <a:p>
+            <a:endParaRPr lang="en-US" dirty="0"/>
+          </a:p>
+        </p:txBody>
+      </p:sp>
+      <p:sp>
+        <p:nvSpPr>
+          <p:cNvPr id="4" name="Slide Number Placeholder 3"/>
+          <p:cNvSpPr>
+            <a:spLocks noGrp="1"/>
+          </p:cNvSpPr>
+          <p:nvPr>
+            <p:ph type="sldNum" sz="quarter" idx="5"/>
+          </p:nvPr>
+        </p:nvSpPr>
+        <p:spPr/>
+        <p:txBody>
+          <a:bodyPr/>
+          <a:lstStyle/>
+          <a:p>
+            <a:fld id="{7FF964DC-1A71-460C-AA01-7C47DBFAAE3D}" type="slidenum">
+              <a:rPr lang="en-US" smtClean="0"/>
+              <a:t>10</a:t>
+            </a:fld>
+            <a:endParaRPr lang="en-US"/>
+          </a:p>
+        </p:txBody>
+      </p:sp>
+    </p:spTree>
+    <p:extLst>
+      <p:ext uri="{BB962C8B-B14F-4D97-AF65-F5344CB8AC3E}">
+        <p14:creationId xmlns:p14="http://schemas.microsoft.com/office/powerpoint/2010/main" val="3239604124"/>
+      </p:ext>
+    </p:extLst>
+  </p:cSld>
+  <p:clrMapOvr>
+    <a:masterClrMapping/>
+  </p:clrMapOvr>
+</p:notes>
+</file>
+
+<file path=ppt/notesSlides/notesSlide2.xml><?xml version="1.0" encoding="utf-8"?>
+<p:notes xmlns:a="http://schemas.openxmlformats.org/drawingml/2006/main" xmlns:r="http://schemas.openxmlformats.org/officeDocument/2006/relationships" xmlns:p="http://schemas.openxmlformats.org/presentationml/2006/main">
+  <p:cSld>
+    <p:spTree>
+      <p:nvGrpSpPr>
+        <p:cNvPr id="1" name=""/>
+        <p:cNvGrpSpPr/>
+        <p:nvPr/>
+      </p:nvGrpSpPr>
+      <p:grpSpPr>
+        <a:xfrm>
+          <a:off x="0" y="0"/>
+          <a:ext cx="0" cy="0"/>
+          <a:chOff x="0" y="0"/>
+          <a:chExt cx="0" cy="0"/>
+        </a:xfrm>
+      </p:grpSpPr>
+      <p:sp>
+        <p:nvSpPr>
+          <p:cNvPr id="2" name="Slide Image Placeholder 1"/>
+          <p:cNvSpPr>
+            <a:spLocks noGrp="1" noRot="1" noChangeAspect="1"/>
+          </p:cNvSpPr>
+          <p:nvPr>
+            <p:ph type="sldImg"/>
+          </p:nvPr>
+        </p:nvSpPr>
+        <p:spPr/>
+      </p:sp>
+      <p:sp>
+        <p:nvSpPr>
+          <p:cNvPr id="3" name="Notes Placeholder 2"/>
+          <p:cNvSpPr>
+            <a:spLocks noGrp="1"/>
+          </p:cNvSpPr>
+          <p:nvPr>
+            <p:ph type="body" idx="1"/>
+          </p:nvPr>
+        </p:nvSpPr>
+        <p:spPr/>
+        <p:txBody>
+          <a:bodyPr/>
+          <a:lstStyle/>
+          <a:p>
+            <a:endParaRPr lang="en-US" dirty="0"/>
+          </a:p>
+        </p:txBody>
+      </p:sp>
+      <p:sp>
+        <p:nvSpPr>
+          <p:cNvPr id="4" name="Slide Number Placeholder 3"/>
+          <p:cNvSpPr>
+            <a:spLocks noGrp="1"/>
+          </p:cNvSpPr>
+          <p:nvPr>
+            <p:ph type="sldNum" sz="quarter" idx="5"/>
+          </p:nvPr>
+        </p:nvSpPr>
+        <p:spPr/>
+        <p:txBody>
+          <a:bodyPr/>
+          <a:lstStyle/>
+          <a:p>
+            <a:fld id="{7FF964DC-1A71-460C-AA01-7C47DBFAAE3D}" type="slidenum">
+              <a:rPr lang="en-US" smtClean="0"/>
+              <a:t>14</a:t>
+            </a:fld>
+            <a:endParaRPr lang="en-US"/>
+          </a:p>
+        </p:txBody>
+      </p:sp>
+    </p:spTree>
+    <p:extLst>
+      <p:ext uri="{BB962C8B-B14F-4D97-AF65-F5344CB8AC3E}">
+        <p14:creationId xmlns:p14="http://schemas.microsoft.com/office/powerpoint/2010/main" val="147082123"/>
+      </p:ext>
+    </p:extLst>
+  </p:cSld>
+  <p:clrMapOvr>
+    <a:masterClrMapping/>
+  </p:clrMapOvr>
+</p:notes>
+</file>
+
 <file path=ppt/slideLayouts/slideLayout1.xml><?xml version="1.0" encoding="utf-8"?>
 <p:sldLayout xmlns:a="http://schemas.openxmlformats.org/drawingml/2006/main" xmlns:r="http://schemas.openxmlformats.org/officeDocument/2006/relationships" xmlns:p="http://schemas.openxmlformats.org/presentationml/2006/main" type="title" preserve="1">
   <p:cSld name="Title Slide">
@@ -270,7 +800,7 @@
           <a:p>
             <a:fld id="{256199A9-7968-4290-8E97-22DF45FF6498}" type="datetimeFigureOut">
               <a:rPr lang="en-US" smtClean="0"/>
-              <a:t>9/9/2020</a:t>
+              <a:t>10/25/2020</a:t>
             </a:fld>
             <a:endParaRPr lang="en-US"/>
           </a:p>
@@ -468,7 +998,7 @@
           <a:p>
             <a:fld id="{256199A9-7968-4290-8E97-22DF45FF6498}" type="datetimeFigureOut">
               <a:rPr lang="en-US" smtClean="0"/>
-              <a:t>9/9/2020</a:t>
+              <a:t>10/25/2020</a:t>
             </a:fld>
             <a:endParaRPr lang="en-US"/>
           </a:p>
@@ -676,7 +1206,7 @@
           <a:p>
             <a:fld id="{256199A9-7968-4290-8E97-22DF45FF6498}" type="datetimeFigureOut">
               <a:rPr lang="en-US" smtClean="0"/>
-              <a:t>9/9/2020</a:t>
+              <a:t>10/25/2020</a:t>
             </a:fld>
             <a:endParaRPr lang="en-US"/>
           </a:p>
@@ -874,7 +1404,7 @@
           <a:p>
             <a:fld id="{256199A9-7968-4290-8E97-22DF45FF6498}" type="datetimeFigureOut">
               <a:rPr lang="en-US" smtClean="0"/>
-              <a:t>9/9/2020</a:t>
+              <a:t>10/25/2020</a:t>
             </a:fld>
             <a:endParaRPr lang="en-US"/>
           </a:p>
@@ -1149,7 +1679,7 @@
           <a:p>
             <a:fld id="{256199A9-7968-4290-8E97-22DF45FF6498}" type="datetimeFigureOut">
               <a:rPr lang="en-US" smtClean="0"/>
-              <a:t>9/9/2020</a:t>
+              <a:t>10/25/2020</a:t>
             </a:fld>
             <a:endParaRPr lang="en-US"/>
           </a:p>
@@ -1414,7 +1944,7 @@
           <a:p>
             <a:fld id="{256199A9-7968-4290-8E97-22DF45FF6498}" type="datetimeFigureOut">
               <a:rPr lang="en-US" smtClean="0"/>
-              <a:t>9/9/2020</a:t>
+              <a:t>10/25/2020</a:t>
             </a:fld>
             <a:endParaRPr lang="en-US"/>
           </a:p>
@@ -1826,7 +2356,7 @@
           <a:p>
             <a:fld id="{256199A9-7968-4290-8E97-22DF45FF6498}" type="datetimeFigureOut">
               <a:rPr lang="en-US" smtClean="0"/>
-              <a:t>9/9/2020</a:t>
+              <a:t>10/25/2020</a:t>
             </a:fld>
             <a:endParaRPr lang="en-US"/>
           </a:p>
@@ -1967,7 +2497,7 @@
           <a:p>
             <a:fld id="{256199A9-7968-4290-8E97-22DF45FF6498}" type="datetimeFigureOut">
               <a:rPr lang="en-US" smtClean="0"/>
-              <a:t>9/9/2020</a:t>
+              <a:t>10/25/2020</a:t>
             </a:fld>
             <a:endParaRPr lang="en-US"/>
           </a:p>
@@ -2080,7 +2610,7 @@
           <a:p>
             <a:fld id="{256199A9-7968-4290-8E97-22DF45FF6498}" type="datetimeFigureOut">
               <a:rPr lang="en-US" smtClean="0"/>
-              <a:t>9/9/2020</a:t>
+              <a:t>10/25/2020</a:t>
             </a:fld>
             <a:endParaRPr lang="en-US"/>
           </a:p>
@@ -2391,7 +2921,7 @@
           <a:p>
             <a:fld id="{256199A9-7968-4290-8E97-22DF45FF6498}" type="datetimeFigureOut">
               <a:rPr lang="en-US" smtClean="0"/>
-              <a:t>9/9/2020</a:t>
+              <a:t>10/25/2020</a:t>
             </a:fld>
             <a:endParaRPr lang="en-US"/>
           </a:p>
@@ -2679,7 +3209,7 @@
           <a:p>
             <a:fld id="{256199A9-7968-4290-8E97-22DF45FF6498}" type="datetimeFigureOut">
               <a:rPr lang="en-US" smtClean="0"/>
-              <a:t>9/9/2020</a:t>
+              <a:t>10/25/2020</a:t>
             </a:fld>
             <a:endParaRPr lang="en-US"/>
           </a:p>
@@ -2920,7 +3450,7 @@
           <a:p>
             <a:fld id="{256199A9-7968-4290-8E97-22DF45FF6498}" type="datetimeFigureOut">
               <a:rPr lang="en-US" smtClean="0"/>
-              <a:t>9/9/2020</a:t>
+              <a:t>10/25/2020</a:t>
             </a:fld>
             <a:endParaRPr lang="en-US"/>
           </a:p>
@@ -3651,7 +4181,7 @@
           <p:cNvPr id="2" name="Title 1">
             <a:extLst>
               <a:ext uri="{FF2B5EF4-FFF2-40B4-BE49-F238E27FC236}">
-                <a16:creationId xmlns:a16="http://schemas.microsoft.com/office/drawing/2014/main" id="{884BA7A0-6FBF-4334-AE18-16F7C8EAE5C5}"/>
+                <a16:creationId xmlns:a16="http://schemas.microsoft.com/office/drawing/2014/main" id="{7BC803E6-8F1F-45A2-A4AD-C711B834E5DF}"/>
               </a:ext>
             </a:extLst>
           </p:cNvPr>
@@ -3664,8 +4194,8 @@
         </p:nvSpPr>
         <p:spPr>
           <a:xfrm>
-            <a:off x="838200" y="576141"/>
-            <a:ext cx="10515600" cy="6091946"/>
+            <a:off x="838199" y="365125"/>
+            <a:ext cx="10976429" cy="5963104"/>
           </a:xfrm>
         </p:spPr>
         <p:txBody>
@@ -3674,12 +4204,9 @@
           </a:bodyPr>
           <a:lstStyle/>
           <a:p>
-            <a:br>
-              <a:rPr lang="en-US" sz="15000" dirty="0"/>
-            </a:br>
-            <a:r>
-              <a:rPr lang="en-US" sz="15000" dirty="0"/>
-              <a:t>Thank You</a:t>
+            <a:r>
+              <a:rPr lang="en-US" sz="10000" dirty="0"/>
+              <a:t>Sub Systems</a:t>
             </a:r>
           </a:p>
         </p:txBody>
@@ -3687,7 +4214,690 @@
     </p:spTree>
     <p:extLst>
       <p:ext uri="{BB962C8B-B14F-4D97-AF65-F5344CB8AC3E}">
-        <p14:creationId xmlns:p14="http://schemas.microsoft.com/office/powerpoint/2010/main" val="1880208882"/>
+        <p14:creationId xmlns:p14="http://schemas.microsoft.com/office/powerpoint/2010/main" val="4012447857"/>
+      </p:ext>
+    </p:extLst>
+  </p:cSld>
+  <p:clrMapOvr>
+    <a:masterClrMapping/>
+  </p:clrMapOvr>
+</p:sld>
+</file>
+
+<file path=ppt/slides/slide13.xml><?xml version="1.0" encoding="utf-8"?>
+<p:sld xmlns:a="http://schemas.openxmlformats.org/drawingml/2006/main" xmlns:r="http://schemas.openxmlformats.org/officeDocument/2006/relationships" xmlns:p="http://schemas.openxmlformats.org/presentationml/2006/main">
+  <p:cSld>
+    <p:spTree>
+      <p:nvGrpSpPr>
+        <p:cNvPr id="1" name=""/>
+        <p:cNvGrpSpPr/>
+        <p:nvPr/>
+      </p:nvGrpSpPr>
+      <p:grpSpPr>
+        <a:xfrm>
+          <a:off x="0" y="0"/>
+          <a:ext cx="0" cy="0"/>
+          <a:chOff x="0" y="0"/>
+          <a:chExt cx="0" cy="0"/>
+        </a:xfrm>
+      </p:grpSpPr>
+      <p:sp>
+        <p:nvSpPr>
+          <p:cNvPr id="2" name="Title 1">
+            <a:extLst>
+              <a:ext uri="{FF2B5EF4-FFF2-40B4-BE49-F238E27FC236}">
+                <a16:creationId xmlns:a16="http://schemas.microsoft.com/office/drawing/2014/main" id="{F81FDEFA-578C-4B86-B9C9-F1EC538DFD67}"/>
+              </a:ext>
+            </a:extLst>
+          </p:cNvPr>
+          <p:cNvSpPr>
+            <a:spLocks noGrp="1"/>
+          </p:cNvSpPr>
+          <p:nvPr>
+            <p:ph type="title"/>
+          </p:nvPr>
+        </p:nvSpPr>
+        <p:spPr/>
+        <p:txBody>
+          <a:bodyPr/>
+          <a:lstStyle/>
+          <a:p>
+            <a:r>
+              <a:rPr lang="en-US" dirty="0"/>
+              <a:t>Major Sub systems</a:t>
+            </a:r>
+          </a:p>
+        </p:txBody>
+      </p:sp>
+      <p:sp>
+        <p:nvSpPr>
+          <p:cNvPr id="3" name="Content Placeholder 2">
+            <a:extLst>
+              <a:ext uri="{FF2B5EF4-FFF2-40B4-BE49-F238E27FC236}">
+                <a16:creationId xmlns:a16="http://schemas.microsoft.com/office/drawing/2014/main" id="{1BBDA15E-F810-44B3-9EB2-8B08A5533C9D}"/>
+              </a:ext>
+            </a:extLst>
+          </p:cNvPr>
+          <p:cNvSpPr>
+            <a:spLocks noGrp="1"/>
+          </p:cNvSpPr>
+          <p:nvPr>
+            <p:ph idx="1"/>
+          </p:nvPr>
+        </p:nvSpPr>
+        <p:spPr/>
+        <p:txBody>
+          <a:bodyPr/>
+          <a:lstStyle/>
+          <a:p>
+            <a:r>
+              <a:rPr lang="en-US" dirty="0"/>
+              <a:t>System Attached in the class to take photos (Image processing)</a:t>
+            </a:r>
+          </a:p>
+          <a:p>
+            <a:r>
+              <a:rPr lang="en-US" dirty="0"/>
+              <a:t>System that marks the attendance against the face in the photos(ML/DL)</a:t>
+            </a:r>
+          </a:p>
+          <a:p>
+            <a:pPr marL="0" indent="0">
+              <a:buNone/>
+            </a:pPr>
+            <a:endParaRPr lang="en-US" dirty="0"/>
+          </a:p>
+          <a:p>
+            <a:endParaRPr lang="en-US" dirty="0"/>
+          </a:p>
+        </p:txBody>
+      </p:sp>
+    </p:spTree>
+    <p:extLst>
+      <p:ext uri="{BB962C8B-B14F-4D97-AF65-F5344CB8AC3E}">
+        <p14:creationId xmlns:p14="http://schemas.microsoft.com/office/powerpoint/2010/main" val="334548514"/>
+      </p:ext>
+    </p:extLst>
+  </p:cSld>
+  <p:clrMapOvr>
+    <a:masterClrMapping/>
+  </p:clrMapOvr>
+</p:sld>
+</file>
+
+<file path=ppt/slides/slide14.xml><?xml version="1.0" encoding="utf-8"?>
+<p:sld xmlns:a="http://schemas.openxmlformats.org/drawingml/2006/main" xmlns:r="http://schemas.openxmlformats.org/officeDocument/2006/relationships" xmlns:p="http://schemas.openxmlformats.org/presentationml/2006/main">
+  <p:cSld>
+    <p:spTree>
+      <p:nvGrpSpPr>
+        <p:cNvPr id="1" name=""/>
+        <p:cNvGrpSpPr/>
+        <p:nvPr/>
+      </p:nvGrpSpPr>
+      <p:grpSpPr>
+        <a:xfrm>
+          <a:off x="0" y="0"/>
+          <a:ext cx="0" cy="0"/>
+          <a:chOff x="0" y="0"/>
+          <a:chExt cx="0" cy="0"/>
+        </a:xfrm>
+      </p:grpSpPr>
+      <p:sp>
+        <p:nvSpPr>
+          <p:cNvPr id="2" name="Title 1">
+            <a:extLst>
+              <a:ext uri="{FF2B5EF4-FFF2-40B4-BE49-F238E27FC236}">
+                <a16:creationId xmlns:a16="http://schemas.microsoft.com/office/drawing/2014/main" id="{5E78E20A-D4A0-41FC-9B74-32803F6C3930}"/>
+              </a:ext>
+            </a:extLst>
+          </p:cNvPr>
+          <p:cNvSpPr>
+            <a:spLocks noGrp="1"/>
+          </p:cNvSpPr>
+          <p:nvPr>
+            <p:ph type="title"/>
+          </p:nvPr>
+        </p:nvSpPr>
+        <p:spPr/>
+        <p:txBody>
+          <a:bodyPr/>
+          <a:lstStyle/>
+          <a:p>
+            <a:r>
+              <a:rPr lang="en-US" dirty="0"/>
+              <a:t>System that takes photo</a:t>
+            </a:r>
+          </a:p>
+        </p:txBody>
+      </p:sp>
+      <p:sp>
+        <p:nvSpPr>
+          <p:cNvPr id="3" name="Content Placeholder 2">
+            <a:extLst>
+              <a:ext uri="{FF2B5EF4-FFF2-40B4-BE49-F238E27FC236}">
+                <a16:creationId xmlns:a16="http://schemas.microsoft.com/office/drawing/2014/main" id="{A60DE3F7-4C94-4A61-8C4D-046A767E095F}"/>
+              </a:ext>
+            </a:extLst>
+          </p:cNvPr>
+          <p:cNvSpPr>
+            <a:spLocks noGrp="1"/>
+          </p:cNvSpPr>
+          <p:nvPr>
+            <p:ph idx="1"/>
+          </p:nvPr>
+        </p:nvSpPr>
+        <p:spPr/>
+        <p:txBody>
+          <a:bodyPr/>
+          <a:lstStyle/>
+          <a:p>
+            <a:r>
+              <a:rPr lang="en-US" dirty="0"/>
+              <a:t>Camera </a:t>
+            </a:r>
+          </a:p>
+          <a:p>
+            <a:r>
+              <a:rPr lang="en-US" dirty="0"/>
+              <a:t>System that signals the camera</a:t>
+            </a:r>
+          </a:p>
+          <a:p>
+            <a:r>
+              <a:rPr lang="en-US" dirty="0"/>
+              <a:t>System that transports the photo to next system for processing the photos</a:t>
+            </a:r>
+          </a:p>
+          <a:p>
+            <a:endParaRPr lang="en-US" dirty="0"/>
+          </a:p>
+        </p:txBody>
+      </p:sp>
+    </p:spTree>
+    <p:extLst>
+      <p:ext uri="{BB962C8B-B14F-4D97-AF65-F5344CB8AC3E}">
+        <p14:creationId xmlns:p14="http://schemas.microsoft.com/office/powerpoint/2010/main" val="4165119701"/>
+      </p:ext>
+    </p:extLst>
+  </p:cSld>
+  <p:clrMapOvr>
+    <a:masterClrMapping/>
+  </p:clrMapOvr>
+</p:sld>
+</file>
+
+<file path=ppt/slides/slide15.xml><?xml version="1.0" encoding="utf-8"?>
+<p:sld xmlns:a="http://schemas.openxmlformats.org/drawingml/2006/main" xmlns:r="http://schemas.openxmlformats.org/officeDocument/2006/relationships" xmlns:p="http://schemas.openxmlformats.org/presentationml/2006/main">
+  <p:cSld>
+    <p:spTree>
+      <p:nvGrpSpPr>
+        <p:cNvPr id="1" name=""/>
+        <p:cNvGrpSpPr/>
+        <p:nvPr/>
+      </p:nvGrpSpPr>
+      <p:grpSpPr>
+        <a:xfrm>
+          <a:off x="0" y="0"/>
+          <a:ext cx="0" cy="0"/>
+          <a:chOff x="0" y="0"/>
+          <a:chExt cx="0" cy="0"/>
+        </a:xfrm>
+      </p:grpSpPr>
+      <p:sp>
+        <p:nvSpPr>
+          <p:cNvPr id="2" name="Title 1">
+            <a:extLst>
+              <a:ext uri="{FF2B5EF4-FFF2-40B4-BE49-F238E27FC236}">
+                <a16:creationId xmlns:a16="http://schemas.microsoft.com/office/drawing/2014/main" id="{CFA96AD7-1BDA-4E4F-88E3-E0D114F9F1F4}"/>
+              </a:ext>
+            </a:extLst>
+          </p:cNvPr>
+          <p:cNvSpPr>
+            <a:spLocks noGrp="1"/>
+          </p:cNvSpPr>
+          <p:nvPr>
+            <p:ph type="title"/>
+          </p:nvPr>
+        </p:nvSpPr>
+        <p:spPr/>
+        <p:txBody>
+          <a:bodyPr/>
+          <a:lstStyle/>
+          <a:p>
+            <a:r>
+              <a:rPr lang="en-US" dirty="0"/>
+              <a:t>System that marks the attendance</a:t>
+            </a:r>
+          </a:p>
+        </p:txBody>
+      </p:sp>
+      <p:sp>
+        <p:nvSpPr>
+          <p:cNvPr id="3" name="Content Placeholder 2">
+            <a:extLst>
+              <a:ext uri="{FF2B5EF4-FFF2-40B4-BE49-F238E27FC236}">
+                <a16:creationId xmlns:a16="http://schemas.microsoft.com/office/drawing/2014/main" id="{3F28A773-CC00-4A0E-B1A2-14E6DE494930}"/>
+              </a:ext>
+            </a:extLst>
+          </p:cNvPr>
+          <p:cNvSpPr>
+            <a:spLocks noGrp="1"/>
+          </p:cNvSpPr>
+          <p:nvPr>
+            <p:ph idx="1"/>
+          </p:nvPr>
+        </p:nvSpPr>
+        <p:spPr/>
+        <p:txBody>
+          <a:bodyPr/>
+          <a:lstStyle/>
+          <a:p>
+            <a:r>
+              <a:rPr lang="en-US" dirty="0"/>
+              <a:t>System that receives the photo</a:t>
+            </a:r>
+          </a:p>
+          <a:p>
+            <a:r>
+              <a:rPr lang="en-US" dirty="0"/>
+              <a:t>System that runs the face detection algorithm that outputs “m” detected faces </a:t>
+            </a:r>
+          </a:p>
+          <a:p>
+            <a:r>
+              <a:rPr lang="en-US" dirty="0"/>
+              <a:t>System that outputs a descriptor for “m” faces</a:t>
+            </a:r>
+          </a:p>
+          <a:p>
+            <a:r>
+              <a:rPr lang="en-US" dirty="0"/>
+              <a:t>System that iterates through “m” descriptor and marks the attendance</a:t>
+            </a:r>
+          </a:p>
+          <a:p>
+            <a:endParaRPr lang="en-US" dirty="0"/>
+          </a:p>
+        </p:txBody>
+      </p:sp>
+    </p:spTree>
+    <p:extLst>
+      <p:ext uri="{BB962C8B-B14F-4D97-AF65-F5344CB8AC3E}">
+        <p14:creationId xmlns:p14="http://schemas.microsoft.com/office/powerpoint/2010/main" val="2905998232"/>
+      </p:ext>
+    </p:extLst>
+  </p:cSld>
+  <p:clrMapOvr>
+    <a:masterClrMapping/>
+  </p:clrMapOvr>
+</p:sld>
+</file>
+
+<file path=ppt/slides/slide16.xml><?xml version="1.0" encoding="utf-8"?>
+<p:sld xmlns:a="http://schemas.openxmlformats.org/drawingml/2006/main" xmlns:r="http://schemas.openxmlformats.org/officeDocument/2006/relationships" xmlns:p="http://schemas.openxmlformats.org/presentationml/2006/main">
+  <p:cSld>
+    <p:spTree>
+      <p:nvGrpSpPr>
+        <p:cNvPr id="1" name=""/>
+        <p:cNvGrpSpPr/>
+        <p:nvPr/>
+      </p:nvGrpSpPr>
+      <p:grpSpPr>
+        <a:xfrm>
+          <a:off x="0" y="0"/>
+          <a:ext cx="0" cy="0"/>
+          <a:chOff x="0" y="0"/>
+          <a:chExt cx="0" cy="0"/>
+        </a:xfrm>
+      </p:grpSpPr>
+      <p:sp>
+        <p:nvSpPr>
+          <p:cNvPr id="2" name="Title 1">
+            <a:extLst>
+              <a:ext uri="{FF2B5EF4-FFF2-40B4-BE49-F238E27FC236}">
+                <a16:creationId xmlns:a16="http://schemas.microsoft.com/office/drawing/2014/main" id="{63FA2295-5DE4-42AA-8D27-A722B6FAEB70}"/>
+              </a:ext>
+            </a:extLst>
+          </p:cNvPr>
+          <p:cNvSpPr>
+            <a:spLocks noGrp="1"/>
+          </p:cNvSpPr>
+          <p:nvPr>
+            <p:ph type="title"/>
+          </p:nvPr>
+        </p:nvSpPr>
+        <p:spPr/>
+        <p:txBody>
+          <a:bodyPr>
+            <a:normAutofit/>
+          </a:bodyPr>
+          <a:lstStyle/>
+          <a:p>
+            <a:r>
+              <a:rPr lang="en-US" dirty="0"/>
+              <a:t>System that outputs a descriptor for “m” faces</a:t>
+            </a:r>
+          </a:p>
+        </p:txBody>
+      </p:sp>
+      <p:sp>
+        <p:nvSpPr>
+          <p:cNvPr id="3" name="Content Placeholder 2">
+            <a:extLst>
+              <a:ext uri="{FF2B5EF4-FFF2-40B4-BE49-F238E27FC236}">
+                <a16:creationId xmlns:a16="http://schemas.microsoft.com/office/drawing/2014/main" id="{A30DA9CB-2A27-4B68-990B-767029736F7E}"/>
+              </a:ext>
+            </a:extLst>
+          </p:cNvPr>
+          <p:cNvSpPr>
+            <a:spLocks noGrp="1"/>
+          </p:cNvSpPr>
+          <p:nvPr>
+            <p:ph idx="1"/>
+          </p:nvPr>
+        </p:nvSpPr>
+        <p:spPr/>
+        <p:txBody>
+          <a:bodyPr/>
+          <a:lstStyle/>
+          <a:p>
+            <a:r>
+              <a:rPr lang="en-US" dirty="0"/>
+              <a:t>System that iterates through the “m” detected faces and calls the following sub systems</a:t>
+            </a:r>
+          </a:p>
+          <a:p>
+            <a:r>
+              <a:rPr lang="en-US" dirty="0"/>
+              <a:t>System that outputs a descriptor(fixed size) for one face (Facial recognition) </a:t>
+            </a:r>
+          </a:p>
+          <a:p>
+            <a:r>
+              <a:rPr lang="en-US" dirty="0"/>
+              <a:t>System that stores these “m” descriptors </a:t>
+            </a:r>
+          </a:p>
+          <a:p>
+            <a:endParaRPr lang="en-US" dirty="0"/>
+          </a:p>
+        </p:txBody>
+      </p:sp>
+    </p:spTree>
+    <p:extLst>
+      <p:ext uri="{BB962C8B-B14F-4D97-AF65-F5344CB8AC3E}">
+        <p14:creationId xmlns:p14="http://schemas.microsoft.com/office/powerpoint/2010/main" val="3192779843"/>
+      </p:ext>
+    </p:extLst>
+  </p:cSld>
+  <p:clrMapOvr>
+    <a:masterClrMapping/>
+  </p:clrMapOvr>
+</p:sld>
+</file>
+
+<file path=ppt/slides/slide17.xml><?xml version="1.0" encoding="utf-8"?>
+<p:sld xmlns:a="http://schemas.openxmlformats.org/drawingml/2006/main" xmlns:r="http://schemas.openxmlformats.org/officeDocument/2006/relationships" xmlns:p="http://schemas.openxmlformats.org/presentationml/2006/main">
+  <p:cSld>
+    <p:spTree>
+      <p:nvGrpSpPr>
+        <p:cNvPr id="1" name=""/>
+        <p:cNvGrpSpPr/>
+        <p:nvPr/>
+      </p:nvGrpSpPr>
+      <p:grpSpPr>
+        <a:xfrm>
+          <a:off x="0" y="0"/>
+          <a:ext cx="0" cy="0"/>
+          <a:chOff x="0" y="0"/>
+          <a:chExt cx="0" cy="0"/>
+        </a:xfrm>
+      </p:grpSpPr>
+      <p:sp>
+        <p:nvSpPr>
+          <p:cNvPr id="2" name="Title 1">
+            <a:extLst>
+              <a:ext uri="{FF2B5EF4-FFF2-40B4-BE49-F238E27FC236}">
+                <a16:creationId xmlns:a16="http://schemas.microsoft.com/office/drawing/2014/main" id="{BC31AE2E-5951-4394-AD2F-0CCE4C714AC3}"/>
+              </a:ext>
+            </a:extLst>
+          </p:cNvPr>
+          <p:cNvSpPr>
+            <a:spLocks noGrp="1"/>
+          </p:cNvSpPr>
+          <p:nvPr>
+            <p:ph type="title"/>
+          </p:nvPr>
+        </p:nvSpPr>
+        <p:spPr/>
+        <p:txBody>
+          <a:bodyPr>
+            <a:normAutofit fontScale="90000"/>
+          </a:bodyPr>
+          <a:lstStyle/>
+          <a:p>
+            <a:br>
+              <a:rPr lang="en-US" dirty="0"/>
+            </a:br>
+            <a:r>
+              <a:rPr lang="en-US" dirty="0"/>
+              <a:t>System that iterates through “m” descriptor and marks the attendance</a:t>
+            </a:r>
+            <a:br>
+              <a:rPr lang="en-US" dirty="0"/>
+            </a:br>
+            <a:endParaRPr lang="en-US" dirty="0"/>
+          </a:p>
+        </p:txBody>
+      </p:sp>
+      <p:sp>
+        <p:nvSpPr>
+          <p:cNvPr id="3" name="Content Placeholder 2">
+            <a:extLst>
+              <a:ext uri="{FF2B5EF4-FFF2-40B4-BE49-F238E27FC236}">
+                <a16:creationId xmlns:a16="http://schemas.microsoft.com/office/drawing/2014/main" id="{B7A0EC86-95BA-4EF9-950D-054B3B7F161F}"/>
+              </a:ext>
+            </a:extLst>
+          </p:cNvPr>
+          <p:cNvSpPr>
+            <a:spLocks noGrp="1"/>
+          </p:cNvSpPr>
+          <p:nvPr>
+            <p:ph idx="1"/>
+          </p:nvPr>
+        </p:nvSpPr>
+        <p:spPr/>
+        <p:txBody>
+          <a:bodyPr/>
+          <a:lstStyle/>
+          <a:p>
+            <a:r>
+              <a:rPr lang="en-US" dirty="0"/>
+              <a:t>System that iterates through the database containing “n” descriptors </a:t>
+            </a:r>
+          </a:p>
+          <a:p>
+            <a:r>
+              <a:rPr lang="en-US" dirty="0"/>
+              <a:t>System that checks whether 2 descriptors are same</a:t>
+            </a:r>
+          </a:p>
+          <a:p>
+            <a:r>
+              <a:rPr lang="en-US" dirty="0"/>
+              <a:t>System that gives the register number of a given descriptor </a:t>
+            </a:r>
+          </a:p>
+          <a:p>
+            <a:r>
+              <a:rPr lang="en-US" dirty="0"/>
+              <a:t>System that marks the attendance against the register number </a:t>
+            </a:r>
+          </a:p>
+        </p:txBody>
+      </p:sp>
+    </p:spTree>
+    <p:extLst>
+      <p:ext uri="{BB962C8B-B14F-4D97-AF65-F5344CB8AC3E}">
+        <p14:creationId xmlns:p14="http://schemas.microsoft.com/office/powerpoint/2010/main" val="352402098"/>
+      </p:ext>
+    </p:extLst>
+  </p:cSld>
+  <p:clrMapOvr>
+    <a:masterClrMapping/>
+  </p:clrMapOvr>
+</p:sld>
+</file>
+
+<file path=ppt/slides/slide18.xml><?xml version="1.0" encoding="utf-8"?>
+<p:sld xmlns:a="http://schemas.openxmlformats.org/drawingml/2006/main" xmlns:r="http://schemas.openxmlformats.org/officeDocument/2006/relationships" xmlns:p="http://schemas.openxmlformats.org/presentationml/2006/main">
+  <p:cSld>
+    <p:spTree>
+      <p:nvGrpSpPr>
+        <p:cNvPr id="1" name=""/>
+        <p:cNvGrpSpPr/>
+        <p:nvPr/>
+      </p:nvGrpSpPr>
+      <p:grpSpPr>
+        <a:xfrm>
+          <a:off x="0" y="0"/>
+          <a:ext cx="0" cy="0"/>
+          <a:chOff x="0" y="0"/>
+          <a:chExt cx="0" cy="0"/>
+        </a:xfrm>
+      </p:grpSpPr>
+      <p:sp>
+        <p:nvSpPr>
+          <p:cNvPr id="2" name="Title 1">
+            <a:extLst>
+              <a:ext uri="{FF2B5EF4-FFF2-40B4-BE49-F238E27FC236}">
+                <a16:creationId xmlns:a16="http://schemas.microsoft.com/office/drawing/2014/main" id="{CD432508-6B86-4A7D-A45F-50F075877E79}"/>
+              </a:ext>
+            </a:extLst>
+          </p:cNvPr>
+          <p:cNvSpPr>
+            <a:spLocks noGrp="1"/>
+          </p:cNvSpPr>
+          <p:nvPr>
+            <p:ph type="title"/>
+          </p:nvPr>
+        </p:nvSpPr>
+        <p:spPr>
+          <a:xfrm>
+            <a:off x="838200" y="365125"/>
+            <a:ext cx="11063514" cy="6035675"/>
+          </a:xfrm>
+        </p:spPr>
+        <p:txBody>
+          <a:bodyPr>
+            <a:normAutofit/>
+          </a:bodyPr>
+          <a:lstStyle/>
+          <a:p>
+            <a:r>
+              <a:rPr lang="en-US" sz="10000" dirty="0"/>
+              <a:t>Mathematical Modelling</a:t>
+            </a:r>
+          </a:p>
+        </p:txBody>
+      </p:sp>
+    </p:spTree>
+    <p:extLst>
+      <p:ext uri="{BB962C8B-B14F-4D97-AF65-F5344CB8AC3E}">
+        <p14:creationId xmlns:p14="http://schemas.microsoft.com/office/powerpoint/2010/main" val="885709930"/>
+      </p:ext>
+    </p:extLst>
+  </p:cSld>
+  <p:clrMapOvr>
+    <a:masterClrMapping/>
+  </p:clrMapOvr>
+</p:sld>
+</file>
+
+<file path=ppt/slides/slide19.xml><?xml version="1.0" encoding="utf-8"?>
+<p:sld xmlns:a="http://schemas.openxmlformats.org/drawingml/2006/main" xmlns:r="http://schemas.openxmlformats.org/officeDocument/2006/relationships" xmlns:p="http://schemas.openxmlformats.org/presentationml/2006/main">
+  <p:cSld>
+    <p:spTree>
+      <p:nvGrpSpPr>
+        <p:cNvPr id="1" name=""/>
+        <p:cNvGrpSpPr/>
+        <p:nvPr/>
+      </p:nvGrpSpPr>
+      <p:grpSpPr>
+        <a:xfrm>
+          <a:off x="0" y="0"/>
+          <a:ext cx="0" cy="0"/>
+          <a:chOff x="0" y="0"/>
+          <a:chExt cx="0" cy="0"/>
+        </a:xfrm>
+      </p:grpSpPr>
+      <p:sp>
+        <p:nvSpPr>
+          <p:cNvPr id="2" name="Title 1">
+            <a:extLst>
+              <a:ext uri="{FF2B5EF4-FFF2-40B4-BE49-F238E27FC236}">
+                <a16:creationId xmlns:a16="http://schemas.microsoft.com/office/drawing/2014/main" id="{FDB2E409-38FB-4688-8B6B-076497284139}"/>
+              </a:ext>
+            </a:extLst>
+          </p:cNvPr>
+          <p:cNvSpPr>
+            <a:spLocks noGrp="1"/>
+          </p:cNvSpPr>
+          <p:nvPr>
+            <p:ph type="title"/>
+          </p:nvPr>
+        </p:nvSpPr>
+        <p:spPr/>
+        <p:txBody>
+          <a:bodyPr/>
+          <a:lstStyle/>
+          <a:p>
+            <a:r>
+              <a:rPr lang="en-US" dirty="0"/>
+              <a:t>System that signals the camera</a:t>
+            </a:r>
+          </a:p>
+        </p:txBody>
+      </p:sp>
+      <p:pic>
+        <p:nvPicPr>
+          <p:cNvPr id="5" name="Content Placeholder 4">
+            <a:extLst>
+              <a:ext uri="{FF2B5EF4-FFF2-40B4-BE49-F238E27FC236}">
+                <a16:creationId xmlns:a16="http://schemas.microsoft.com/office/drawing/2014/main" id="{05FCD3E6-9C4C-4F0B-B332-464A5EB23A76}"/>
+              </a:ext>
+            </a:extLst>
+          </p:cNvPr>
+          <p:cNvPicPr>
+            <a:picLocks noGrp="1" noChangeAspect="1"/>
+          </p:cNvPicPr>
+          <p:nvPr>
+            <p:ph idx="1"/>
+          </p:nvPr>
+        </p:nvPicPr>
+        <p:blipFill>
+          <a:blip r:embed="rId2">
+            <a:extLst>
+              <a:ext uri="{28A0092B-C50C-407E-A947-70E740481C1C}">
+                <a14:useLocalDpi xmlns:a14="http://schemas.microsoft.com/office/drawing/2010/main" val="0"/>
+              </a:ext>
+            </a:extLst>
+          </a:blip>
+          <a:stretch>
+            <a:fillRect/>
+          </a:stretch>
+        </p:blipFill>
+        <p:spPr>
+          <a:xfrm>
+            <a:off x="1821151" y="1825625"/>
+            <a:ext cx="8549698" cy="4351338"/>
+          </a:xfrm>
+        </p:spPr>
+      </p:pic>
+    </p:spTree>
+    <p:extLst>
+      <p:ext uri="{BB962C8B-B14F-4D97-AF65-F5344CB8AC3E}">
+        <p14:creationId xmlns:p14="http://schemas.microsoft.com/office/powerpoint/2010/main" val="1902410595"/>
       </p:ext>
     </p:extLst>
   </p:cSld>
@@ -3798,6 +5008,278 @@
     <p:extLst>
       <p:ext uri="{BB962C8B-B14F-4D97-AF65-F5344CB8AC3E}">
         <p14:creationId xmlns:p14="http://schemas.microsoft.com/office/powerpoint/2010/main" val="2508131159"/>
+      </p:ext>
+    </p:extLst>
+  </p:cSld>
+  <p:clrMapOvr>
+    <a:masterClrMapping/>
+  </p:clrMapOvr>
+</p:sld>
+</file>
+
+<file path=ppt/slides/slide20.xml><?xml version="1.0" encoding="utf-8"?>
+<p:sld xmlns:a="http://schemas.openxmlformats.org/drawingml/2006/main" xmlns:r="http://schemas.openxmlformats.org/officeDocument/2006/relationships" xmlns:p="http://schemas.openxmlformats.org/presentationml/2006/main">
+  <p:cSld>
+    <p:spTree>
+      <p:nvGrpSpPr>
+        <p:cNvPr id="1" name=""/>
+        <p:cNvGrpSpPr/>
+        <p:nvPr/>
+      </p:nvGrpSpPr>
+      <p:grpSpPr>
+        <a:xfrm>
+          <a:off x="0" y="0"/>
+          <a:ext cx="0" cy="0"/>
+          <a:chOff x="0" y="0"/>
+          <a:chExt cx="0" cy="0"/>
+        </a:xfrm>
+      </p:grpSpPr>
+      <p:sp>
+        <p:nvSpPr>
+          <p:cNvPr id="2" name="Title 1">
+            <a:extLst>
+              <a:ext uri="{FF2B5EF4-FFF2-40B4-BE49-F238E27FC236}">
+                <a16:creationId xmlns:a16="http://schemas.microsoft.com/office/drawing/2014/main" id="{4B5F80A6-03CF-43A4-9141-D1046C0C0F66}"/>
+              </a:ext>
+            </a:extLst>
+          </p:cNvPr>
+          <p:cNvSpPr>
+            <a:spLocks noGrp="1"/>
+          </p:cNvSpPr>
+          <p:nvPr>
+            <p:ph type="title"/>
+          </p:nvPr>
+        </p:nvSpPr>
+        <p:spPr/>
+        <p:txBody>
+          <a:bodyPr>
+            <a:normAutofit fontScale="90000"/>
+          </a:bodyPr>
+          <a:lstStyle/>
+          <a:p>
+            <a:br>
+              <a:rPr lang="en-US" dirty="0"/>
+            </a:br>
+            <a:r>
+              <a:rPr lang="en-US" dirty="0"/>
+              <a:t>System that outputs a descriptor(fixed size) for one face (Facial recognition) </a:t>
+            </a:r>
+            <a:br>
+              <a:rPr lang="en-US" dirty="0"/>
+            </a:br>
+            <a:endParaRPr lang="en-US" dirty="0"/>
+          </a:p>
+        </p:txBody>
+      </p:sp>
+      <p:pic>
+        <p:nvPicPr>
+          <p:cNvPr id="5" name="Content Placeholder 4">
+            <a:extLst>
+              <a:ext uri="{FF2B5EF4-FFF2-40B4-BE49-F238E27FC236}">
+                <a16:creationId xmlns:a16="http://schemas.microsoft.com/office/drawing/2014/main" id="{CC7B8565-B0EF-4A50-9E95-F54C10332229}"/>
+              </a:ext>
+            </a:extLst>
+          </p:cNvPr>
+          <p:cNvPicPr>
+            <a:picLocks noGrp="1" noChangeAspect="1"/>
+          </p:cNvPicPr>
+          <p:nvPr>
+            <p:ph idx="1"/>
+          </p:nvPr>
+        </p:nvPicPr>
+        <p:blipFill>
+          <a:blip r:embed="rId2">
+            <a:extLst>
+              <a:ext uri="{28A0092B-C50C-407E-A947-70E740481C1C}">
+                <a14:useLocalDpi xmlns:a14="http://schemas.microsoft.com/office/drawing/2010/main" val="0"/>
+              </a:ext>
+            </a:extLst>
+          </a:blip>
+          <a:stretch>
+            <a:fillRect/>
+          </a:stretch>
+        </p:blipFill>
+        <p:spPr>
+          <a:xfrm>
+            <a:off x="1108966" y="2372291"/>
+            <a:ext cx="9974067" cy="3258005"/>
+          </a:xfrm>
+        </p:spPr>
+      </p:pic>
+    </p:spTree>
+    <p:extLst>
+      <p:ext uri="{BB962C8B-B14F-4D97-AF65-F5344CB8AC3E}">
+        <p14:creationId xmlns:p14="http://schemas.microsoft.com/office/powerpoint/2010/main" val="3198791146"/>
+      </p:ext>
+    </p:extLst>
+  </p:cSld>
+  <p:clrMapOvr>
+    <a:masterClrMapping/>
+  </p:clrMapOvr>
+</p:sld>
+</file>
+
+<file path=ppt/slides/slide21.xml><?xml version="1.0" encoding="utf-8"?>
+<p:sld xmlns:a="http://schemas.openxmlformats.org/drawingml/2006/main" xmlns:r="http://schemas.openxmlformats.org/officeDocument/2006/relationships" xmlns:p="http://schemas.openxmlformats.org/presentationml/2006/main">
+  <p:cSld>
+    <p:spTree>
+      <p:nvGrpSpPr>
+        <p:cNvPr id="1" name=""/>
+        <p:cNvGrpSpPr/>
+        <p:nvPr/>
+      </p:nvGrpSpPr>
+      <p:grpSpPr>
+        <a:xfrm>
+          <a:off x="0" y="0"/>
+          <a:ext cx="0" cy="0"/>
+          <a:chOff x="0" y="0"/>
+          <a:chExt cx="0" cy="0"/>
+        </a:xfrm>
+      </p:grpSpPr>
+      <p:sp>
+        <p:nvSpPr>
+          <p:cNvPr id="2" name="Title 1">
+            <a:extLst>
+              <a:ext uri="{FF2B5EF4-FFF2-40B4-BE49-F238E27FC236}">
+                <a16:creationId xmlns:a16="http://schemas.microsoft.com/office/drawing/2014/main" id="{50BD2304-0136-4715-9EF5-C9237713BFCA}"/>
+              </a:ext>
+            </a:extLst>
+          </p:cNvPr>
+          <p:cNvSpPr>
+            <a:spLocks noGrp="1"/>
+          </p:cNvSpPr>
+          <p:nvPr>
+            <p:ph type="title"/>
+          </p:nvPr>
+        </p:nvSpPr>
+        <p:spPr/>
+        <p:txBody>
+          <a:bodyPr>
+            <a:normAutofit fontScale="90000"/>
+          </a:bodyPr>
+          <a:lstStyle/>
+          <a:p>
+            <a:br>
+              <a:rPr lang="en-US" dirty="0"/>
+            </a:br>
+            <a:r>
+              <a:rPr lang="en-US" dirty="0"/>
+              <a:t>System that checks whether 2 descriptors are same</a:t>
+            </a:r>
+            <a:br>
+              <a:rPr lang="en-US" dirty="0"/>
+            </a:br>
+            <a:endParaRPr lang="en-US" dirty="0"/>
+          </a:p>
+        </p:txBody>
+      </p:sp>
+      <p:pic>
+        <p:nvPicPr>
+          <p:cNvPr id="5" name="Content Placeholder 4">
+            <a:extLst>
+              <a:ext uri="{FF2B5EF4-FFF2-40B4-BE49-F238E27FC236}">
+                <a16:creationId xmlns:a16="http://schemas.microsoft.com/office/drawing/2014/main" id="{D84398D9-5D82-408B-AA25-10D8ADF2DE27}"/>
+              </a:ext>
+            </a:extLst>
+          </p:cNvPr>
+          <p:cNvPicPr>
+            <a:picLocks noGrp="1" noChangeAspect="1"/>
+          </p:cNvPicPr>
+          <p:nvPr>
+            <p:ph idx="1"/>
+          </p:nvPr>
+        </p:nvPicPr>
+        <p:blipFill>
+          <a:blip r:embed="rId2">
+            <a:extLst>
+              <a:ext uri="{28A0092B-C50C-407E-A947-70E740481C1C}">
+                <a14:useLocalDpi xmlns:a14="http://schemas.microsoft.com/office/drawing/2010/main" val="0"/>
+              </a:ext>
+            </a:extLst>
+          </a:blip>
+          <a:stretch>
+            <a:fillRect/>
+          </a:stretch>
+        </p:blipFill>
+        <p:spPr>
+          <a:xfrm>
+            <a:off x="2059759" y="1825625"/>
+            <a:ext cx="8658552" cy="4667250"/>
+          </a:xfrm>
+        </p:spPr>
+      </p:pic>
+    </p:spTree>
+    <p:extLst>
+      <p:ext uri="{BB962C8B-B14F-4D97-AF65-F5344CB8AC3E}">
+        <p14:creationId xmlns:p14="http://schemas.microsoft.com/office/powerpoint/2010/main" val="1783297979"/>
+      </p:ext>
+    </p:extLst>
+  </p:cSld>
+  <p:clrMapOvr>
+    <a:masterClrMapping/>
+  </p:clrMapOvr>
+</p:sld>
+</file>
+
+<file path=ppt/slides/slide22.xml><?xml version="1.0" encoding="utf-8"?>
+<p:sld xmlns:a="http://schemas.openxmlformats.org/drawingml/2006/main" xmlns:r="http://schemas.openxmlformats.org/officeDocument/2006/relationships" xmlns:p="http://schemas.openxmlformats.org/presentationml/2006/main">
+  <p:cSld>
+    <p:spTree>
+      <p:nvGrpSpPr>
+        <p:cNvPr id="1" name=""/>
+        <p:cNvGrpSpPr/>
+        <p:nvPr/>
+      </p:nvGrpSpPr>
+      <p:grpSpPr>
+        <a:xfrm>
+          <a:off x="0" y="0"/>
+          <a:ext cx="0" cy="0"/>
+          <a:chOff x="0" y="0"/>
+          <a:chExt cx="0" cy="0"/>
+        </a:xfrm>
+      </p:grpSpPr>
+      <p:sp>
+        <p:nvSpPr>
+          <p:cNvPr id="2" name="Title 1">
+            <a:extLst>
+              <a:ext uri="{FF2B5EF4-FFF2-40B4-BE49-F238E27FC236}">
+                <a16:creationId xmlns:a16="http://schemas.microsoft.com/office/drawing/2014/main" id="{884BA7A0-6FBF-4334-AE18-16F7C8EAE5C5}"/>
+              </a:ext>
+            </a:extLst>
+          </p:cNvPr>
+          <p:cNvSpPr>
+            <a:spLocks noGrp="1"/>
+          </p:cNvSpPr>
+          <p:nvPr>
+            <p:ph type="title"/>
+          </p:nvPr>
+        </p:nvSpPr>
+        <p:spPr>
+          <a:xfrm>
+            <a:off x="838200" y="576141"/>
+            <a:ext cx="10515600" cy="6091946"/>
+          </a:xfrm>
+        </p:spPr>
+        <p:txBody>
+          <a:bodyPr>
+            <a:noAutofit/>
+          </a:bodyPr>
+          <a:lstStyle/>
+          <a:p>
+            <a:br>
+              <a:rPr lang="en-US" sz="15000" dirty="0"/>
+            </a:br>
+            <a:r>
+              <a:rPr lang="en-US" sz="15000" dirty="0"/>
+              <a:t>Thank You</a:t>
+            </a:r>
+          </a:p>
+        </p:txBody>
+      </p:sp>
+    </p:spTree>
+    <p:extLst>
+      <p:ext uri="{BB962C8B-B14F-4D97-AF65-F5344CB8AC3E}">
+        <p14:creationId xmlns:p14="http://schemas.microsoft.com/office/powerpoint/2010/main" val="1880208882"/>
       </p:ext>
     </p:extLst>
   </p:cSld>
@@ -4790,4 +6272,299 @@
     </a:ext>
   </a:extLst>
 </a:theme>
+</file>
+
+<file path=ppt/theme/theme2.xml><?xml version="1.0" encoding="utf-8"?>
+<a:theme xmlns:a="http://schemas.openxmlformats.org/drawingml/2006/main" name="Office Theme">
+  <a:themeElements>
+    <a:clrScheme name="Office">
+      <a:dk1>
+        <a:sysClr val="windowText" lastClr="000000"/>
+      </a:dk1>
+      <a:lt1>
+        <a:sysClr val="window" lastClr="FFFFFF"/>
+      </a:lt1>
+      <a:dk2>
+        <a:srgbClr val="44546A"/>
+      </a:dk2>
+      <a:lt2>
+        <a:srgbClr val="E7E6E6"/>
+      </a:lt2>
+      <a:accent1>
+        <a:srgbClr val="4472C4"/>
+      </a:accent1>
+      <a:accent2>
+        <a:srgbClr val="ED7D31"/>
+      </a:accent2>
+      <a:accent3>
+        <a:srgbClr val="A5A5A5"/>
+      </a:accent3>
+      <a:accent4>
+        <a:srgbClr val="FFC000"/>
+      </a:accent4>
+      <a:accent5>
+        <a:srgbClr val="5B9BD5"/>
+      </a:accent5>
+      <a:accent6>
+        <a:srgbClr val="70AD47"/>
+      </a:accent6>
+      <a:hlink>
+        <a:srgbClr val="0563C1"/>
+      </a:hlink>
+      <a:folHlink>
+        <a:srgbClr val="954F72"/>
+      </a:folHlink>
+    </a:clrScheme>
+    <a:fontScheme name="Office">
+      <a:majorFont>
+        <a:latin typeface="Calibri Light" panose="020F0302020204030204"/>
+        <a:ea typeface=""/>
+        <a:cs typeface=""/>
+        <a:font script="Jpan" typeface="游ゴシック Light"/>
+        <a:font script="Hang" typeface="맑은 고딕"/>
+        <a:font script="Hans" typeface="等线 Light"/>
+        <a:font script="Hant" typeface="新細明體"/>
+        <a:font script="Arab" typeface="Times New Roman"/>
+        <a:font script="Hebr" typeface="Times New Roman"/>
+        <a:font script="Thai" typeface="Angsana New"/>
+        <a:font script="Ethi" typeface="Nyala"/>
+        <a:font script="Beng" typeface="Vrinda"/>
+        <a:font script="Gujr" typeface="Shruti"/>
+        <a:font script="Khmr" typeface="MoolBoran"/>
+        <a:font script="Knda" typeface="Tunga"/>
+        <a:font script="Guru" typeface="Raavi"/>
+        <a:font script="Cans" typeface="Euphemia"/>
+        <a:font script="Cher" typeface="Plantagenet Cherokee"/>
+        <a:font script="Yiii" typeface="Microsoft Yi Baiti"/>
+        <a:font script="Tibt" typeface="Microsoft Himalaya"/>
+        <a:font script="Thaa" typeface="MV Boli"/>
+        <a:font script="Deva" typeface="Mangal"/>
+        <a:font script="Telu" typeface="Gautami"/>
+        <a:font script="Taml" typeface="Latha"/>
+        <a:font script="Syrc" typeface="Estrangelo Edessa"/>
+        <a:font script="Orya" typeface="Kalinga"/>
+        <a:font script="Mlym" typeface="Kartika"/>
+        <a:font script="Laoo" typeface="DokChampa"/>
+        <a:font script="Sinh" typeface="Iskoola Pota"/>
+        <a:font script="Mong" typeface="Mongolian Baiti"/>
+        <a:font script="Viet" typeface="Times New Roman"/>
+        <a:font script="Uigh" typeface="Microsoft Uighur"/>
+        <a:font script="Geor" typeface="Sylfaen"/>
+        <a:font script="Armn" typeface="Arial"/>
+        <a:font script="Bugi" typeface="Leelawadee UI"/>
+        <a:font script="Bopo" typeface="Microsoft JhengHei"/>
+        <a:font script="Java" typeface="Javanese Text"/>
+        <a:font script="Lisu" typeface="Segoe UI"/>
+        <a:font script="Mymr" typeface="Myanmar Text"/>
+        <a:font script="Nkoo" typeface="Ebrima"/>
+        <a:font script="Olck" typeface="Nirmala UI"/>
+        <a:font script="Osma" typeface="Ebrima"/>
+        <a:font script="Phag" typeface="Phagspa"/>
+        <a:font script="Syrn" typeface="Estrangelo Edessa"/>
+        <a:font script="Syrj" typeface="Estrangelo Edessa"/>
+        <a:font script="Syre" typeface="Estrangelo Edessa"/>
+        <a:font script="Sora" typeface="Nirmala UI"/>
+        <a:font script="Tale" typeface="Microsoft Tai Le"/>
+        <a:font script="Talu" typeface="Microsoft New Tai Lue"/>
+        <a:font script="Tfng" typeface="Ebrima"/>
+      </a:majorFont>
+      <a:minorFont>
+        <a:latin typeface="Calibri" panose="020F0502020204030204"/>
+        <a:ea typeface=""/>
+        <a:cs typeface=""/>
+        <a:font script="Jpan" typeface="游ゴシック"/>
+        <a:font script="Hang" typeface="맑은 고딕"/>
+        <a:font script="Hans" typeface="等线"/>
+        <a:font script="Hant" typeface="新細明體"/>
+        <a:font script="Arab" typeface="Arial"/>
+        <a:font script="Hebr" typeface="Arial"/>
+        <a:font script="Thai" typeface="Cordia New"/>
+        <a:font script="Ethi" typeface="Nyala"/>
+        <a:font script="Beng" typeface="Vrinda"/>
+        <a:font script="Gujr" typeface="Shruti"/>
+        <a:font script="Khmr" typeface="DaunPenh"/>
+        <a:font script="Knda" typeface="Tunga"/>
+        <a:font script="Guru" typeface="Raavi"/>
+        <a:font script="Cans" typeface="Euphemia"/>
+        <a:font script="Cher" typeface="Plantagenet Cherokee"/>
+        <a:font script="Yiii" typeface="Microsoft Yi Baiti"/>
+        <a:font script="Tibt" typeface="Microsoft Himalaya"/>
+        <a:font script="Thaa" typeface="MV Boli"/>
+        <a:font script="Deva" typeface="Mangal"/>
+        <a:font script="Telu" typeface="Gautami"/>
+        <a:font script="Taml" typeface="Latha"/>
+        <a:font script="Syrc" typeface="Estrangelo Edessa"/>
+        <a:font script="Orya" typeface="Kalinga"/>
+        <a:font script="Mlym" typeface="Kartika"/>
+        <a:font script="Laoo" typeface="DokChampa"/>
+        <a:font script="Sinh" typeface="Iskoola Pota"/>
+        <a:font script="Mong" typeface="Mongolian Baiti"/>
+        <a:font script="Viet" typeface="Arial"/>
+        <a:font script="Uigh" typeface="Microsoft Uighur"/>
+        <a:font script="Geor" typeface="Sylfaen"/>
+        <a:font script="Armn" typeface="Arial"/>
+        <a:font script="Bugi" typeface="Leelawadee UI"/>
+        <a:font script="Bopo" typeface="Microsoft JhengHei"/>
+        <a:font script="Java" typeface="Javanese Text"/>
+        <a:font script="Lisu" typeface="Segoe UI"/>
+        <a:font script="Mymr" typeface="Myanmar Text"/>
+        <a:font script="Nkoo" typeface="Ebrima"/>
+        <a:font script="Olck" typeface="Nirmala UI"/>
+        <a:font script="Osma" typeface="Ebrima"/>
+        <a:font script="Phag" typeface="Phagspa"/>
+        <a:font script="Syrn" typeface="Estrangelo Edessa"/>
+        <a:font script="Syrj" typeface="Estrangelo Edessa"/>
+        <a:font script="Syre" typeface="Estrangelo Edessa"/>
+        <a:font script="Sora" typeface="Nirmala UI"/>
+        <a:font script="Tale" typeface="Microsoft Tai Le"/>
+        <a:font script="Talu" typeface="Microsoft New Tai Lue"/>
+        <a:font script="Tfng" typeface="Ebrima"/>
+      </a:minorFont>
+    </a:fontScheme>
+    <a:fmtScheme name="Office">
+      <a:fillStyleLst>
+        <a:solidFill>
+          <a:schemeClr val="phClr"/>
+        </a:solidFill>
+        <a:gradFill rotWithShape="1">
+          <a:gsLst>
+            <a:gs pos="0">
+              <a:schemeClr val="phClr">
+                <a:lumMod val="110000"/>
+                <a:satMod val="105000"/>
+                <a:tint val="67000"/>
+              </a:schemeClr>
+            </a:gs>
+            <a:gs pos="50000">
+              <a:schemeClr val="phClr">
+                <a:lumMod val="105000"/>
+                <a:satMod val="103000"/>
+                <a:tint val="73000"/>
+              </a:schemeClr>
+            </a:gs>
+            <a:gs pos="100000">
+              <a:schemeClr val="phClr">
+                <a:lumMod val="105000"/>
+                <a:satMod val="109000"/>
+                <a:tint val="81000"/>
+              </a:schemeClr>
+            </a:gs>
+          </a:gsLst>
+          <a:lin ang="5400000" scaled="0"/>
+        </a:gradFill>
+        <a:gradFill rotWithShape="1">
+          <a:gsLst>
+            <a:gs pos="0">
+              <a:schemeClr val="phClr">
+                <a:satMod val="103000"/>
+                <a:lumMod val="102000"/>
+                <a:tint val="94000"/>
+              </a:schemeClr>
+            </a:gs>
+            <a:gs pos="50000">
+              <a:schemeClr val="phClr">
+                <a:satMod val="110000"/>
+                <a:lumMod val="100000"/>
+                <a:shade val="100000"/>
+              </a:schemeClr>
+            </a:gs>
+            <a:gs pos="100000">
+              <a:schemeClr val="phClr">
+                <a:lumMod val="99000"/>
+                <a:satMod val="120000"/>
+                <a:shade val="78000"/>
+              </a:schemeClr>
+            </a:gs>
+          </a:gsLst>
+          <a:lin ang="5400000" scaled="0"/>
+        </a:gradFill>
+      </a:fillStyleLst>
+      <a:lnStyleLst>
+        <a:ln w="6350" cap="flat" cmpd="sng" algn="ctr">
+          <a:solidFill>
+            <a:schemeClr val="phClr"/>
+          </a:solidFill>
+          <a:prstDash val="solid"/>
+          <a:miter lim="800000"/>
+        </a:ln>
+        <a:ln w="12700" cap="flat" cmpd="sng" algn="ctr">
+          <a:solidFill>
+            <a:schemeClr val="phClr"/>
+          </a:solidFill>
+          <a:prstDash val="solid"/>
+          <a:miter lim="800000"/>
+        </a:ln>
+        <a:ln w="19050" cap="flat" cmpd="sng" algn="ctr">
+          <a:solidFill>
+            <a:schemeClr val="phClr"/>
+          </a:solidFill>
+          <a:prstDash val="solid"/>
+          <a:miter lim="800000"/>
+        </a:ln>
+      </a:lnStyleLst>
+      <a:effectStyleLst>
+        <a:effectStyle>
+          <a:effectLst/>
+        </a:effectStyle>
+        <a:effectStyle>
+          <a:effectLst/>
+        </a:effectStyle>
+        <a:effectStyle>
+          <a:effectLst>
+            <a:outerShdw blurRad="57150" dist="19050" dir="5400000" algn="ctr" rotWithShape="0">
+              <a:srgbClr val="000000">
+                <a:alpha val="63000"/>
+              </a:srgbClr>
+            </a:outerShdw>
+          </a:effectLst>
+        </a:effectStyle>
+      </a:effectStyleLst>
+      <a:bgFillStyleLst>
+        <a:solidFill>
+          <a:schemeClr val="phClr"/>
+        </a:solidFill>
+        <a:solidFill>
+          <a:schemeClr val="phClr">
+            <a:tint val="95000"/>
+            <a:satMod val="170000"/>
+          </a:schemeClr>
+        </a:solidFill>
+        <a:gradFill rotWithShape="1">
+          <a:gsLst>
+            <a:gs pos="0">
+              <a:schemeClr val="phClr">
+                <a:tint val="93000"/>
+                <a:satMod val="150000"/>
+                <a:shade val="98000"/>
+                <a:lumMod val="102000"/>
+              </a:schemeClr>
+            </a:gs>
+            <a:gs pos="50000">
+              <a:schemeClr val="phClr">
+                <a:tint val="98000"/>
+                <a:satMod val="130000"/>
+                <a:shade val="90000"/>
+                <a:lumMod val="103000"/>
+              </a:schemeClr>
+            </a:gs>
+            <a:gs pos="100000">
+              <a:schemeClr val="phClr">
+                <a:shade val="63000"/>
+                <a:satMod val="120000"/>
+              </a:schemeClr>
+            </a:gs>
+          </a:gsLst>
+          <a:lin ang="5400000" scaled="0"/>
+        </a:gradFill>
+      </a:bgFillStyleLst>
+    </a:fmtScheme>
+  </a:themeElements>
+  <a:objectDefaults/>
+  <a:extraClrSchemeLst/>
+  <a:extLst>
+    <a:ext uri="{05A4C25C-085E-4340-85A3-A5531E510DB2}">
+      <thm15:themeFamily xmlns:thm15="http://schemas.microsoft.com/office/thememl/2012/main" name="Office Theme" id="{62F939B6-93AF-4DB8-9C6B-D6C7DFDC589F}" vid="{4A3C46E8-61CC-4603-A589-7422A47A8E4A}"/>
+    </a:ext>
+  </a:extLst>
+</a:theme>
 </file>
</xml_diff>

<commit_message>
added constraints and conceptual design
</commit_message>
<xml_diff>
--- a/DOCS/PPT's/Problem statement.pptx
+++ b/DOCS/PPT's/Problem statement.pptx
@@ -5,7 +5,7 @@
     <p:sldMasterId id="2147483731" r:id="rId1"/>
   </p:sldMasterIdLst>
   <p:notesMasterIdLst>
-    <p:notesMasterId r:id="rId24"/>
+    <p:notesMasterId r:id="rId38"/>
   </p:notesMasterIdLst>
   <p:sldIdLst>
     <p:sldId id="256" r:id="rId2"/>
@@ -23,13 +23,27 @@
     <p:sldId id="271" r:id="rId14"/>
     <p:sldId id="272" r:id="rId15"/>
     <p:sldId id="273" r:id="rId16"/>
-    <p:sldId id="274" r:id="rId17"/>
-    <p:sldId id="275" r:id="rId18"/>
-    <p:sldId id="277" r:id="rId19"/>
-    <p:sldId id="278" r:id="rId20"/>
-    <p:sldId id="279" r:id="rId21"/>
-    <p:sldId id="280" r:id="rId22"/>
-    <p:sldId id="268" r:id="rId23"/>
+    <p:sldId id="293" r:id="rId17"/>
+    <p:sldId id="274" r:id="rId18"/>
+    <p:sldId id="275" r:id="rId19"/>
+    <p:sldId id="277" r:id="rId20"/>
+    <p:sldId id="278" r:id="rId21"/>
+    <p:sldId id="279" r:id="rId22"/>
+    <p:sldId id="280" r:id="rId23"/>
+    <p:sldId id="281" r:id="rId24"/>
+    <p:sldId id="283" r:id="rId25"/>
+    <p:sldId id="284" r:id="rId26"/>
+    <p:sldId id="285" r:id="rId27"/>
+    <p:sldId id="286" r:id="rId28"/>
+    <p:sldId id="287" r:id="rId29"/>
+    <p:sldId id="282" r:id="rId30"/>
+    <p:sldId id="288" r:id="rId31"/>
+    <p:sldId id="289" r:id="rId32"/>
+    <p:sldId id="290" r:id="rId33"/>
+    <p:sldId id="292" r:id="rId34"/>
+    <p:sldId id="294" r:id="rId35"/>
+    <p:sldId id="291" r:id="rId36"/>
+    <p:sldId id="268" r:id="rId37"/>
   </p:sldIdLst>
   <p:sldSz cx="12192000" cy="6858000"/>
   <p:notesSz cx="6858000" cy="9144000"/>
@@ -644,6 +658,342 @@
     <p:extLst>
       <p:ext uri="{BB962C8B-B14F-4D97-AF65-F5344CB8AC3E}">
         <p14:creationId xmlns:p14="http://schemas.microsoft.com/office/powerpoint/2010/main" val="147082123"/>
+      </p:ext>
+    </p:extLst>
+  </p:cSld>
+  <p:clrMapOvr>
+    <a:masterClrMapping/>
+  </p:clrMapOvr>
+</p:notes>
+</file>
+
+<file path=ppt/notesSlides/notesSlide3.xml><?xml version="1.0" encoding="utf-8"?>
+<p:notes xmlns:a="http://schemas.openxmlformats.org/drawingml/2006/main" xmlns:r="http://schemas.openxmlformats.org/officeDocument/2006/relationships" xmlns:p="http://schemas.openxmlformats.org/presentationml/2006/main">
+  <p:cSld>
+    <p:spTree>
+      <p:nvGrpSpPr>
+        <p:cNvPr id="1" name=""/>
+        <p:cNvGrpSpPr/>
+        <p:nvPr/>
+      </p:nvGrpSpPr>
+      <p:grpSpPr>
+        <a:xfrm>
+          <a:off x="0" y="0"/>
+          <a:ext cx="0" cy="0"/>
+          <a:chOff x="0" y="0"/>
+          <a:chExt cx="0" cy="0"/>
+        </a:xfrm>
+      </p:grpSpPr>
+      <p:sp>
+        <p:nvSpPr>
+          <p:cNvPr id="2" name="Slide Image Placeholder 1"/>
+          <p:cNvSpPr>
+            <a:spLocks noGrp="1" noRot="1" noChangeAspect="1"/>
+          </p:cNvSpPr>
+          <p:nvPr>
+            <p:ph type="sldImg"/>
+          </p:nvPr>
+        </p:nvSpPr>
+        <p:spPr/>
+      </p:sp>
+      <p:sp>
+        <p:nvSpPr>
+          <p:cNvPr id="3" name="Notes Placeholder 2"/>
+          <p:cNvSpPr>
+            <a:spLocks noGrp="1"/>
+          </p:cNvSpPr>
+          <p:nvPr>
+            <p:ph type="body" idx="1"/>
+          </p:nvPr>
+        </p:nvSpPr>
+        <p:spPr/>
+        <p:txBody>
+          <a:bodyPr/>
+          <a:lstStyle/>
+          <a:p>
+            <a:endParaRPr lang="en-US" dirty="0"/>
+          </a:p>
+        </p:txBody>
+      </p:sp>
+      <p:sp>
+        <p:nvSpPr>
+          <p:cNvPr id="4" name="Slide Number Placeholder 3"/>
+          <p:cNvSpPr>
+            <a:spLocks noGrp="1"/>
+          </p:cNvSpPr>
+          <p:nvPr>
+            <p:ph type="sldNum" sz="quarter" idx="5"/>
+          </p:nvPr>
+        </p:nvSpPr>
+        <p:spPr/>
+        <p:txBody>
+          <a:bodyPr/>
+          <a:lstStyle/>
+          <a:p>
+            <a:fld id="{7FF964DC-1A71-460C-AA01-7C47DBFAAE3D}" type="slidenum">
+              <a:rPr lang="en-US" smtClean="0"/>
+              <a:t>26</a:t>
+            </a:fld>
+            <a:endParaRPr lang="en-US"/>
+          </a:p>
+        </p:txBody>
+      </p:sp>
+    </p:spTree>
+    <p:extLst>
+      <p:ext uri="{BB962C8B-B14F-4D97-AF65-F5344CB8AC3E}">
+        <p14:creationId xmlns:p14="http://schemas.microsoft.com/office/powerpoint/2010/main" val="2172227946"/>
+      </p:ext>
+    </p:extLst>
+  </p:cSld>
+  <p:clrMapOvr>
+    <a:masterClrMapping/>
+  </p:clrMapOvr>
+</p:notes>
+</file>
+
+<file path=ppt/notesSlides/notesSlide4.xml><?xml version="1.0" encoding="utf-8"?>
+<p:notes xmlns:a="http://schemas.openxmlformats.org/drawingml/2006/main" xmlns:r="http://schemas.openxmlformats.org/officeDocument/2006/relationships" xmlns:p="http://schemas.openxmlformats.org/presentationml/2006/main">
+  <p:cSld>
+    <p:spTree>
+      <p:nvGrpSpPr>
+        <p:cNvPr id="1" name=""/>
+        <p:cNvGrpSpPr/>
+        <p:nvPr/>
+      </p:nvGrpSpPr>
+      <p:grpSpPr>
+        <a:xfrm>
+          <a:off x="0" y="0"/>
+          <a:ext cx="0" cy="0"/>
+          <a:chOff x="0" y="0"/>
+          <a:chExt cx="0" cy="0"/>
+        </a:xfrm>
+      </p:grpSpPr>
+      <p:sp>
+        <p:nvSpPr>
+          <p:cNvPr id="2" name="Slide Image Placeholder 1"/>
+          <p:cNvSpPr>
+            <a:spLocks noGrp="1" noRot="1" noChangeAspect="1"/>
+          </p:cNvSpPr>
+          <p:nvPr>
+            <p:ph type="sldImg"/>
+          </p:nvPr>
+        </p:nvSpPr>
+        <p:spPr/>
+      </p:sp>
+      <p:sp>
+        <p:nvSpPr>
+          <p:cNvPr id="3" name="Notes Placeholder 2"/>
+          <p:cNvSpPr>
+            <a:spLocks noGrp="1"/>
+          </p:cNvSpPr>
+          <p:nvPr>
+            <p:ph type="body" idx="1"/>
+          </p:nvPr>
+        </p:nvSpPr>
+        <p:spPr/>
+        <p:txBody>
+          <a:bodyPr/>
+          <a:lstStyle/>
+          <a:p>
+            <a:endParaRPr lang="en-US" dirty="0"/>
+          </a:p>
+        </p:txBody>
+      </p:sp>
+      <p:sp>
+        <p:nvSpPr>
+          <p:cNvPr id="4" name="Slide Number Placeholder 3"/>
+          <p:cNvSpPr>
+            <a:spLocks noGrp="1"/>
+          </p:cNvSpPr>
+          <p:nvPr>
+            <p:ph type="sldNum" sz="quarter" idx="5"/>
+          </p:nvPr>
+        </p:nvSpPr>
+        <p:spPr/>
+        <p:txBody>
+          <a:bodyPr/>
+          <a:lstStyle/>
+          <a:p>
+            <a:fld id="{7FF964DC-1A71-460C-AA01-7C47DBFAAE3D}" type="slidenum">
+              <a:rPr lang="en-US" smtClean="0"/>
+              <a:t>27</a:t>
+            </a:fld>
+            <a:endParaRPr lang="en-US"/>
+          </a:p>
+        </p:txBody>
+      </p:sp>
+    </p:spTree>
+    <p:extLst>
+      <p:ext uri="{BB962C8B-B14F-4D97-AF65-F5344CB8AC3E}">
+        <p14:creationId xmlns:p14="http://schemas.microsoft.com/office/powerpoint/2010/main" val="2106096771"/>
+      </p:ext>
+    </p:extLst>
+  </p:cSld>
+  <p:clrMapOvr>
+    <a:masterClrMapping/>
+  </p:clrMapOvr>
+</p:notes>
+</file>
+
+<file path=ppt/notesSlides/notesSlide5.xml><?xml version="1.0" encoding="utf-8"?>
+<p:notes xmlns:a="http://schemas.openxmlformats.org/drawingml/2006/main" xmlns:r="http://schemas.openxmlformats.org/officeDocument/2006/relationships" xmlns:p="http://schemas.openxmlformats.org/presentationml/2006/main">
+  <p:cSld>
+    <p:spTree>
+      <p:nvGrpSpPr>
+        <p:cNvPr id="1" name=""/>
+        <p:cNvGrpSpPr/>
+        <p:nvPr/>
+      </p:nvGrpSpPr>
+      <p:grpSpPr>
+        <a:xfrm>
+          <a:off x="0" y="0"/>
+          <a:ext cx="0" cy="0"/>
+          <a:chOff x="0" y="0"/>
+          <a:chExt cx="0" cy="0"/>
+        </a:xfrm>
+      </p:grpSpPr>
+      <p:sp>
+        <p:nvSpPr>
+          <p:cNvPr id="2" name="Slide Image Placeholder 1"/>
+          <p:cNvSpPr>
+            <a:spLocks noGrp="1" noRot="1" noChangeAspect="1"/>
+          </p:cNvSpPr>
+          <p:nvPr>
+            <p:ph type="sldImg"/>
+          </p:nvPr>
+        </p:nvSpPr>
+        <p:spPr/>
+      </p:sp>
+      <p:sp>
+        <p:nvSpPr>
+          <p:cNvPr id="3" name="Notes Placeholder 2"/>
+          <p:cNvSpPr>
+            <a:spLocks noGrp="1"/>
+          </p:cNvSpPr>
+          <p:nvPr>
+            <p:ph type="body" idx="1"/>
+          </p:nvPr>
+        </p:nvSpPr>
+        <p:spPr/>
+        <p:txBody>
+          <a:bodyPr/>
+          <a:lstStyle/>
+          <a:p>
+            <a:endParaRPr lang="en-US" dirty="0"/>
+          </a:p>
+        </p:txBody>
+      </p:sp>
+      <p:sp>
+        <p:nvSpPr>
+          <p:cNvPr id="4" name="Slide Number Placeholder 3"/>
+          <p:cNvSpPr>
+            <a:spLocks noGrp="1"/>
+          </p:cNvSpPr>
+          <p:nvPr>
+            <p:ph type="sldNum" sz="quarter" idx="5"/>
+          </p:nvPr>
+        </p:nvSpPr>
+        <p:spPr/>
+        <p:txBody>
+          <a:bodyPr/>
+          <a:lstStyle/>
+          <a:p>
+            <a:fld id="{1B51C0E0-95F2-45B5-A142-86F1A72D5B17}" type="slidenum">
+              <a:rPr lang="en-US" smtClean="0"/>
+              <a:t>35</a:t>
+            </a:fld>
+            <a:endParaRPr lang="en-US"/>
+          </a:p>
+        </p:txBody>
+      </p:sp>
+    </p:spTree>
+    <p:extLst>
+      <p:ext uri="{BB962C8B-B14F-4D97-AF65-F5344CB8AC3E}">
+        <p14:creationId xmlns:p14="http://schemas.microsoft.com/office/powerpoint/2010/main" val="4270139664"/>
+      </p:ext>
+    </p:extLst>
+  </p:cSld>
+  <p:clrMapOvr>
+    <a:masterClrMapping/>
+  </p:clrMapOvr>
+</p:notes>
+</file>
+
+<file path=ppt/notesSlides/notesSlide6.xml><?xml version="1.0" encoding="utf-8"?>
+<p:notes xmlns:a="http://schemas.openxmlformats.org/drawingml/2006/main" xmlns:r="http://schemas.openxmlformats.org/officeDocument/2006/relationships" xmlns:p="http://schemas.openxmlformats.org/presentationml/2006/main">
+  <p:cSld>
+    <p:spTree>
+      <p:nvGrpSpPr>
+        <p:cNvPr id="1" name=""/>
+        <p:cNvGrpSpPr/>
+        <p:nvPr/>
+      </p:nvGrpSpPr>
+      <p:grpSpPr>
+        <a:xfrm>
+          <a:off x="0" y="0"/>
+          <a:ext cx="0" cy="0"/>
+          <a:chOff x="0" y="0"/>
+          <a:chExt cx="0" cy="0"/>
+        </a:xfrm>
+      </p:grpSpPr>
+      <p:sp>
+        <p:nvSpPr>
+          <p:cNvPr id="2" name="Slide Image Placeholder 1"/>
+          <p:cNvSpPr>
+            <a:spLocks noGrp="1" noRot="1" noChangeAspect="1"/>
+          </p:cNvSpPr>
+          <p:nvPr>
+            <p:ph type="sldImg"/>
+          </p:nvPr>
+        </p:nvSpPr>
+        <p:spPr/>
+      </p:sp>
+      <p:sp>
+        <p:nvSpPr>
+          <p:cNvPr id="3" name="Notes Placeholder 2"/>
+          <p:cNvSpPr>
+            <a:spLocks noGrp="1"/>
+          </p:cNvSpPr>
+          <p:nvPr>
+            <p:ph type="body" idx="1"/>
+          </p:nvPr>
+        </p:nvSpPr>
+        <p:spPr/>
+        <p:txBody>
+          <a:bodyPr/>
+          <a:lstStyle/>
+          <a:p>
+            <a:endParaRPr lang="en-US" dirty="0"/>
+          </a:p>
+        </p:txBody>
+      </p:sp>
+      <p:sp>
+        <p:nvSpPr>
+          <p:cNvPr id="4" name="Slide Number Placeholder 3"/>
+          <p:cNvSpPr>
+            <a:spLocks noGrp="1"/>
+          </p:cNvSpPr>
+          <p:nvPr>
+            <p:ph type="sldNum" sz="quarter" idx="5"/>
+          </p:nvPr>
+        </p:nvSpPr>
+        <p:spPr/>
+        <p:txBody>
+          <a:bodyPr/>
+          <a:lstStyle/>
+          <a:p>
+            <a:fld id="{7FF964DC-1A71-460C-AA01-7C47DBFAAE3D}" type="slidenum">
+              <a:rPr lang="en-US" smtClean="0"/>
+              <a:t>36</a:t>
+            </a:fld>
+            <a:endParaRPr lang="en-US"/>
+          </a:p>
+        </p:txBody>
+      </p:sp>
+    </p:spTree>
+    <p:extLst>
+      <p:ext uri="{BB962C8B-B14F-4D97-AF65-F5344CB8AC3E}">
+        <p14:creationId xmlns:p14="http://schemas.microsoft.com/office/powerpoint/2010/main" val="3021780796"/>
       </p:ext>
     </p:extLst>
   </p:cSld>
@@ -4391,6 +4741,15 @@
           <a:bodyPr/>
           <a:lstStyle/>
           <a:p>
+            <a:pPr marL="0" indent="0">
+              <a:buNone/>
+            </a:pPr>
+            <a:r>
+              <a:rPr lang="en-US" dirty="0"/>
+              <a:t>Contains the following systems inside it </a:t>
+            </a:r>
+          </a:p>
+          <a:p>
             <a:r>
               <a:rPr lang="en-US" dirty="0"/>
               <a:t>Camera </a:t>
@@ -4492,6 +4851,15 @@
           <a:bodyPr/>
           <a:lstStyle/>
           <a:p>
+            <a:pPr marL="0" indent="0">
+              <a:buNone/>
+            </a:pPr>
+            <a:r>
+              <a:rPr lang="en-US" dirty="0"/>
+              <a:t>Contains the following systems inside it</a:t>
+            </a:r>
+          </a:p>
+          <a:p>
             <a:r>
               <a:rPr lang="en-US" dirty="0"/>
               <a:t>System that receives the photo</a:t>
@@ -4555,7 +4923,7 @@
           <p:cNvPr id="2" name="Title 1">
             <a:extLst>
               <a:ext uri="{FF2B5EF4-FFF2-40B4-BE49-F238E27FC236}">
-                <a16:creationId xmlns:a16="http://schemas.microsoft.com/office/drawing/2014/main" id="{63FA2295-5DE4-42AA-8D27-A722B6FAEB70}"/>
+                <a16:creationId xmlns:a16="http://schemas.microsoft.com/office/drawing/2014/main" id="{6C724FD5-FCE3-4360-B66D-1A725C2377BB}"/>
               </a:ext>
             </a:extLst>
           </p:cNvPr>
@@ -4566,67 +4934,29 @@
             <p:ph type="title"/>
           </p:nvPr>
         </p:nvSpPr>
-        <p:spPr/>
+        <p:spPr>
+          <a:xfrm>
+            <a:off x="838200" y="365125"/>
+            <a:ext cx="10975258" cy="6109417"/>
+          </a:xfrm>
+        </p:spPr>
         <p:txBody>
           <a:bodyPr>
-            <a:normAutofit/>
+            <a:noAutofit/>
           </a:bodyPr>
           <a:lstStyle/>
           <a:p>
             <a:r>
-              <a:rPr lang="en-US" dirty="0"/>
-              <a:t>System that outputs a descriptor for “m” faces</a:t>
-            </a:r>
-          </a:p>
-        </p:txBody>
-      </p:sp>
-      <p:sp>
-        <p:nvSpPr>
-          <p:cNvPr id="3" name="Content Placeholder 2">
-            <a:extLst>
-              <a:ext uri="{FF2B5EF4-FFF2-40B4-BE49-F238E27FC236}">
-                <a16:creationId xmlns:a16="http://schemas.microsoft.com/office/drawing/2014/main" id="{A30DA9CB-2A27-4B68-990B-767029736F7E}"/>
-              </a:ext>
-            </a:extLst>
-          </p:cNvPr>
-          <p:cNvSpPr>
-            <a:spLocks noGrp="1"/>
-          </p:cNvSpPr>
-          <p:nvPr>
-            <p:ph idx="1"/>
-          </p:nvPr>
-        </p:nvSpPr>
-        <p:spPr/>
-        <p:txBody>
-          <a:bodyPr/>
-          <a:lstStyle/>
-          <a:p>
-            <a:r>
-              <a:rPr lang="en-US" dirty="0"/>
-              <a:t>System that iterates through the “m” detected faces and calls the following sub systems</a:t>
-            </a:r>
-          </a:p>
-          <a:p>
-            <a:r>
-              <a:rPr lang="en-US" dirty="0"/>
-              <a:t>System that outputs a descriptor(fixed size) for one face (Facial recognition) </a:t>
-            </a:r>
-          </a:p>
-          <a:p>
-            <a:r>
-              <a:rPr lang="en-US" dirty="0"/>
-              <a:t>System that stores these “m” descriptors </a:t>
-            </a:r>
-          </a:p>
-          <a:p>
-            <a:endParaRPr lang="en-US" dirty="0"/>
+              <a:rPr lang="en-US" sz="8000" dirty="0"/>
+              <a:t>More explanation about a few systems that is inside the sub systems</a:t>
+            </a:r>
           </a:p>
         </p:txBody>
       </p:sp>
     </p:spTree>
     <p:extLst>
       <p:ext uri="{BB962C8B-B14F-4D97-AF65-F5344CB8AC3E}">
-        <p14:creationId xmlns:p14="http://schemas.microsoft.com/office/powerpoint/2010/main" val="3192779843"/>
+        <p14:creationId xmlns:p14="http://schemas.microsoft.com/office/powerpoint/2010/main" val="776749036"/>
       </p:ext>
     </p:extLst>
   </p:cSld>
@@ -4658,7 +4988,7 @@
           <p:cNvPr id="2" name="Title 1">
             <a:extLst>
               <a:ext uri="{FF2B5EF4-FFF2-40B4-BE49-F238E27FC236}">
-                <a16:creationId xmlns:a16="http://schemas.microsoft.com/office/drawing/2014/main" id="{BC31AE2E-5951-4394-AD2F-0CCE4C714AC3}"/>
+                <a16:creationId xmlns:a16="http://schemas.microsoft.com/office/drawing/2014/main" id="{63FA2295-5DE4-42AA-8D27-A722B6FAEB70}"/>
               </a:ext>
             </a:extLst>
           </p:cNvPr>
@@ -4669,77 +4999,84 @@
             <p:ph type="title"/>
           </p:nvPr>
         </p:nvSpPr>
-        <p:spPr/>
+        <p:spPr>
+          <a:xfrm>
+            <a:off x="838199" y="365125"/>
+            <a:ext cx="10515601" cy="1684900"/>
+          </a:xfrm>
+        </p:spPr>
         <p:txBody>
           <a:bodyPr>
             <a:normAutofit fontScale="90000"/>
           </a:bodyPr>
           <a:lstStyle/>
           <a:p>
+            <a:r>
+              <a:rPr lang="en-US" dirty="0"/>
+              <a:t>System that marks the attendance - </a:t>
+            </a:r>
             <a:br>
               <a:rPr lang="en-US" dirty="0"/>
             </a:br>
             <a:r>
               <a:rPr lang="en-US" dirty="0"/>
-              <a:t>System that iterates through “m” descriptor and marks the attendance</a:t>
-            </a:r>
-            <a:br>
-              <a:rPr lang="en-US" dirty="0"/>
-            </a:br>
+              <a:t>System that outputs a descriptor for “m” faces</a:t>
+            </a:r>
+          </a:p>
+        </p:txBody>
+      </p:sp>
+      <p:sp>
+        <p:nvSpPr>
+          <p:cNvPr id="3" name="Content Placeholder 2">
+            <a:extLst>
+              <a:ext uri="{FF2B5EF4-FFF2-40B4-BE49-F238E27FC236}">
+                <a16:creationId xmlns:a16="http://schemas.microsoft.com/office/drawing/2014/main" id="{A30DA9CB-2A27-4B68-990B-767029736F7E}"/>
+              </a:ext>
+            </a:extLst>
+          </p:cNvPr>
+          <p:cNvSpPr>
+            <a:spLocks noGrp="1"/>
+          </p:cNvSpPr>
+          <p:nvPr>
+            <p:ph idx="1"/>
+          </p:nvPr>
+        </p:nvSpPr>
+        <p:spPr>
+          <a:xfrm>
+            <a:off x="838200" y="2050025"/>
+            <a:ext cx="10515600" cy="4442849"/>
+          </a:xfrm>
+        </p:spPr>
+        <p:txBody>
+          <a:bodyPr/>
+          <a:lstStyle/>
+          <a:p>
+            <a:r>
+              <a:rPr lang="en-US" dirty="0"/>
+              <a:t>System that iterates through the “m” detected faces and calls the following sub systems</a:t>
+            </a:r>
+          </a:p>
+          <a:p>
+            <a:r>
+              <a:rPr lang="en-US" dirty="0"/>
+              <a:t>System that outputs a descriptor(fixed size) for one face (Facial recognition) </a:t>
+            </a:r>
+          </a:p>
+          <a:p>
+            <a:r>
+              <a:rPr lang="en-US" dirty="0"/>
+              <a:t>System that stores these “m” descriptors </a:t>
+            </a:r>
+          </a:p>
+          <a:p>
             <a:endParaRPr lang="en-US" dirty="0"/>
-          </a:p>
-        </p:txBody>
-      </p:sp>
-      <p:sp>
-        <p:nvSpPr>
-          <p:cNvPr id="3" name="Content Placeholder 2">
-            <a:extLst>
-              <a:ext uri="{FF2B5EF4-FFF2-40B4-BE49-F238E27FC236}">
-                <a16:creationId xmlns:a16="http://schemas.microsoft.com/office/drawing/2014/main" id="{B7A0EC86-95BA-4EF9-950D-054B3B7F161F}"/>
-              </a:ext>
-            </a:extLst>
-          </p:cNvPr>
-          <p:cNvSpPr>
-            <a:spLocks noGrp="1"/>
-          </p:cNvSpPr>
-          <p:nvPr>
-            <p:ph idx="1"/>
-          </p:nvPr>
-        </p:nvSpPr>
-        <p:spPr/>
-        <p:txBody>
-          <a:bodyPr/>
-          <a:lstStyle/>
-          <a:p>
-            <a:r>
-              <a:rPr lang="en-US" dirty="0"/>
-              <a:t>System that iterates through the database containing “n” descriptors </a:t>
-            </a:r>
-          </a:p>
-          <a:p>
-            <a:r>
-              <a:rPr lang="en-US" dirty="0"/>
-              <a:t>System that checks whether 2 descriptors are same</a:t>
-            </a:r>
-          </a:p>
-          <a:p>
-            <a:r>
-              <a:rPr lang="en-US" dirty="0"/>
-              <a:t>System that gives the register number of a given descriptor </a:t>
-            </a:r>
-          </a:p>
-          <a:p>
-            <a:r>
-              <a:rPr lang="en-US" dirty="0"/>
-              <a:t>System that marks the attendance against the register number </a:t>
-            </a:r>
           </a:p>
         </p:txBody>
       </p:sp>
     </p:spTree>
     <p:extLst>
       <p:ext uri="{BB962C8B-B14F-4D97-AF65-F5344CB8AC3E}">
-        <p14:creationId xmlns:p14="http://schemas.microsoft.com/office/powerpoint/2010/main" val="352402098"/>
+        <p14:creationId xmlns:p14="http://schemas.microsoft.com/office/powerpoint/2010/main" val="3192779843"/>
       </p:ext>
     </p:extLst>
   </p:cSld>
@@ -4771,7 +5108,7 @@
           <p:cNvPr id="2" name="Title 1">
             <a:extLst>
               <a:ext uri="{FF2B5EF4-FFF2-40B4-BE49-F238E27FC236}">
-                <a16:creationId xmlns:a16="http://schemas.microsoft.com/office/drawing/2014/main" id="{CD432508-6B86-4A7D-A45F-50F075877E79}"/>
+                <a16:creationId xmlns:a16="http://schemas.microsoft.com/office/drawing/2014/main" id="{BC31AE2E-5951-4394-AD2F-0CCE4C714AC3}"/>
               </a:ext>
             </a:extLst>
           </p:cNvPr>
@@ -4785,18 +5122,83 @@
         <p:spPr>
           <a:xfrm>
             <a:off x="838200" y="365125"/>
-            <a:ext cx="11063514" cy="6035675"/>
+            <a:ext cx="10515600" cy="1950372"/>
           </a:xfrm>
         </p:spPr>
         <p:txBody>
           <a:bodyPr>
-            <a:normAutofit/>
+            <a:normAutofit fontScale="90000"/>
           </a:bodyPr>
           <a:lstStyle/>
           <a:p>
-            <a:r>
-              <a:rPr lang="en-US" sz="10000" dirty="0"/>
-              <a:t>Mathematical Modelling</a:t>
+            <a:br>
+              <a:rPr lang="en-US" dirty="0"/>
+            </a:br>
+            <a:r>
+              <a:rPr lang="en-US" dirty="0"/>
+              <a:t>System that marks the attendance – </a:t>
+            </a:r>
+            <a:br>
+              <a:rPr lang="en-US" dirty="0"/>
+            </a:br>
+            <a:r>
+              <a:rPr lang="en-US" dirty="0"/>
+              <a:t>System that iterates through “m” descriptors and marks the attendance</a:t>
+            </a:r>
+            <a:br>
+              <a:rPr lang="en-US" dirty="0"/>
+            </a:br>
+            <a:endParaRPr lang="en-US" dirty="0"/>
+          </a:p>
+        </p:txBody>
+      </p:sp>
+      <p:sp>
+        <p:nvSpPr>
+          <p:cNvPr id="3" name="Content Placeholder 2">
+            <a:extLst>
+              <a:ext uri="{FF2B5EF4-FFF2-40B4-BE49-F238E27FC236}">
+                <a16:creationId xmlns:a16="http://schemas.microsoft.com/office/drawing/2014/main" id="{B7A0EC86-95BA-4EF9-950D-054B3B7F161F}"/>
+              </a:ext>
+            </a:extLst>
+          </p:cNvPr>
+          <p:cNvSpPr>
+            <a:spLocks noGrp="1"/>
+          </p:cNvSpPr>
+          <p:nvPr>
+            <p:ph idx="1"/>
+          </p:nvPr>
+        </p:nvSpPr>
+        <p:spPr>
+          <a:xfrm>
+            <a:off x="838200" y="2315497"/>
+            <a:ext cx="10515600" cy="4177378"/>
+          </a:xfrm>
+        </p:spPr>
+        <p:txBody>
+          <a:bodyPr/>
+          <a:lstStyle/>
+          <a:p>
+            <a:r>
+              <a:rPr lang="en-US" dirty="0"/>
+              <a:t>System that iterates through the database containing “n” descriptors </a:t>
+            </a:r>
+          </a:p>
+          <a:p>
+            <a:r>
+              <a:rPr lang="en-US" dirty="0"/>
+              <a:t>System that checks whether 2 descriptors are same</a:t>
+            </a:r>
+          </a:p>
+          <a:p>
+            <a:r>
+              <a:rPr lang="en-US" dirty="0"/>
+              <a:t>System that gives the register number of a given descriptor </a:t>
+            </a:r>
+          </a:p>
+          <a:p>
+            <a:r>
+              <a:rPr lang="en-US" dirty="0"/>
+              <a:t>System that marks the attendance against the register number </a:t>
             </a:r>
           </a:p>
         </p:txBody>
@@ -4804,7 +5206,7 @@
     </p:spTree>
     <p:extLst>
       <p:ext uri="{BB962C8B-B14F-4D97-AF65-F5344CB8AC3E}">
-        <p14:creationId xmlns:p14="http://schemas.microsoft.com/office/powerpoint/2010/main" val="885709930"/>
+        <p14:creationId xmlns:p14="http://schemas.microsoft.com/office/powerpoint/2010/main" val="352402098"/>
       </p:ext>
     </p:extLst>
   </p:cSld>
@@ -4836,7 +5238,7 @@
           <p:cNvPr id="2" name="Title 1">
             <a:extLst>
               <a:ext uri="{FF2B5EF4-FFF2-40B4-BE49-F238E27FC236}">
-                <a16:creationId xmlns:a16="http://schemas.microsoft.com/office/drawing/2014/main" id="{FDB2E409-38FB-4688-8B6B-076497284139}"/>
+                <a16:creationId xmlns:a16="http://schemas.microsoft.com/office/drawing/2014/main" id="{CD432508-6B86-4A7D-A45F-50F075877E79}"/>
               </a:ext>
             </a:extLst>
           </p:cNvPr>
@@ -4847,57 +5249,29 @@
             <p:ph type="title"/>
           </p:nvPr>
         </p:nvSpPr>
-        <p:spPr/>
-        <p:txBody>
-          <a:bodyPr/>
-          <a:lstStyle/>
-          <a:p>
-            <a:r>
-              <a:rPr lang="en-US" dirty="0"/>
-              <a:t>System that signals the camera</a:t>
-            </a:r>
-          </a:p>
-        </p:txBody>
-      </p:sp>
-      <p:pic>
-        <p:nvPicPr>
-          <p:cNvPr id="5" name="Content Placeholder 4">
-            <a:extLst>
-              <a:ext uri="{FF2B5EF4-FFF2-40B4-BE49-F238E27FC236}">
-                <a16:creationId xmlns:a16="http://schemas.microsoft.com/office/drawing/2014/main" id="{05FCD3E6-9C4C-4F0B-B332-464A5EB23A76}"/>
-              </a:ext>
-            </a:extLst>
-          </p:cNvPr>
-          <p:cNvPicPr>
-            <a:picLocks noGrp="1" noChangeAspect="1"/>
-          </p:cNvPicPr>
-          <p:nvPr>
-            <p:ph idx="1"/>
-          </p:nvPr>
-        </p:nvPicPr>
-        <p:blipFill>
-          <a:blip r:embed="rId2">
-            <a:extLst>
-              <a:ext uri="{28A0092B-C50C-407E-A947-70E740481C1C}">
-                <a14:useLocalDpi xmlns:a14="http://schemas.microsoft.com/office/drawing/2010/main" val="0"/>
-              </a:ext>
-            </a:extLst>
-          </a:blip>
-          <a:stretch>
-            <a:fillRect/>
-          </a:stretch>
-        </p:blipFill>
         <p:spPr>
           <a:xfrm>
-            <a:off x="1821151" y="1825625"/>
-            <a:ext cx="8549698" cy="4351338"/>
+            <a:off x="838200" y="365125"/>
+            <a:ext cx="11063514" cy="6035675"/>
           </a:xfrm>
         </p:spPr>
-      </p:pic>
+        <p:txBody>
+          <a:bodyPr>
+            <a:normAutofit/>
+          </a:bodyPr>
+          <a:lstStyle/>
+          <a:p>
+            <a:r>
+              <a:rPr lang="en-US" sz="10000" dirty="0"/>
+              <a:t>Mathematical Modelling</a:t>
+            </a:r>
+          </a:p>
+        </p:txBody>
+      </p:sp>
     </p:spTree>
     <p:extLst>
       <p:ext uri="{BB962C8B-B14F-4D97-AF65-F5344CB8AC3E}">
-        <p14:creationId xmlns:p14="http://schemas.microsoft.com/office/powerpoint/2010/main" val="1902410595"/>
+        <p14:creationId xmlns:p14="http://schemas.microsoft.com/office/powerpoint/2010/main" val="885709930"/>
       </p:ext>
     </p:extLst>
   </p:cSld>
@@ -5039,7 +5413,7 @@
           <p:cNvPr id="2" name="Title 1">
             <a:extLst>
               <a:ext uri="{FF2B5EF4-FFF2-40B4-BE49-F238E27FC236}">
-                <a16:creationId xmlns:a16="http://schemas.microsoft.com/office/drawing/2014/main" id="{4B5F80A6-03CF-43A4-9141-D1046C0C0F66}"/>
+                <a16:creationId xmlns:a16="http://schemas.microsoft.com/office/drawing/2014/main" id="{FDB2E409-38FB-4688-8B6B-076497284139}"/>
               </a:ext>
             </a:extLst>
           </p:cNvPr>
@@ -5050,24 +5424,20 @@
             <p:ph type="title"/>
           </p:nvPr>
         </p:nvSpPr>
-        <p:spPr/>
-        <p:txBody>
-          <a:bodyPr>
-            <a:normAutofit fontScale="90000"/>
-          </a:bodyPr>
-          <a:lstStyle/>
-          <a:p>
-            <a:br>
-              <a:rPr lang="en-US" dirty="0"/>
-            </a:br>
-            <a:r>
-              <a:rPr lang="en-US" dirty="0"/>
-              <a:t>System that outputs a descriptor(fixed size) for one face (Facial recognition) </a:t>
-            </a:r>
-            <a:br>
-              <a:rPr lang="en-US" dirty="0"/>
-            </a:br>
-            <a:endParaRPr lang="en-US" dirty="0"/>
+        <p:spPr>
+          <a:xfrm>
+            <a:off x="838200" y="365125"/>
+            <a:ext cx="10515600" cy="1460500"/>
+          </a:xfrm>
+        </p:spPr>
+        <p:txBody>
+          <a:bodyPr/>
+          <a:lstStyle/>
+          <a:p>
+            <a:r>
+              <a:rPr lang="en-US" dirty="0"/>
+              <a:t>System that takes photo - System that signals the camera</a:t>
+            </a:r>
           </a:p>
         </p:txBody>
       </p:sp>
@@ -5076,7 +5446,7 @@
           <p:cNvPr id="5" name="Content Placeholder 4">
             <a:extLst>
               <a:ext uri="{FF2B5EF4-FFF2-40B4-BE49-F238E27FC236}">
-                <a16:creationId xmlns:a16="http://schemas.microsoft.com/office/drawing/2014/main" id="{CC7B8565-B0EF-4A50-9E95-F54C10332229}"/>
+                <a16:creationId xmlns:a16="http://schemas.microsoft.com/office/drawing/2014/main" id="{05FCD3E6-9C4C-4F0B-B332-464A5EB23A76}"/>
               </a:ext>
             </a:extLst>
           </p:cNvPr>
@@ -5101,15 +5471,15 @@
         </p:blipFill>
         <p:spPr>
           <a:xfrm>
-            <a:off x="1108966" y="2372291"/>
-            <a:ext cx="9974067" cy="3258005"/>
+            <a:off x="1821151" y="1825625"/>
+            <a:ext cx="8549698" cy="4351338"/>
           </a:xfrm>
         </p:spPr>
       </p:pic>
     </p:spTree>
     <p:extLst>
       <p:ext uri="{BB962C8B-B14F-4D97-AF65-F5344CB8AC3E}">
-        <p14:creationId xmlns:p14="http://schemas.microsoft.com/office/powerpoint/2010/main" val="3198791146"/>
+        <p14:creationId xmlns:p14="http://schemas.microsoft.com/office/powerpoint/2010/main" val="1902410595"/>
       </p:ext>
     </p:extLst>
   </p:cSld>
@@ -5141,7 +5511,7 @@
           <p:cNvPr id="2" name="Title 1">
             <a:extLst>
               <a:ext uri="{FF2B5EF4-FFF2-40B4-BE49-F238E27FC236}">
-                <a16:creationId xmlns:a16="http://schemas.microsoft.com/office/drawing/2014/main" id="{50BD2304-0136-4715-9EF5-C9237713BFCA}"/>
+                <a16:creationId xmlns:a16="http://schemas.microsoft.com/office/drawing/2014/main" id="{4B5F80A6-03CF-43A4-9141-D1046C0C0F66}"/>
               </a:ext>
             </a:extLst>
           </p:cNvPr>
@@ -5164,7 +5534,7 @@
             </a:br>
             <a:r>
               <a:rPr lang="en-US" dirty="0"/>
-              <a:t>System that checks whether 2 descriptors are same</a:t>
+              <a:t>System that marks the attendance - System that outputs a descriptor(fixed size) for one face (Facial recognition) </a:t>
             </a:r>
             <a:br>
               <a:rPr lang="en-US" dirty="0"/>
@@ -5178,7 +5548,7 @@
           <p:cNvPr id="5" name="Content Placeholder 4">
             <a:extLst>
               <a:ext uri="{FF2B5EF4-FFF2-40B4-BE49-F238E27FC236}">
-                <a16:creationId xmlns:a16="http://schemas.microsoft.com/office/drawing/2014/main" id="{D84398D9-5D82-408B-AA25-10D8ADF2DE27}"/>
+                <a16:creationId xmlns:a16="http://schemas.microsoft.com/office/drawing/2014/main" id="{CC7B8565-B0EF-4A50-9E95-F54C10332229}"/>
               </a:ext>
             </a:extLst>
           </p:cNvPr>
@@ -5203,15 +5573,15 @@
         </p:blipFill>
         <p:spPr>
           <a:xfrm>
-            <a:off x="2059759" y="1825625"/>
-            <a:ext cx="8658552" cy="4667250"/>
+            <a:off x="1108966" y="2372291"/>
+            <a:ext cx="9974067" cy="3258005"/>
           </a:xfrm>
         </p:spPr>
       </p:pic>
     </p:spTree>
     <p:extLst>
       <p:ext uri="{BB962C8B-B14F-4D97-AF65-F5344CB8AC3E}">
-        <p14:creationId xmlns:p14="http://schemas.microsoft.com/office/powerpoint/2010/main" val="1783297979"/>
+        <p14:creationId xmlns:p14="http://schemas.microsoft.com/office/powerpoint/2010/main" val="3198791146"/>
       </p:ext>
     </p:extLst>
   </p:cSld>
@@ -5243,7 +5613,7 @@
           <p:cNvPr id="2" name="Title 1">
             <a:extLst>
               <a:ext uri="{FF2B5EF4-FFF2-40B4-BE49-F238E27FC236}">
-                <a16:creationId xmlns:a16="http://schemas.microsoft.com/office/drawing/2014/main" id="{884BA7A0-6FBF-4334-AE18-16F7C8EAE5C5}"/>
+                <a16:creationId xmlns:a16="http://schemas.microsoft.com/office/drawing/2014/main" id="{50BD2304-0136-4715-9EF5-C9237713BFCA}"/>
               </a:ext>
             </a:extLst>
           </p:cNvPr>
@@ -5254,32 +5624,746 @@
             <p:ph type="title"/>
           </p:nvPr>
         </p:nvSpPr>
+        <p:spPr/>
+        <p:txBody>
+          <a:bodyPr>
+            <a:normAutofit fontScale="90000"/>
+          </a:bodyPr>
+          <a:lstStyle/>
+          <a:p>
+            <a:br>
+              <a:rPr lang="en-US" dirty="0"/>
+            </a:br>
+            <a:r>
+              <a:rPr lang="en-US" dirty="0"/>
+              <a:t>System that marks the attendance - System that checks whether 2 descriptors are same</a:t>
+            </a:r>
+            <a:br>
+              <a:rPr lang="en-US" dirty="0"/>
+            </a:br>
+            <a:endParaRPr lang="en-US" dirty="0"/>
+          </a:p>
+        </p:txBody>
+      </p:sp>
+      <p:pic>
+        <p:nvPicPr>
+          <p:cNvPr id="5" name="Content Placeholder 4">
+            <a:extLst>
+              <a:ext uri="{FF2B5EF4-FFF2-40B4-BE49-F238E27FC236}">
+                <a16:creationId xmlns:a16="http://schemas.microsoft.com/office/drawing/2014/main" id="{D84398D9-5D82-408B-AA25-10D8ADF2DE27}"/>
+              </a:ext>
+            </a:extLst>
+          </p:cNvPr>
+          <p:cNvPicPr>
+            <a:picLocks noGrp="1" noChangeAspect="1"/>
+          </p:cNvPicPr>
+          <p:nvPr>
+            <p:ph idx="1"/>
+          </p:nvPr>
+        </p:nvPicPr>
+        <p:blipFill>
+          <a:blip r:embed="rId2">
+            <a:extLst>
+              <a:ext uri="{28A0092B-C50C-407E-A947-70E740481C1C}">
+                <a14:useLocalDpi xmlns:a14="http://schemas.microsoft.com/office/drawing/2010/main" val="0"/>
+              </a:ext>
+            </a:extLst>
+          </a:blip>
+          <a:stretch>
+            <a:fillRect/>
+          </a:stretch>
+        </p:blipFill>
         <p:spPr>
           <a:xfrm>
-            <a:off x="838200" y="576141"/>
-            <a:ext cx="10515600" cy="6091946"/>
+            <a:off x="2059759" y="1825625"/>
+            <a:ext cx="8658552" cy="4667250"/>
           </a:xfrm>
         </p:spPr>
-        <p:txBody>
-          <a:bodyPr>
-            <a:noAutofit/>
-          </a:bodyPr>
-          <a:lstStyle/>
-          <a:p>
-            <a:br>
-              <a:rPr lang="en-US" sz="15000" dirty="0"/>
-            </a:br>
-            <a:r>
-              <a:rPr lang="en-US" sz="15000" dirty="0"/>
-              <a:t>Thank You</a:t>
-            </a:r>
-          </a:p>
-        </p:txBody>
-      </p:sp>
+      </p:pic>
     </p:spTree>
     <p:extLst>
       <p:ext uri="{BB962C8B-B14F-4D97-AF65-F5344CB8AC3E}">
-        <p14:creationId xmlns:p14="http://schemas.microsoft.com/office/powerpoint/2010/main" val="1880208882"/>
+        <p14:creationId xmlns:p14="http://schemas.microsoft.com/office/powerpoint/2010/main" val="1783297979"/>
+      </p:ext>
+    </p:extLst>
+  </p:cSld>
+  <p:clrMapOvr>
+    <a:masterClrMapping/>
+  </p:clrMapOvr>
+</p:sld>
+</file>
+
+<file path=ppt/slides/slide23.xml><?xml version="1.0" encoding="utf-8"?>
+<p:sld xmlns:a="http://schemas.openxmlformats.org/drawingml/2006/main" xmlns:r="http://schemas.openxmlformats.org/officeDocument/2006/relationships" xmlns:p="http://schemas.openxmlformats.org/presentationml/2006/main">
+  <p:cSld>
+    <p:spTree>
+      <p:nvGrpSpPr>
+        <p:cNvPr id="1" name=""/>
+        <p:cNvGrpSpPr/>
+        <p:nvPr/>
+      </p:nvGrpSpPr>
+      <p:grpSpPr>
+        <a:xfrm>
+          <a:off x="0" y="0"/>
+          <a:ext cx="0" cy="0"/>
+          <a:chOff x="0" y="0"/>
+          <a:chExt cx="0" cy="0"/>
+        </a:xfrm>
+      </p:grpSpPr>
+      <p:sp>
+        <p:nvSpPr>
+          <p:cNvPr id="2" name="Title 1">
+            <a:extLst>
+              <a:ext uri="{FF2B5EF4-FFF2-40B4-BE49-F238E27FC236}">
+                <a16:creationId xmlns:a16="http://schemas.microsoft.com/office/drawing/2014/main" id="{89E33410-CC78-427C-9443-2C1EF32AF06A}"/>
+              </a:ext>
+            </a:extLst>
+          </p:cNvPr>
+          <p:cNvSpPr>
+            <a:spLocks noGrp="1"/>
+          </p:cNvSpPr>
+          <p:nvPr>
+            <p:ph type="title"/>
+          </p:nvPr>
+        </p:nvSpPr>
+        <p:spPr>
+          <a:xfrm>
+            <a:off x="838200" y="365125"/>
+            <a:ext cx="10901516" cy="6006178"/>
+          </a:xfrm>
+        </p:spPr>
+        <p:txBody>
+          <a:bodyPr>
+            <a:normAutofit/>
+          </a:bodyPr>
+          <a:lstStyle/>
+          <a:p>
+            <a:r>
+              <a:rPr lang="en-US" sz="10000" dirty="0"/>
+              <a:t>Objectives</a:t>
+            </a:r>
+          </a:p>
+        </p:txBody>
+      </p:sp>
+    </p:spTree>
+    <p:extLst>
+      <p:ext uri="{BB962C8B-B14F-4D97-AF65-F5344CB8AC3E}">
+        <p14:creationId xmlns:p14="http://schemas.microsoft.com/office/powerpoint/2010/main" val="1469367624"/>
+      </p:ext>
+    </p:extLst>
+  </p:cSld>
+  <p:clrMapOvr>
+    <a:masterClrMapping/>
+  </p:clrMapOvr>
+</p:sld>
+</file>
+
+<file path=ppt/slides/slide24.xml><?xml version="1.0" encoding="utf-8"?>
+<p:sld xmlns:a="http://schemas.openxmlformats.org/drawingml/2006/main" xmlns:r="http://schemas.openxmlformats.org/officeDocument/2006/relationships" xmlns:p="http://schemas.openxmlformats.org/presentationml/2006/main">
+  <p:cSld>
+    <p:spTree>
+      <p:nvGrpSpPr>
+        <p:cNvPr id="1" name=""/>
+        <p:cNvGrpSpPr/>
+        <p:nvPr/>
+      </p:nvGrpSpPr>
+      <p:grpSpPr>
+        <a:xfrm>
+          <a:off x="0" y="0"/>
+          <a:ext cx="0" cy="0"/>
+          <a:chOff x="0" y="0"/>
+          <a:chExt cx="0" cy="0"/>
+        </a:xfrm>
+      </p:grpSpPr>
+      <p:sp>
+        <p:nvSpPr>
+          <p:cNvPr id="2" name="Title 1">
+            <a:extLst>
+              <a:ext uri="{FF2B5EF4-FFF2-40B4-BE49-F238E27FC236}">
+                <a16:creationId xmlns:a16="http://schemas.microsoft.com/office/drawing/2014/main" id="{35C3B37A-8BA1-4040-84C9-096D7081FA8B}"/>
+              </a:ext>
+            </a:extLst>
+          </p:cNvPr>
+          <p:cNvSpPr>
+            <a:spLocks noGrp="1"/>
+          </p:cNvSpPr>
+          <p:nvPr>
+            <p:ph type="title"/>
+          </p:nvPr>
+        </p:nvSpPr>
+        <p:spPr/>
+        <p:txBody>
+          <a:bodyPr/>
+          <a:lstStyle/>
+          <a:p>
+            <a:r>
+              <a:rPr lang="en-US" dirty="0"/>
+              <a:t>1</a:t>
+            </a:r>
+            <a:r>
+              <a:rPr lang="en-US" baseline="30000" dirty="0"/>
+              <a:t>ST  Objective</a:t>
+            </a:r>
+            <a:endParaRPr lang="en-US" dirty="0"/>
+          </a:p>
+        </p:txBody>
+      </p:sp>
+      <p:sp>
+        <p:nvSpPr>
+          <p:cNvPr id="3" name="Content Placeholder 2">
+            <a:extLst>
+              <a:ext uri="{FF2B5EF4-FFF2-40B4-BE49-F238E27FC236}">
+                <a16:creationId xmlns:a16="http://schemas.microsoft.com/office/drawing/2014/main" id="{9DC412A5-21A0-4E6B-AEB9-68EDB678AF4B}"/>
+              </a:ext>
+            </a:extLst>
+          </p:cNvPr>
+          <p:cNvSpPr>
+            <a:spLocks noGrp="1"/>
+          </p:cNvSpPr>
+          <p:nvPr>
+            <p:ph idx="1"/>
+          </p:nvPr>
+        </p:nvSpPr>
+        <p:spPr/>
+        <p:txBody>
+          <a:bodyPr/>
+          <a:lstStyle/>
+          <a:p>
+            <a:r>
+              <a:rPr lang="en-US" dirty="0"/>
+              <a:t>One camera </a:t>
+            </a:r>
+          </a:p>
+          <a:p>
+            <a:r>
+              <a:rPr lang="en-US" dirty="0"/>
+              <a:t>One person to stand before the camera </a:t>
+            </a:r>
+          </a:p>
+          <a:p>
+            <a:r>
+              <a:rPr lang="en-US" dirty="0"/>
+              <a:t>Detect the face in the image and run the face recognition</a:t>
+            </a:r>
+          </a:p>
+          <a:p>
+            <a:endParaRPr lang="en-US" dirty="0"/>
+          </a:p>
+        </p:txBody>
+      </p:sp>
+    </p:spTree>
+    <p:extLst>
+      <p:ext uri="{BB962C8B-B14F-4D97-AF65-F5344CB8AC3E}">
+        <p14:creationId xmlns:p14="http://schemas.microsoft.com/office/powerpoint/2010/main" val="1079939939"/>
+      </p:ext>
+    </p:extLst>
+  </p:cSld>
+  <p:clrMapOvr>
+    <a:masterClrMapping/>
+  </p:clrMapOvr>
+</p:sld>
+</file>
+
+<file path=ppt/slides/slide25.xml><?xml version="1.0" encoding="utf-8"?>
+<p:sld xmlns:a="http://schemas.openxmlformats.org/drawingml/2006/main" xmlns:r="http://schemas.openxmlformats.org/officeDocument/2006/relationships" xmlns:p="http://schemas.openxmlformats.org/presentationml/2006/main">
+  <p:cSld>
+    <p:spTree>
+      <p:nvGrpSpPr>
+        <p:cNvPr id="1" name=""/>
+        <p:cNvGrpSpPr/>
+        <p:nvPr/>
+      </p:nvGrpSpPr>
+      <p:grpSpPr>
+        <a:xfrm>
+          <a:off x="0" y="0"/>
+          <a:ext cx="0" cy="0"/>
+          <a:chOff x="0" y="0"/>
+          <a:chExt cx="0" cy="0"/>
+        </a:xfrm>
+      </p:grpSpPr>
+      <p:sp>
+        <p:nvSpPr>
+          <p:cNvPr id="2" name="Title 1">
+            <a:extLst>
+              <a:ext uri="{FF2B5EF4-FFF2-40B4-BE49-F238E27FC236}">
+                <a16:creationId xmlns:a16="http://schemas.microsoft.com/office/drawing/2014/main" id="{FB7EB5FB-5907-4CC7-BFE6-0FAC371FA4C0}"/>
+              </a:ext>
+            </a:extLst>
+          </p:cNvPr>
+          <p:cNvSpPr>
+            <a:spLocks noGrp="1"/>
+          </p:cNvSpPr>
+          <p:nvPr>
+            <p:ph type="title"/>
+          </p:nvPr>
+        </p:nvSpPr>
+        <p:spPr/>
+        <p:txBody>
+          <a:bodyPr/>
+          <a:lstStyle/>
+          <a:p>
+            <a:r>
+              <a:rPr lang="en-US" dirty="0"/>
+              <a:t>2</a:t>
+            </a:r>
+            <a:r>
+              <a:rPr lang="en-US" baseline="30000" dirty="0"/>
+              <a:t>nd</a:t>
+            </a:r>
+            <a:r>
+              <a:rPr lang="en-US" dirty="0"/>
+              <a:t> Objective </a:t>
+            </a:r>
+          </a:p>
+        </p:txBody>
+      </p:sp>
+      <p:sp>
+        <p:nvSpPr>
+          <p:cNvPr id="3" name="Content Placeholder 2">
+            <a:extLst>
+              <a:ext uri="{FF2B5EF4-FFF2-40B4-BE49-F238E27FC236}">
+                <a16:creationId xmlns:a16="http://schemas.microsoft.com/office/drawing/2014/main" id="{16C43A03-4F2B-4ACC-818C-A6B0F72E3C6F}"/>
+              </a:ext>
+            </a:extLst>
+          </p:cNvPr>
+          <p:cNvSpPr>
+            <a:spLocks noGrp="1"/>
+          </p:cNvSpPr>
+          <p:nvPr>
+            <p:ph idx="1"/>
+          </p:nvPr>
+        </p:nvSpPr>
+        <p:spPr/>
+        <p:txBody>
+          <a:bodyPr/>
+          <a:lstStyle/>
+          <a:p>
+            <a:r>
+              <a:rPr lang="en-US" dirty="0"/>
+              <a:t>One person </a:t>
+            </a:r>
+          </a:p>
+          <a:p>
+            <a:r>
+              <a:rPr lang="en-US" dirty="0"/>
+              <a:t>A group of people </a:t>
+            </a:r>
+          </a:p>
+          <a:p>
+            <a:r>
+              <a:rPr lang="en-US" dirty="0"/>
+              <a:t>Run a face detection model to find the faces in the picture and face recognition algorithm against it</a:t>
+            </a:r>
+          </a:p>
+        </p:txBody>
+      </p:sp>
+    </p:spTree>
+    <p:extLst>
+      <p:ext uri="{BB962C8B-B14F-4D97-AF65-F5344CB8AC3E}">
+        <p14:creationId xmlns:p14="http://schemas.microsoft.com/office/powerpoint/2010/main" val="4184157174"/>
+      </p:ext>
+    </p:extLst>
+  </p:cSld>
+  <p:clrMapOvr>
+    <a:masterClrMapping/>
+  </p:clrMapOvr>
+</p:sld>
+</file>
+
+<file path=ppt/slides/slide26.xml><?xml version="1.0" encoding="utf-8"?>
+<p:sld xmlns:a="http://schemas.openxmlformats.org/drawingml/2006/main" xmlns:r="http://schemas.openxmlformats.org/officeDocument/2006/relationships" xmlns:p="http://schemas.openxmlformats.org/presentationml/2006/main">
+  <p:cSld>
+    <p:spTree>
+      <p:nvGrpSpPr>
+        <p:cNvPr id="1" name=""/>
+        <p:cNvGrpSpPr/>
+        <p:nvPr/>
+      </p:nvGrpSpPr>
+      <p:grpSpPr>
+        <a:xfrm>
+          <a:off x="0" y="0"/>
+          <a:ext cx="0" cy="0"/>
+          <a:chOff x="0" y="0"/>
+          <a:chExt cx="0" cy="0"/>
+        </a:xfrm>
+      </p:grpSpPr>
+      <p:sp>
+        <p:nvSpPr>
+          <p:cNvPr id="2" name="Title 1">
+            <a:extLst>
+              <a:ext uri="{FF2B5EF4-FFF2-40B4-BE49-F238E27FC236}">
+                <a16:creationId xmlns:a16="http://schemas.microsoft.com/office/drawing/2014/main" id="{F2D302F5-BC8A-4AFF-822A-323C9644CA4D}"/>
+              </a:ext>
+            </a:extLst>
+          </p:cNvPr>
+          <p:cNvSpPr>
+            <a:spLocks noGrp="1"/>
+          </p:cNvSpPr>
+          <p:nvPr>
+            <p:ph type="title"/>
+          </p:nvPr>
+        </p:nvSpPr>
+        <p:spPr/>
+        <p:txBody>
+          <a:bodyPr/>
+          <a:lstStyle/>
+          <a:p>
+            <a:r>
+              <a:rPr lang="en-US" dirty="0"/>
+              <a:t>3</a:t>
+            </a:r>
+            <a:r>
+              <a:rPr lang="en-US" baseline="30000" dirty="0"/>
+              <a:t>rd</a:t>
+            </a:r>
+            <a:r>
+              <a:rPr lang="en-US" dirty="0"/>
+              <a:t> Objective </a:t>
+            </a:r>
+          </a:p>
+        </p:txBody>
+      </p:sp>
+      <p:sp>
+        <p:nvSpPr>
+          <p:cNvPr id="3" name="Content Placeholder 2">
+            <a:extLst>
+              <a:ext uri="{FF2B5EF4-FFF2-40B4-BE49-F238E27FC236}">
+                <a16:creationId xmlns:a16="http://schemas.microsoft.com/office/drawing/2014/main" id="{D17D23C6-D4BE-4AB4-AF2A-24DE668C9867}"/>
+              </a:ext>
+            </a:extLst>
+          </p:cNvPr>
+          <p:cNvSpPr>
+            <a:spLocks noGrp="1"/>
+          </p:cNvSpPr>
+          <p:nvPr>
+            <p:ph idx="1"/>
+          </p:nvPr>
+        </p:nvSpPr>
+        <p:spPr/>
+        <p:txBody>
+          <a:bodyPr/>
+          <a:lstStyle/>
+          <a:p>
+            <a:r>
+              <a:rPr lang="en-US" dirty="0"/>
+              <a:t>Try different face detection algorithms </a:t>
+            </a:r>
+          </a:p>
+          <a:p>
+            <a:r>
+              <a:rPr lang="en-US" dirty="0"/>
+              <a:t>Select the algorithm which has lowest false negatives </a:t>
+            </a:r>
+          </a:p>
+          <a:p>
+            <a:r>
+              <a:rPr lang="en-US" dirty="0"/>
+              <a:t>Note down other metrics like </a:t>
+            </a:r>
+          </a:p>
+          <a:p>
+            <a:pPr lvl="1"/>
+            <a:r>
+              <a:rPr lang="en-US" dirty="0"/>
+              <a:t>The least dimension of the facial image that is required for the face detection algorithm </a:t>
+            </a:r>
+          </a:p>
+        </p:txBody>
+      </p:sp>
+    </p:spTree>
+    <p:extLst>
+      <p:ext uri="{BB962C8B-B14F-4D97-AF65-F5344CB8AC3E}">
+        <p14:creationId xmlns:p14="http://schemas.microsoft.com/office/powerpoint/2010/main" val="832009256"/>
+      </p:ext>
+    </p:extLst>
+  </p:cSld>
+  <p:clrMapOvr>
+    <a:masterClrMapping/>
+  </p:clrMapOvr>
+</p:sld>
+</file>
+
+<file path=ppt/slides/slide27.xml><?xml version="1.0" encoding="utf-8"?>
+<p:sld xmlns:a="http://schemas.openxmlformats.org/drawingml/2006/main" xmlns:r="http://schemas.openxmlformats.org/officeDocument/2006/relationships" xmlns:p="http://schemas.openxmlformats.org/presentationml/2006/main">
+  <p:cSld>
+    <p:spTree>
+      <p:nvGrpSpPr>
+        <p:cNvPr id="1" name=""/>
+        <p:cNvGrpSpPr/>
+        <p:nvPr/>
+      </p:nvGrpSpPr>
+      <p:grpSpPr>
+        <a:xfrm>
+          <a:off x="0" y="0"/>
+          <a:ext cx="0" cy="0"/>
+          <a:chOff x="0" y="0"/>
+          <a:chExt cx="0" cy="0"/>
+        </a:xfrm>
+      </p:grpSpPr>
+      <p:sp>
+        <p:nvSpPr>
+          <p:cNvPr id="2" name="Title 1">
+            <a:extLst>
+              <a:ext uri="{FF2B5EF4-FFF2-40B4-BE49-F238E27FC236}">
+                <a16:creationId xmlns:a16="http://schemas.microsoft.com/office/drawing/2014/main" id="{7B3117DA-016C-4D50-8E69-F0A6035C295D}"/>
+              </a:ext>
+            </a:extLst>
+          </p:cNvPr>
+          <p:cNvSpPr>
+            <a:spLocks noGrp="1"/>
+          </p:cNvSpPr>
+          <p:nvPr>
+            <p:ph type="title"/>
+          </p:nvPr>
+        </p:nvSpPr>
+        <p:spPr/>
+        <p:txBody>
+          <a:bodyPr/>
+          <a:lstStyle/>
+          <a:p>
+            <a:r>
+              <a:rPr lang="en-US" dirty="0"/>
+              <a:t>4</a:t>
+            </a:r>
+            <a:r>
+              <a:rPr lang="en-US" baseline="30000" dirty="0"/>
+              <a:t>th</a:t>
+            </a:r>
+            <a:r>
+              <a:rPr lang="en-US" dirty="0"/>
+              <a:t> Objective </a:t>
+            </a:r>
+          </a:p>
+        </p:txBody>
+      </p:sp>
+      <p:sp>
+        <p:nvSpPr>
+          <p:cNvPr id="3" name="Content Placeholder 2">
+            <a:extLst>
+              <a:ext uri="{FF2B5EF4-FFF2-40B4-BE49-F238E27FC236}">
+                <a16:creationId xmlns:a16="http://schemas.microsoft.com/office/drawing/2014/main" id="{F401B27B-1C13-462A-97F1-B320722D48BE}"/>
+              </a:ext>
+            </a:extLst>
+          </p:cNvPr>
+          <p:cNvSpPr>
+            <a:spLocks noGrp="1"/>
+          </p:cNvSpPr>
+          <p:nvPr>
+            <p:ph idx="1"/>
+          </p:nvPr>
+        </p:nvSpPr>
+        <p:spPr/>
+        <p:txBody>
+          <a:bodyPr/>
+          <a:lstStyle/>
+          <a:p>
+            <a:r>
+              <a:rPr lang="en-US" dirty="0"/>
+              <a:t>Design the camera position , the angle etc.</a:t>
+            </a:r>
+          </a:p>
+          <a:p>
+            <a:r>
+              <a:rPr lang="en-US" dirty="0"/>
+              <a:t>The algorithm that was decided on 3</a:t>
+            </a:r>
+            <a:r>
+              <a:rPr lang="en-US" baseline="30000" dirty="0"/>
+              <a:t>rd</a:t>
+            </a:r>
+            <a:r>
+              <a:rPr lang="en-US" dirty="0"/>
+              <a:t> objective to be used here to test  the camera angle and other metrics like finding how many persons can be covered</a:t>
+            </a:r>
+          </a:p>
+          <a:p>
+            <a:pPr marL="0" indent="0">
+              <a:buNone/>
+            </a:pPr>
+            <a:endParaRPr lang="en-US" dirty="0"/>
+          </a:p>
+          <a:p>
+            <a:endParaRPr lang="en-US" dirty="0"/>
+          </a:p>
+        </p:txBody>
+      </p:sp>
+    </p:spTree>
+    <p:extLst>
+      <p:ext uri="{BB962C8B-B14F-4D97-AF65-F5344CB8AC3E}">
+        <p14:creationId xmlns:p14="http://schemas.microsoft.com/office/powerpoint/2010/main" val="4146658703"/>
+      </p:ext>
+    </p:extLst>
+  </p:cSld>
+  <p:clrMapOvr>
+    <a:masterClrMapping/>
+  </p:clrMapOvr>
+</p:sld>
+</file>
+
+<file path=ppt/slides/slide28.xml><?xml version="1.0" encoding="utf-8"?>
+<p:sld xmlns:a="http://schemas.openxmlformats.org/drawingml/2006/main" xmlns:r="http://schemas.openxmlformats.org/officeDocument/2006/relationships" xmlns:p="http://schemas.openxmlformats.org/presentationml/2006/main">
+  <p:cSld>
+    <p:spTree>
+      <p:nvGrpSpPr>
+        <p:cNvPr id="1" name=""/>
+        <p:cNvGrpSpPr/>
+        <p:nvPr/>
+      </p:nvGrpSpPr>
+      <p:grpSpPr>
+        <a:xfrm>
+          <a:off x="0" y="0"/>
+          <a:ext cx="0" cy="0"/>
+          <a:chOff x="0" y="0"/>
+          <a:chExt cx="0" cy="0"/>
+        </a:xfrm>
+      </p:grpSpPr>
+      <p:sp>
+        <p:nvSpPr>
+          <p:cNvPr id="2" name="Title 1">
+            <a:extLst>
+              <a:ext uri="{FF2B5EF4-FFF2-40B4-BE49-F238E27FC236}">
+                <a16:creationId xmlns:a16="http://schemas.microsoft.com/office/drawing/2014/main" id="{BF705B5D-60D1-4F70-A1E3-8318785F6C75}"/>
+              </a:ext>
+            </a:extLst>
+          </p:cNvPr>
+          <p:cNvSpPr>
+            <a:spLocks noGrp="1"/>
+          </p:cNvSpPr>
+          <p:nvPr>
+            <p:ph type="title"/>
+          </p:nvPr>
+        </p:nvSpPr>
+        <p:spPr/>
+        <p:txBody>
+          <a:bodyPr/>
+          <a:lstStyle/>
+          <a:p>
+            <a:r>
+              <a:rPr lang="en-US" dirty="0"/>
+              <a:t>5</a:t>
+            </a:r>
+            <a:r>
+              <a:rPr lang="en-US" baseline="30000" dirty="0"/>
+              <a:t>th</a:t>
+            </a:r>
+            <a:r>
+              <a:rPr lang="en-US" dirty="0"/>
+              <a:t> objective </a:t>
+            </a:r>
+          </a:p>
+        </p:txBody>
+      </p:sp>
+      <p:sp>
+        <p:nvSpPr>
+          <p:cNvPr id="3" name="Content Placeholder 2">
+            <a:extLst>
+              <a:ext uri="{FF2B5EF4-FFF2-40B4-BE49-F238E27FC236}">
+                <a16:creationId xmlns:a16="http://schemas.microsoft.com/office/drawing/2014/main" id="{5CC9FC1D-AD0E-4548-B97F-C2126D943F45}"/>
+              </a:ext>
+            </a:extLst>
+          </p:cNvPr>
+          <p:cNvSpPr>
+            <a:spLocks noGrp="1"/>
+          </p:cNvSpPr>
+          <p:nvPr>
+            <p:ph idx="1"/>
+          </p:nvPr>
+        </p:nvSpPr>
+        <p:spPr/>
+        <p:txBody>
+          <a:bodyPr/>
+          <a:lstStyle/>
+          <a:p>
+            <a:r>
+              <a:rPr lang="en-US" dirty="0"/>
+              <a:t>Find the best camera angle and algorithm (both face detection and face recognition) that has reduced false negatives, is fast </a:t>
+            </a:r>
+            <a:r>
+              <a:rPr lang="en-US" dirty="0" err="1"/>
+              <a:t>etc</a:t>
+            </a:r>
+            <a:r>
+              <a:rPr lang="en-US" dirty="0"/>
+              <a:t> </a:t>
+            </a:r>
+          </a:p>
+          <a:p>
+            <a:r>
+              <a:rPr lang="en-US" dirty="0"/>
+              <a:t>Iterate through 3 and 4 objective to find the best combination of camera and algorithm</a:t>
+            </a:r>
+          </a:p>
+        </p:txBody>
+      </p:sp>
+    </p:spTree>
+    <p:extLst>
+      <p:ext uri="{BB962C8B-B14F-4D97-AF65-F5344CB8AC3E}">
+        <p14:creationId xmlns:p14="http://schemas.microsoft.com/office/powerpoint/2010/main" val="1891443787"/>
+      </p:ext>
+    </p:extLst>
+  </p:cSld>
+  <p:clrMapOvr>
+    <a:masterClrMapping/>
+  </p:clrMapOvr>
+</p:sld>
+</file>
+
+<file path=ppt/slides/slide29.xml><?xml version="1.0" encoding="utf-8"?>
+<p:sld xmlns:a="http://schemas.openxmlformats.org/drawingml/2006/main" xmlns:r="http://schemas.openxmlformats.org/officeDocument/2006/relationships" xmlns:p="http://schemas.openxmlformats.org/presentationml/2006/main">
+  <p:cSld>
+    <p:spTree>
+      <p:nvGrpSpPr>
+        <p:cNvPr id="1" name=""/>
+        <p:cNvGrpSpPr/>
+        <p:nvPr/>
+      </p:nvGrpSpPr>
+      <p:grpSpPr>
+        <a:xfrm>
+          <a:off x="0" y="0"/>
+          <a:ext cx="0" cy="0"/>
+          <a:chOff x="0" y="0"/>
+          <a:chExt cx="0" cy="0"/>
+        </a:xfrm>
+      </p:grpSpPr>
+      <p:sp>
+        <p:nvSpPr>
+          <p:cNvPr id="2" name="Title 1">
+            <a:extLst>
+              <a:ext uri="{FF2B5EF4-FFF2-40B4-BE49-F238E27FC236}">
+                <a16:creationId xmlns:a16="http://schemas.microsoft.com/office/drawing/2014/main" id="{04D1FA27-C5C7-4A78-A1F2-5CE87A8F6E0F}"/>
+              </a:ext>
+            </a:extLst>
+          </p:cNvPr>
+          <p:cNvSpPr>
+            <a:spLocks noGrp="1"/>
+          </p:cNvSpPr>
+          <p:nvPr>
+            <p:ph type="title"/>
+          </p:nvPr>
+        </p:nvSpPr>
+        <p:spPr>
+          <a:xfrm>
+            <a:off x="838199" y="365125"/>
+            <a:ext cx="10916265" cy="6212656"/>
+          </a:xfrm>
+        </p:spPr>
+        <p:txBody>
+          <a:bodyPr>
+            <a:normAutofit/>
+          </a:bodyPr>
+          <a:lstStyle/>
+          <a:p>
+            <a:r>
+              <a:rPr lang="en-US" sz="10000" dirty="0"/>
+              <a:t>Constraints</a:t>
+            </a:r>
+          </a:p>
+        </p:txBody>
+      </p:sp>
+    </p:spTree>
+    <p:extLst>
+      <p:ext uri="{BB962C8B-B14F-4D97-AF65-F5344CB8AC3E}">
+        <p14:creationId xmlns:p14="http://schemas.microsoft.com/office/powerpoint/2010/main" val="100912058"/>
       </p:ext>
     </p:extLst>
   </p:cSld>
@@ -5381,6 +6465,609 @@
     <p:extLst>
       <p:ext uri="{BB962C8B-B14F-4D97-AF65-F5344CB8AC3E}">
         <p14:creationId xmlns:p14="http://schemas.microsoft.com/office/powerpoint/2010/main" val="1188469120"/>
+      </p:ext>
+    </p:extLst>
+  </p:cSld>
+  <p:clrMapOvr>
+    <a:masterClrMapping/>
+  </p:clrMapOvr>
+</p:sld>
+</file>
+
+<file path=ppt/slides/slide30.xml><?xml version="1.0" encoding="utf-8"?>
+<p:sld xmlns:a="http://schemas.openxmlformats.org/drawingml/2006/main" xmlns:r="http://schemas.openxmlformats.org/officeDocument/2006/relationships" xmlns:p="http://schemas.openxmlformats.org/presentationml/2006/main">
+  <p:cSld>
+    <p:spTree>
+      <p:nvGrpSpPr>
+        <p:cNvPr id="1" name=""/>
+        <p:cNvGrpSpPr/>
+        <p:nvPr/>
+      </p:nvGrpSpPr>
+      <p:grpSpPr>
+        <a:xfrm>
+          <a:off x="0" y="0"/>
+          <a:ext cx="0" cy="0"/>
+          <a:chOff x="0" y="0"/>
+          <a:chExt cx="0" cy="0"/>
+        </a:xfrm>
+      </p:grpSpPr>
+      <p:sp>
+        <p:nvSpPr>
+          <p:cNvPr id="2" name="Title 1">
+            <a:extLst>
+              <a:ext uri="{FF2B5EF4-FFF2-40B4-BE49-F238E27FC236}">
+                <a16:creationId xmlns:a16="http://schemas.microsoft.com/office/drawing/2014/main" id="{CAA8DF6D-B878-48A2-AF9C-E1E9CE8F9F99}"/>
+              </a:ext>
+            </a:extLst>
+          </p:cNvPr>
+          <p:cNvSpPr>
+            <a:spLocks noGrp="1"/>
+          </p:cNvSpPr>
+          <p:nvPr>
+            <p:ph type="title"/>
+          </p:nvPr>
+        </p:nvSpPr>
+        <p:spPr/>
+        <p:txBody>
+          <a:bodyPr/>
+          <a:lstStyle/>
+          <a:p>
+            <a:r>
+              <a:rPr lang="en-US" dirty="0"/>
+              <a:t>Camera</a:t>
+            </a:r>
+          </a:p>
+        </p:txBody>
+      </p:sp>
+      <p:sp>
+        <p:nvSpPr>
+          <p:cNvPr id="3" name="Content Placeholder 2">
+            <a:extLst>
+              <a:ext uri="{FF2B5EF4-FFF2-40B4-BE49-F238E27FC236}">
+                <a16:creationId xmlns:a16="http://schemas.microsoft.com/office/drawing/2014/main" id="{2CDDB82C-21AD-4ED1-A86F-6DE6E32A675D}"/>
+              </a:ext>
+            </a:extLst>
+          </p:cNvPr>
+          <p:cNvSpPr>
+            <a:spLocks noGrp="1"/>
+          </p:cNvSpPr>
+          <p:nvPr>
+            <p:ph idx="1"/>
+          </p:nvPr>
+        </p:nvSpPr>
+        <p:spPr/>
+        <p:txBody>
+          <a:bodyPr/>
+          <a:lstStyle/>
+          <a:p>
+            <a:r>
+              <a:rPr lang="en-US" dirty="0"/>
+              <a:t>Proper lighting should be there</a:t>
+            </a:r>
+          </a:p>
+          <a:p>
+            <a:r>
+              <a:rPr lang="en-US" dirty="0"/>
+              <a:t>The position of camera should not be changed as it is fixed (depends on the algorithm )</a:t>
+            </a:r>
+          </a:p>
+          <a:p>
+            <a:r>
+              <a:rPr lang="en-US" dirty="0"/>
+              <a:t>As when the distance increases we will reduce the image resolution of detected face</a:t>
+            </a:r>
+          </a:p>
+          <a:p>
+            <a:pPr marL="0" indent="0">
+              <a:buNone/>
+            </a:pPr>
+            <a:endParaRPr lang="en-US" dirty="0"/>
+          </a:p>
+        </p:txBody>
+      </p:sp>
+    </p:spTree>
+    <p:extLst>
+      <p:ext uri="{BB962C8B-B14F-4D97-AF65-F5344CB8AC3E}">
+        <p14:creationId xmlns:p14="http://schemas.microsoft.com/office/powerpoint/2010/main" val="3009879419"/>
+      </p:ext>
+    </p:extLst>
+  </p:cSld>
+  <p:clrMapOvr>
+    <a:masterClrMapping/>
+  </p:clrMapOvr>
+</p:sld>
+</file>
+
+<file path=ppt/slides/slide31.xml><?xml version="1.0" encoding="utf-8"?>
+<p:sld xmlns:a="http://schemas.openxmlformats.org/drawingml/2006/main" xmlns:r="http://schemas.openxmlformats.org/officeDocument/2006/relationships" xmlns:p="http://schemas.openxmlformats.org/presentationml/2006/main">
+  <p:cSld>
+    <p:spTree>
+      <p:nvGrpSpPr>
+        <p:cNvPr id="1" name=""/>
+        <p:cNvGrpSpPr/>
+        <p:nvPr/>
+      </p:nvGrpSpPr>
+      <p:grpSpPr>
+        <a:xfrm>
+          <a:off x="0" y="0"/>
+          <a:ext cx="0" cy="0"/>
+          <a:chOff x="0" y="0"/>
+          <a:chExt cx="0" cy="0"/>
+        </a:xfrm>
+      </p:grpSpPr>
+      <p:sp>
+        <p:nvSpPr>
+          <p:cNvPr id="2" name="Title 1">
+            <a:extLst>
+              <a:ext uri="{FF2B5EF4-FFF2-40B4-BE49-F238E27FC236}">
+                <a16:creationId xmlns:a16="http://schemas.microsoft.com/office/drawing/2014/main" id="{9D6D73AC-0356-4B99-832F-31B3CE95398C}"/>
+              </a:ext>
+            </a:extLst>
+          </p:cNvPr>
+          <p:cNvSpPr>
+            <a:spLocks noGrp="1"/>
+          </p:cNvSpPr>
+          <p:nvPr>
+            <p:ph type="title"/>
+          </p:nvPr>
+        </p:nvSpPr>
+        <p:spPr/>
+        <p:txBody>
+          <a:bodyPr/>
+          <a:lstStyle/>
+          <a:p>
+            <a:r>
+              <a:rPr lang="en-US" dirty="0"/>
+              <a:t>Face detection and recognition</a:t>
+            </a:r>
+          </a:p>
+        </p:txBody>
+      </p:sp>
+      <p:sp>
+        <p:nvSpPr>
+          <p:cNvPr id="3" name="Content Placeholder 2">
+            <a:extLst>
+              <a:ext uri="{FF2B5EF4-FFF2-40B4-BE49-F238E27FC236}">
+                <a16:creationId xmlns:a16="http://schemas.microsoft.com/office/drawing/2014/main" id="{F5F812ED-8D69-4469-AE75-A350758C8F21}"/>
+              </a:ext>
+            </a:extLst>
+          </p:cNvPr>
+          <p:cNvSpPr>
+            <a:spLocks noGrp="1"/>
+          </p:cNvSpPr>
+          <p:nvPr>
+            <p:ph idx="1"/>
+          </p:nvPr>
+        </p:nvSpPr>
+        <p:spPr/>
+        <p:txBody>
+          <a:bodyPr/>
+          <a:lstStyle/>
+          <a:p>
+            <a:r>
+              <a:rPr lang="en-US" dirty="0"/>
+              <a:t>The face or faces should not be covered </a:t>
+            </a:r>
+          </a:p>
+          <a:p>
+            <a:r>
+              <a:rPr lang="en-US" dirty="0"/>
+              <a:t>There is a maximum distance till which a student can sit for the camera to detect the face beyond that facial recognition wont work</a:t>
+            </a:r>
+          </a:p>
+          <a:p>
+            <a:r>
+              <a:rPr lang="en-US" dirty="0"/>
+              <a:t>When the photo is taken if he/she covers their face then the algorithm can miss the attendance of the person in that time frame</a:t>
+            </a:r>
+          </a:p>
+          <a:p>
+            <a:r>
+              <a:rPr lang="en-US" dirty="0"/>
+              <a:t>If physical characteristics of people change over time — if they gain weight, lose their hair, grow a beard or start wearing glasses, it is tough for face recognition</a:t>
+            </a:r>
+          </a:p>
+        </p:txBody>
+      </p:sp>
+    </p:spTree>
+    <p:extLst>
+      <p:ext uri="{BB962C8B-B14F-4D97-AF65-F5344CB8AC3E}">
+        <p14:creationId xmlns:p14="http://schemas.microsoft.com/office/powerpoint/2010/main" val="530119667"/>
+      </p:ext>
+    </p:extLst>
+  </p:cSld>
+  <p:clrMapOvr>
+    <a:masterClrMapping/>
+  </p:clrMapOvr>
+</p:sld>
+</file>
+
+<file path=ppt/slides/slide32.xml><?xml version="1.0" encoding="utf-8"?>
+<p:sld xmlns:a="http://schemas.openxmlformats.org/drawingml/2006/main" xmlns:r="http://schemas.openxmlformats.org/officeDocument/2006/relationships" xmlns:p="http://schemas.openxmlformats.org/presentationml/2006/main">
+  <p:cSld>
+    <p:spTree>
+      <p:nvGrpSpPr>
+        <p:cNvPr id="1" name=""/>
+        <p:cNvGrpSpPr/>
+        <p:nvPr/>
+      </p:nvGrpSpPr>
+      <p:grpSpPr>
+        <a:xfrm>
+          <a:off x="0" y="0"/>
+          <a:ext cx="0" cy="0"/>
+          <a:chOff x="0" y="0"/>
+          <a:chExt cx="0" cy="0"/>
+        </a:xfrm>
+      </p:grpSpPr>
+      <p:sp>
+        <p:nvSpPr>
+          <p:cNvPr id="2" name="Title 1">
+            <a:extLst>
+              <a:ext uri="{FF2B5EF4-FFF2-40B4-BE49-F238E27FC236}">
+                <a16:creationId xmlns:a16="http://schemas.microsoft.com/office/drawing/2014/main" id="{68154D5F-4656-401F-9EC3-506C78D8CE01}"/>
+              </a:ext>
+            </a:extLst>
+          </p:cNvPr>
+          <p:cNvSpPr>
+            <a:spLocks noGrp="1"/>
+          </p:cNvSpPr>
+          <p:nvPr>
+            <p:ph type="title"/>
+          </p:nvPr>
+        </p:nvSpPr>
+        <p:spPr>
+          <a:xfrm>
+            <a:off x="838200" y="365125"/>
+            <a:ext cx="10577052" cy="6035675"/>
+          </a:xfrm>
+        </p:spPr>
+        <p:txBody>
+          <a:bodyPr>
+            <a:normAutofit/>
+          </a:bodyPr>
+          <a:lstStyle/>
+          <a:p>
+            <a:r>
+              <a:rPr lang="en-US" sz="10000" dirty="0"/>
+              <a:t>Conceptual Design</a:t>
+            </a:r>
+          </a:p>
+        </p:txBody>
+      </p:sp>
+    </p:spTree>
+    <p:extLst>
+      <p:ext uri="{BB962C8B-B14F-4D97-AF65-F5344CB8AC3E}">
+        <p14:creationId xmlns:p14="http://schemas.microsoft.com/office/powerpoint/2010/main" val="430654066"/>
+      </p:ext>
+    </p:extLst>
+  </p:cSld>
+  <p:clrMapOvr>
+    <a:masterClrMapping/>
+  </p:clrMapOvr>
+</p:sld>
+</file>
+
+<file path=ppt/slides/slide33.xml><?xml version="1.0" encoding="utf-8"?>
+<p:sld xmlns:a="http://schemas.openxmlformats.org/drawingml/2006/main" xmlns:r="http://schemas.openxmlformats.org/officeDocument/2006/relationships" xmlns:p="http://schemas.openxmlformats.org/presentationml/2006/main">
+  <p:cSld>
+    <p:spTree>
+      <p:nvGrpSpPr>
+        <p:cNvPr id="1" name=""/>
+        <p:cNvGrpSpPr/>
+        <p:nvPr/>
+      </p:nvGrpSpPr>
+      <p:grpSpPr>
+        <a:xfrm>
+          <a:off x="0" y="0"/>
+          <a:ext cx="0" cy="0"/>
+          <a:chOff x="0" y="0"/>
+          <a:chExt cx="0" cy="0"/>
+        </a:xfrm>
+      </p:grpSpPr>
+      <p:sp>
+        <p:nvSpPr>
+          <p:cNvPr id="2" name="Title 1">
+            <a:extLst>
+              <a:ext uri="{FF2B5EF4-FFF2-40B4-BE49-F238E27FC236}">
+                <a16:creationId xmlns:a16="http://schemas.microsoft.com/office/drawing/2014/main" id="{7C2D85A2-03C7-4068-9742-7DFB61A47545}"/>
+              </a:ext>
+            </a:extLst>
+          </p:cNvPr>
+          <p:cNvSpPr>
+            <a:spLocks noGrp="1"/>
+          </p:cNvSpPr>
+          <p:nvPr>
+            <p:ph type="title"/>
+          </p:nvPr>
+        </p:nvSpPr>
+        <p:spPr/>
+        <p:txBody>
+          <a:bodyPr/>
+          <a:lstStyle/>
+          <a:p>
+            <a:r>
+              <a:rPr lang="en-US" dirty="0"/>
+              <a:t>3 questions </a:t>
+            </a:r>
+          </a:p>
+        </p:txBody>
+      </p:sp>
+      <p:sp>
+        <p:nvSpPr>
+          <p:cNvPr id="3" name="Content Placeholder 2">
+            <a:extLst>
+              <a:ext uri="{FF2B5EF4-FFF2-40B4-BE49-F238E27FC236}">
+                <a16:creationId xmlns:a16="http://schemas.microsoft.com/office/drawing/2014/main" id="{F8DB19DF-261D-4C86-A8C8-BB98DB26384D}"/>
+              </a:ext>
+            </a:extLst>
+          </p:cNvPr>
+          <p:cNvSpPr>
+            <a:spLocks noGrp="1"/>
+          </p:cNvSpPr>
+          <p:nvPr>
+            <p:ph idx="1"/>
+          </p:nvPr>
+        </p:nvSpPr>
+        <p:spPr/>
+        <p:txBody>
+          <a:bodyPr/>
+          <a:lstStyle/>
+          <a:p>
+            <a:r>
+              <a:rPr lang="en-US" dirty="0"/>
+              <a:t>What are the needs</a:t>
+            </a:r>
+          </a:p>
+          <a:p>
+            <a:pPr lvl="1"/>
+            <a:r>
+              <a:rPr lang="en-US" dirty="0"/>
+              <a:t>A reliable system which identifies which student is present in the classroom and gives the attendance based on his presence </a:t>
+            </a:r>
+          </a:p>
+          <a:p>
+            <a:r>
+              <a:rPr lang="en-US" dirty="0"/>
+              <a:t>How can the needs be met </a:t>
+            </a:r>
+          </a:p>
+          <a:p>
+            <a:pPr lvl="1"/>
+            <a:r>
+              <a:rPr lang="en-US" dirty="0"/>
+              <a:t>uses a camera that takes photo of a group of students, and then uses facial recognition for marking attendance for a student</a:t>
+            </a:r>
+          </a:p>
+          <a:p>
+            <a:r>
+              <a:rPr lang="en-US" dirty="0"/>
+              <a:t>How well the needs are met</a:t>
+            </a:r>
+          </a:p>
+          <a:p>
+            <a:pPr lvl="1"/>
+            <a:r>
+              <a:rPr lang="en-US" dirty="0"/>
+              <a:t>found that facial recognition overcomes some of the problems that exist in the previously mentioned bio metric attendance systems subjected to the constraints mentioned in the previous slides</a:t>
+            </a:r>
+          </a:p>
+          <a:p>
+            <a:pPr lvl="1"/>
+            <a:endParaRPr lang="en-US" dirty="0"/>
+          </a:p>
+          <a:p>
+            <a:pPr lvl="1"/>
+            <a:endParaRPr lang="en-US" dirty="0"/>
+          </a:p>
+          <a:p>
+            <a:pPr lvl="1"/>
+            <a:endParaRPr lang="en-US" dirty="0"/>
+          </a:p>
+        </p:txBody>
+      </p:sp>
+    </p:spTree>
+    <p:extLst>
+      <p:ext uri="{BB962C8B-B14F-4D97-AF65-F5344CB8AC3E}">
+        <p14:creationId xmlns:p14="http://schemas.microsoft.com/office/powerpoint/2010/main" val="1396136375"/>
+      </p:ext>
+    </p:extLst>
+  </p:cSld>
+  <p:clrMapOvr>
+    <a:masterClrMapping/>
+  </p:clrMapOvr>
+</p:sld>
+</file>
+
+<file path=ppt/slides/slide34.xml><?xml version="1.0" encoding="utf-8"?>
+<p:sld xmlns:a="http://schemas.openxmlformats.org/drawingml/2006/main" xmlns:r="http://schemas.openxmlformats.org/officeDocument/2006/relationships" xmlns:p="http://schemas.openxmlformats.org/presentationml/2006/main">
+  <p:cSld>
+    <p:spTree>
+      <p:nvGrpSpPr>
+        <p:cNvPr id="1" name=""/>
+        <p:cNvGrpSpPr/>
+        <p:nvPr/>
+      </p:nvGrpSpPr>
+      <p:grpSpPr>
+        <a:xfrm>
+          <a:off x="0" y="0"/>
+          <a:ext cx="0" cy="0"/>
+          <a:chOff x="0" y="0"/>
+          <a:chExt cx="0" cy="0"/>
+        </a:xfrm>
+      </p:grpSpPr>
+      <p:sp>
+        <p:nvSpPr>
+          <p:cNvPr id="2" name="Title 1">
+            <a:extLst>
+              <a:ext uri="{FF2B5EF4-FFF2-40B4-BE49-F238E27FC236}">
+                <a16:creationId xmlns:a16="http://schemas.microsoft.com/office/drawing/2014/main" id="{588D848A-DDE7-4672-BFE8-B0DB5EF30929}"/>
+              </a:ext>
+            </a:extLst>
+          </p:cNvPr>
+          <p:cNvSpPr>
+            <a:spLocks noGrp="1"/>
+          </p:cNvSpPr>
+          <p:nvPr>
+            <p:ph type="title"/>
+          </p:nvPr>
+        </p:nvSpPr>
+        <p:spPr>
+          <a:xfrm>
+            <a:off x="838200" y="365125"/>
+            <a:ext cx="11034252" cy="5947185"/>
+          </a:xfrm>
+        </p:spPr>
+        <p:txBody>
+          <a:bodyPr>
+            <a:normAutofit/>
+          </a:bodyPr>
+          <a:lstStyle/>
+          <a:p>
+            <a:r>
+              <a:rPr lang="en-US" sz="8000" dirty="0"/>
+              <a:t>A basic block diagram </a:t>
+            </a:r>
+          </a:p>
+        </p:txBody>
+      </p:sp>
+    </p:spTree>
+    <p:extLst>
+      <p:ext uri="{BB962C8B-B14F-4D97-AF65-F5344CB8AC3E}">
+        <p14:creationId xmlns:p14="http://schemas.microsoft.com/office/powerpoint/2010/main" val="426059571"/>
+      </p:ext>
+    </p:extLst>
+  </p:cSld>
+  <p:clrMapOvr>
+    <a:masterClrMapping/>
+  </p:clrMapOvr>
+</p:sld>
+</file>
+
+<file path=ppt/slides/slide35.xml><?xml version="1.0" encoding="utf-8"?>
+<p:sld xmlns:a="http://schemas.openxmlformats.org/drawingml/2006/main" xmlns:r="http://schemas.openxmlformats.org/officeDocument/2006/relationships" xmlns:p="http://schemas.openxmlformats.org/presentationml/2006/main">
+  <p:cSld>
+    <p:spTree>
+      <p:nvGrpSpPr>
+        <p:cNvPr id="1" name=""/>
+        <p:cNvGrpSpPr/>
+        <p:nvPr/>
+      </p:nvGrpSpPr>
+      <p:grpSpPr>
+        <a:xfrm>
+          <a:off x="0" y="0"/>
+          <a:ext cx="0" cy="0"/>
+          <a:chOff x="0" y="0"/>
+          <a:chExt cx="0" cy="0"/>
+        </a:xfrm>
+      </p:grpSpPr>
+      <p:pic>
+        <p:nvPicPr>
+          <p:cNvPr id="5" name="Picture 4">
+            <a:extLst>
+              <a:ext uri="{FF2B5EF4-FFF2-40B4-BE49-F238E27FC236}">
+                <a16:creationId xmlns:a16="http://schemas.microsoft.com/office/drawing/2014/main" id="{22866D99-51B5-44EF-AF42-18ABE4E1C35C}"/>
+              </a:ext>
+            </a:extLst>
+          </p:cNvPr>
+          <p:cNvPicPr>
+            <a:picLocks noChangeAspect="1"/>
+          </p:cNvPicPr>
+          <p:nvPr/>
+        </p:nvPicPr>
+        <p:blipFill>
+          <a:blip r:embed="rId3">
+            <a:extLst>
+              <a:ext uri="{28A0092B-C50C-407E-A947-70E740481C1C}">
+                <a14:useLocalDpi xmlns:a14="http://schemas.microsoft.com/office/drawing/2010/main" val="0"/>
+              </a:ext>
+            </a:extLst>
+          </a:blip>
+          <a:stretch>
+            <a:fillRect/>
+          </a:stretch>
+        </p:blipFill>
+        <p:spPr>
+          <a:xfrm>
+            <a:off x="2240678" y="0"/>
+            <a:ext cx="7710644" cy="6624638"/>
+          </a:xfrm>
+          <a:prstGeom prst="rect">
+            <a:avLst/>
+          </a:prstGeom>
+        </p:spPr>
+      </p:pic>
+    </p:spTree>
+    <p:extLst>
+      <p:ext uri="{BB962C8B-B14F-4D97-AF65-F5344CB8AC3E}">
+        <p14:creationId xmlns:p14="http://schemas.microsoft.com/office/powerpoint/2010/main" val="1671273814"/>
+      </p:ext>
+    </p:extLst>
+  </p:cSld>
+  <p:clrMapOvr>
+    <a:masterClrMapping/>
+  </p:clrMapOvr>
+</p:sld>
+</file>
+
+<file path=ppt/slides/slide36.xml><?xml version="1.0" encoding="utf-8"?>
+<p:sld xmlns:a="http://schemas.openxmlformats.org/drawingml/2006/main" xmlns:r="http://schemas.openxmlformats.org/officeDocument/2006/relationships" xmlns:p="http://schemas.openxmlformats.org/presentationml/2006/main">
+  <p:cSld>
+    <p:spTree>
+      <p:nvGrpSpPr>
+        <p:cNvPr id="1" name=""/>
+        <p:cNvGrpSpPr/>
+        <p:nvPr/>
+      </p:nvGrpSpPr>
+      <p:grpSpPr>
+        <a:xfrm>
+          <a:off x="0" y="0"/>
+          <a:ext cx="0" cy="0"/>
+          <a:chOff x="0" y="0"/>
+          <a:chExt cx="0" cy="0"/>
+        </a:xfrm>
+      </p:grpSpPr>
+      <p:sp>
+        <p:nvSpPr>
+          <p:cNvPr id="2" name="Title 1">
+            <a:extLst>
+              <a:ext uri="{FF2B5EF4-FFF2-40B4-BE49-F238E27FC236}">
+                <a16:creationId xmlns:a16="http://schemas.microsoft.com/office/drawing/2014/main" id="{884BA7A0-6FBF-4334-AE18-16F7C8EAE5C5}"/>
+              </a:ext>
+            </a:extLst>
+          </p:cNvPr>
+          <p:cNvSpPr>
+            <a:spLocks noGrp="1"/>
+          </p:cNvSpPr>
+          <p:nvPr>
+            <p:ph type="title"/>
+          </p:nvPr>
+        </p:nvSpPr>
+        <p:spPr>
+          <a:xfrm>
+            <a:off x="838200" y="576141"/>
+            <a:ext cx="10515600" cy="6091946"/>
+          </a:xfrm>
+        </p:spPr>
+        <p:txBody>
+          <a:bodyPr>
+            <a:noAutofit/>
+          </a:bodyPr>
+          <a:lstStyle/>
+          <a:p>
+            <a:br>
+              <a:rPr lang="en-US" sz="15000" dirty="0"/>
+            </a:br>
+            <a:r>
+              <a:rPr lang="en-US" sz="15000" dirty="0"/>
+              <a:t>Thank You</a:t>
+            </a:r>
+          </a:p>
+        </p:txBody>
+      </p:sp>
+    </p:spTree>
+    <p:extLst>
+      <p:ext uri="{BB962C8B-B14F-4D97-AF65-F5344CB8AC3E}">
+        <p14:creationId xmlns:p14="http://schemas.microsoft.com/office/powerpoint/2010/main" val="1880208882"/>
       </p:ext>
     </p:extLst>
   </p:cSld>

</xml_diff>

<commit_message>
Addded Financial cost slides with edited the original content
</commit_message>
<xml_diff>
--- a/DOCS/PPT's/Problem statement.pptx
+++ b/DOCS/PPT's/Problem statement.pptx
@@ -5,45 +5,48 @@
     <p:sldMasterId id="2147483731" r:id="rId1"/>
   </p:sldMasterIdLst>
   <p:notesMasterIdLst>
-    <p:notesMasterId r:id="rId38"/>
+    <p:notesMasterId r:id="rId41"/>
   </p:notesMasterIdLst>
   <p:sldIdLst>
     <p:sldId id="256" r:id="rId2"/>
     <p:sldId id="257" r:id="rId3"/>
     <p:sldId id="260" r:id="rId4"/>
-    <p:sldId id="261" r:id="rId5"/>
+    <p:sldId id="297" r:id="rId5"/>
     <p:sldId id="262" r:id="rId6"/>
-    <p:sldId id="263" r:id="rId7"/>
-    <p:sldId id="265" r:id="rId8"/>
-    <p:sldId id="258" r:id="rId9"/>
-    <p:sldId id="269" r:id="rId10"/>
-    <p:sldId id="266" r:id="rId11"/>
-    <p:sldId id="270" r:id="rId12"/>
-    <p:sldId id="276" r:id="rId13"/>
-    <p:sldId id="271" r:id="rId14"/>
-    <p:sldId id="272" r:id="rId15"/>
-    <p:sldId id="273" r:id="rId16"/>
-    <p:sldId id="293" r:id="rId17"/>
-    <p:sldId id="274" r:id="rId18"/>
-    <p:sldId id="275" r:id="rId19"/>
-    <p:sldId id="277" r:id="rId20"/>
-    <p:sldId id="278" r:id="rId21"/>
-    <p:sldId id="279" r:id="rId22"/>
-    <p:sldId id="280" r:id="rId23"/>
-    <p:sldId id="281" r:id="rId24"/>
-    <p:sldId id="283" r:id="rId25"/>
-    <p:sldId id="284" r:id="rId26"/>
-    <p:sldId id="285" r:id="rId27"/>
-    <p:sldId id="286" r:id="rId28"/>
-    <p:sldId id="287" r:id="rId29"/>
-    <p:sldId id="282" r:id="rId30"/>
-    <p:sldId id="288" r:id="rId31"/>
-    <p:sldId id="289" r:id="rId32"/>
-    <p:sldId id="290" r:id="rId33"/>
-    <p:sldId id="292" r:id="rId34"/>
-    <p:sldId id="294" r:id="rId35"/>
-    <p:sldId id="291" r:id="rId36"/>
-    <p:sldId id="268" r:id="rId37"/>
+    <p:sldId id="258" r:id="rId7"/>
+    <p:sldId id="269" r:id="rId8"/>
+    <p:sldId id="270" r:id="rId9"/>
+    <p:sldId id="276" r:id="rId10"/>
+    <p:sldId id="271" r:id="rId11"/>
+    <p:sldId id="272" r:id="rId12"/>
+    <p:sldId id="273" r:id="rId13"/>
+    <p:sldId id="293" r:id="rId14"/>
+    <p:sldId id="274" r:id="rId15"/>
+    <p:sldId id="275" r:id="rId16"/>
+    <p:sldId id="277" r:id="rId17"/>
+    <p:sldId id="278" r:id="rId18"/>
+    <p:sldId id="279" r:id="rId19"/>
+    <p:sldId id="280" r:id="rId20"/>
+    <p:sldId id="281" r:id="rId21"/>
+    <p:sldId id="283" r:id="rId22"/>
+    <p:sldId id="284" r:id="rId23"/>
+    <p:sldId id="285" r:id="rId24"/>
+    <p:sldId id="286" r:id="rId25"/>
+    <p:sldId id="287" r:id="rId26"/>
+    <p:sldId id="282" r:id="rId27"/>
+    <p:sldId id="288" r:id="rId28"/>
+    <p:sldId id="289" r:id="rId29"/>
+    <p:sldId id="290" r:id="rId30"/>
+    <p:sldId id="292" r:id="rId31"/>
+    <p:sldId id="294" r:id="rId32"/>
+    <p:sldId id="291" r:id="rId33"/>
+    <p:sldId id="302" r:id="rId34"/>
+    <p:sldId id="298" r:id="rId35"/>
+    <p:sldId id="300" r:id="rId36"/>
+    <p:sldId id="301" r:id="rId37"/>
+    <p:sldId id="295" r:id="rId38"/>
+    <p:sldId id="303" r:id="rId39"/>
+    <p:sldId id="268" r:id="rId40"/>
   </p:sldIdLst>
   <p:sldSz cx="12192000" cy="6858000"/>
   <p:notesSz cx="6858000" cy="9144000"/>
@@ -232,7 +235,7 @@
           <a:p>
             <a:fld id="{0BF09A51-2706-4120-AE06-4F74D3241115}" type="datetimeFigureOut">
               <a:rPr lang="en-US" smtClean="0"/>
-              <a:t>10/25/2020</a:t>
+              <a:t>11/23/2020</a:t>
             </a:fld>
             <a:endParaRPr lang="en-US"/>
           </a:p>
@@ -564,7 +567,7 @@
           <a:p>
             <a:fld id="{7FF964DC-1A71-460C-AA01-7C47DBFAAE3D}" type="slidenum">
               <a:rPr lang="en-US" smtClean="0"/>
-              <a:t>10</a:t>
+              <a:t>11</a:t>
             </a:fld>
             <a:endParaRPr lang="en-US"/>
           </a:p>
@@ -573,7 +576,7 @@
     </p:spTree>
     <p:extLst>
       <p:ext uri="{BB962C8B-B14F-4D97-AF65-F5344CB8AC3E}">
-        <p14:creationId xmlns:p14="http://schemas.microsoft.com/office/powerpoint/2010/main" val="3239604124"/>
+        <p14:creationId xmlns:p14="http://schemas.microsoft.com/office/powerpoint/2010/main" val="147082123"/>
       </p:ext>
     </p:extLst>
   </p:cSld>
@@ -648,7 +651,7 @@
           <a:p>
             <a:fld id="{7FF964DC-1A71-460C-AA01-7C47DBFAAE3D}" type="slidenum">
               <a:rPr lang="en-US" smtClean="0"/>
-              <a:t>14</a:t>
+              <a:t>23</a:t>
             </a:fld>
             <a:endParaRPr lang="en-US"/>
           </a:p>
@@ -657,7 +660,7 @@
     </p:spTree>
     <p:extLst>
       <p:ext uri="{BB962C8B-B14F-4D97-AF65-F5344CB8AC3E}">
-        <p14:creationId xmlns:p14="http://schemas.microsoft.com/office/powerpoint/2010/main" val="147082123"/>
+        <p14:creationId xmlns:p14="http://schemas.microsoft.com/office/powerpoint/2010/main" val="2172227946"/>
       </p:ext>
     </p:extLst>
   </p:cSld>
@@ -732,7 +735,7 @@
           <a:p>
             <a:fld id="{7FF964DC-1A71-460C-AA01-7C47DBFAAE3D}" type="slidenum">
               <a:rPr lang="en-US" smtClean="0"/>
-              <a:t>26</a:t>
+              <a:t>24</a:t>
             </a:fld>
             <a:endParaRPr lang="en-US"/>
           </a:p>
@@ -741,7 +744,7 @@
     </p:spTree>
     <p:extLst>
       <p:ext uri="{BB962C8B-B14F-4D97-AF65-F5344CB8AC3E}">
-        <p14:creationId xmlns:p14="http://schemas.microsoft.com/office/powerpoint/2010/main" val="2172227946"/>
+        <p14:creationId xmlns:p14="http://schemas.microsoft.com/office/powerpoint/2010/main" val="2106096771"/>
       </p:ext>
     </p:extLst>
   </p:cSld>
@@ -814,9 +817,9 @@
           <a:bodyPr/>
           <a:lstStyle/>
           <a:p>
-            <a:fld id="{7FF964DC-1A71-460C-AA01-7C47DBFAAE3D}" type="slidenum">
+            <a:fld id="{1B51C0E0-95F2-45B5-A142-86F1A72D5B17}" type="slidenum">
               <a:rPr lang="en-US" smtClean="0"/>
-              <a:t>27</a:t>
+              <a:t>32</a:t>
             </a:fld>
             <a:endParaRPr lang="en-US"/>
           </a:p>
@@ -825,7 +828,7 @@
     </p:spTree>
     <p:extLst>
       <p:ext uri="{BB962C8B-B14F-4D97-AF65-F5344CB8AC3E}">
-        <p14:creationId xmlns:p14="http://schemas.microsoft.com/office/powerpoint/2010/main" val="2106096771"/>
+        <p14:creationId xmlns:p14="http://schemas.microsoft.com/office/powerpoint/2010/main" val="4270139664"/>
       </p:ext>
     </p:extLst>
   </p:cSld>
@@ -898,93 +901,9 @@
           <a:bodyPr/>
           <a:lstStyle/>
           <a:p>
-            <a:fld id="{1B51C0E0-95F2-45B5-A142-86F1A72D5B17}" type="slidenum">
-              <a:rPr lang="en-US" smtClean="0"/>
-              <a:t>35</a:t>
-            </a:fld>
-            <a:endParaRPr lang="en-US"/>
-          </a:p>
-        </p:txBody>
-      </p:sp>
-    </p:spTree>
-    <p:extLst>
-      <p:ext uri="{BB962C8B-B14F-4D97-AF65-F5344CB8AC3E}">
-        <p14:creationId xmlns:p14="http://schemas.microsoft.com/office/powerpoint/2010/main" val="4270139664"/>
-      </p:ext>
-    </p:extLst>
-  </p:cSld>
-  <p:clrMapOvr>
-    <a:masterClrMapping/>
-  </p:clrMapOvr>
-</p:notes>
-</file>
-
-<file path=ppt/notesSlides/notesSlide6.xml><?xml version="1.0" encoding="utf-8"?>
-<p:notes xmlns:a="http://schemas.openxmlformats.org/drawingml/2006/main" xmlns:r="http://schemas.openxmlformats.org/officeDocument/2006/relationships" xmlns:p="http://schemas.openxmlformats.org/presentationml/2006/main">
-  <p:cSld>
-    <p:spTree>
-      <p:nvGrpSpPr>
-        <p:cNvPr id="1" name=""/>
-        <p:cNvGrpSpPr/>
-        <p:nvPr/>
-      </p:nvGrpSpPr>
-      <p:grpSpPr>
-        <a:xfrm>
-          <a:off x="0" y="0"/>
-          <a:ext cx="0" cy="0"/>
-          <a:chOff x="0" y="0"/>
-          <a:chExt cx="0" cy="0"/>
-        </a:xfrm>
-      </p:grpSpPr>
-      <p:sp>
-        <p:nvSpPr>
-          <p:cNvPr id="2" name="Slide Image Placeholder 1"/>
-          <p:cNvSpPr>
-            <a:spLocks noGrp="1" noRot="1" noChangeAspect="1"/>
-          </p:cNvSpPr>
-          <p:nvPr>
-            <p:ph type="sldImg"/>
-          </p:nvPr>
-        </p:nvSpPr>
-        <p:spPr/>
-      </p:sp>
-      <p:sp>
-        <p:nvSpPr>
-          <p:cNvPr id="3" name="Notes Placeholder 2"/>
-          <p:cNvSpPr>
-            <a:spLocks noGrp="1"/>
-          </p:cNvSpPr>
-          <p:nvPr>
-            <p:ph type="body" idx="1"/>
-          </p:nvPr>
-        </p:nvSpPr>
-        <p:spPr/>
-        <p:txBody>
-          <a:bodyPr/>
-          <a:lstStyle/>
-          <a:p>
-            <a:endParaRPr lang="en-US" dirty="0"/>
-          </a:p>
-        </p:txBody>
-      </p:sp>
-      <p:sp>
-        <p:nvSpPr>
-          <p:cNvPr id="4" name="Slide Number Placeholder 3"/>
-          <p:cNvSpPr>
-            <a:spLocks noGrp="1"/>
-          </p:cNvSpPr>
-          <p:nvPr>
-            <p:ph type="sldNum" sz="quarter" idx="5"/>
-          </p:nvPr>
-        </p:nvSpPr>
-        <p:spPr/>
-        <p:txBody>
-          <a:bodyPr/>
-          <a:lstStyle/>
-          <a:p>
             <a:fld id="{7FF964DC-1A71-460C-AA01-7C47DBFAAE3D}" type="slidenum">
               <a:rPr lang="en-US" smtClean="0"/>
-              <a:t>36</a:t>
+              <a:t>39</a:t>
             </a:fld>
             <a:endParaRPr lang="en-US"/>
           </a:p>
@@ -1150,7 +1069,7 @@
           <a:p>
             <a:fld id="{256199A9-7968-4290-8E97-22DF45FF6498}" type="datetimeFigureOut">
               <a:rPr lang="en-US" smtClean="0"/>
-              <a:t>10/25/2020</a:t>
+              <a:t>11/23/2020</a:t>
             </a:fld>
             <a:endParaRPr lang="en-US"/>
           </a:p>
@@ -1348,7 +1267,7 @@
           <a:p>
             <a:fld id="{256199A9-7968-4290-8E97-22DF45FF6498}" type="datetimeFigureOut">
               <a:rPr lang="en-US" smtClean="0"/>
-              <a:t>10/25/2020</a:t>
+              <a:t>11/23/2020</a:t>
             </a:fld>
             <a:endParaRPr lang="en-US"/>
           </a:p>
@@ -1556,7 +1475,7 @@
           <a:p>
             <a:fld id="{256199A9-7968-4290-8E97-22DF45FF6498}" type="datetimeFigureOut">
               <a:rPr lang="en-US" smtClean="0"/>
-              <a:t>10/25/2020</a:t>
+              <a:t>11/23/2020</a:t>
             </a:fld>
             <a:endParaRPr lang="en-US"/>
           </a:p>
@@ -1754,7 +1673,7 @@
           <a:p>
             <a:fld id="{256199A9-7968-4290-8E97-22DF45FF6498}" type="datetimeFigureOut">
               <a:rPr lang="en-US" smtClean="0"/>
-              <a:t>10/25/2020</a:t>
+              <a:t>11/23/2020</a:t>
             </a:fld>
             <a:endParaRPr lang="en-US"/>
           </a:p>
@@ -2029,7 +1948,7 @@
           <a:p>
             <a:fld id="{256199A9-7968-4290-8E97-22DF45FF6498}" type="datetimeFigureOut">
               <a:rPr lang="en-US" smtClean="0"/>
-              <a:t>10/25/2020</a:t>
+              <a:t>11/23/2020</a:t>
             </a:fld>
             <a:endParaRPr lang="en-US"/>
           </a:p>
@@ -2294,7 +2213,7 @@
           <a:p>
             <a:fld id="{256199A9-7968-4290-8E97-22DF45FF6498}" type="datetimeFigureOut">
               <a:rPr lang="en-US" smtClean="0"/>
-              <a:t>10/25/2020</a:t>
+              <a:t>11/23/2020</a:t>
             </a:fld>
             <a:endParaRPr lang="en-US"/>
           </a:p>
@@ -2706,7 +2625,7 @@
           <a:p>
             <a:fld id="{256199A9-7968-4290-8E97-22DF45FF6498}" type="datetimeFigureOut">
               <a:rPr lang="en-US" smtClean="0"/>
-              <a:t>10/25/2020</a:t>
+              <a:t>11/23/2020</a:t>
             </a:fld>
             <a:endParaRPr lang="en-US"/>
           </a:p>
@@ -2847,7 +2766,7 @@
           <a:p>
             <a:fld id="{256199A9-7968-4290-8E97-22DF45FF6498}" type="datetimeFigureOut">
               <a:rPr lang="en-US" smtClean="0"/>
-              <a:t>10/25/2020</a:t>
+              <a:t>11/23/2020</a:t>
             </a:fld>
             <a:endParaRPr lang="en-US"/>
           </a:p>
@@ -2960,7 +2879,7 @@
           <a:p>
             <a:fld id="{256199A9-7968-4290-8E97-22DF45FF6498}" type="datetimeFigureOut">
               <a:rPr lang="en-US" smtClean="0"/>
-              <a:t>10/25/2020</a:t>
+              <a:t>11/23/2020</a:t>
             </a:fld>
             <a:endParaRPr lang="en-US"/>
           </a:p>
@@ -3271,7 +3190,7 @@
           <a:p>
             <a:fld id="{256199A9-7968-4290-8E97-22DF45FF6498}" type="datetimeFigureOut">
               <a:rPr lang="en-US" smtClean="0"/>
-              <a:t>10/25/2020</a:t>
+              <a:t>11/23/2020</a:t>
             </a:fld>
             <a:endParaRPr lang="en-US"/>
           </a:p>
@@ -3559,7 +3478,7 @@
           <a:p>
             <a:fld id="{256199A9-7968-4290-8E97-22DF45FF6498}" type="datetimeFigureOut">
               <a:rPr lang="en-US" smtClean="0"/>
-              <a:t>10/25/2020</a:t>
+              <a:t>11/23/2020</a:t>
             </a:fld>
             <a:endParaRPr lang="en-US"/>
           </a:p>
@@ -3800,7 +3719,7 @@
           <a:p>
             <a:fld id="{256199A9-7968-4290-8E97-22DF45FF6498}" type="datetimeFigureOut">
               <a:rPr lang="en-US" smtClean="0"/>
-              <a:t>10/25/2020</a:t>
+              <a:t>11/23/2020</a:t>
             </a:fld>
             <a:endParaRPr lang="en-US"/>
           </a:p>
@@ -4233,17 +4152,62 @@
             <p:ph type="ctrTitle"/>
           </p:nvPr>
         </p:nvSpPr>
-        <p:spPr/>
+        <p:spPr>
+          <a:xfrm>
+            <a:off x="1268360" y="1179872"/>
+            <a:ext cx="10161639" cy="3480618"/>
+          </a:xfrm>
+        </p:spPr>
         <p:txBody>
           <a:bodyPr>
             <a:normAutofit fontScale="90000"/>
           </a:bodyPr>
           <a:lstStyle/>
           <a:p>
-            <a:r>
-              <a:rPr lang="en-US" dirty="0"/>
+            <a:br>
+              <a:rPr lang="en-US" dirty="0"/>
+            </a:br>
+            <a:br>
+              <a:rPr lang="en-US" dirty="0"/>
+            </a:br>
+            <a:br>
+              <a:rPr lang="en-US" dirty="0"/>
+            </a:br>
+            <a:br>
+              <a:rPr lang="en-US" sz="8000" dirty="0"/>
+            </a:br>
+            <a:r>
+              <a:rPr lang="en-US" sz="4400" dirty="0">
+                <a:latin typeface="Arial Black" panose="020B0A04020102020204" pitchFamily="34" charset="0"/>
+              </a:rPr>
+              <a:t>15EC401M – </a:t>
+            </a:r>
+            <a:r>
+              <a:rPr lang="en-US" sz="4400" b="1" i="0" u="none" strike="noStrike" baseline="0" dirty="0">
+                <a:latin typeface="Arial Black" panose="020B0A04020102020204" pitchFamily="34" charset="0"/>
+              </a:rPr>
+              <a:t>Multidisciplinary Design </a:t>
+            </a:r>
+            <a:br>
+              <a:rPr lang="en-US" sz="4400" b="1" i="0" u="none" strike="noStrike" baseline="0" dirty="0">
+                <a:latin typeface="Arial Black" panose="020B0A04020102020204" pitchFamily="34" charset="0"/>
+              </a:rPr>
+            </a:br>
+            <a:r>
+              <a:rPr lang="en-US" sz="4400" dirty="0"/>
               <a:t>STUDENT ATTENDANCE MONITORING USING FACIAL RECOGNITION IN A CLASSROOM </a:t>
             </a:r>
+            <a:br>
+              <a:rPr lang="en-US" sz="4400" dirty="0"/>
+            </a:br>
+            <a:br>
+              <a:rPr lang="en-US" sz="4400" dirty="0"/>
+            </a:br>
+            <a:r>
+              <a:rPr lang="en-US" sz="4400" dirty="0"/>
+              <a:t>Batch no 18</a:t>
+            </a:r>
+            <a:endParaRPr lang="en-US" sz="3300" dirty="0"/>
           </a:p>
         </p:txBody>
       </p:sp>
@@ -4265,7 +4229,7 @@
         </p:nvSpPr>
         <p:spPr>
           <a:xfrm>
-            <a:off x="1524000" y="4403896"/>
+            <a:off x="1524000" y="4995760"/>
             <a:ext cx="9144000" cy="1655762"/>
           </a:xfrm>
         </p:spPr>
@@ -4333,7 +4297,7 @@
           <p:cNvPr id="2" name="Title 1">
             <a:extLst>
               <a:ext uri="{FF2B5EF4-FFF2-40B4-BE49-F238E27FC236}">
-                <a16:creationId xmlns:a16="http://schemas.microsoft.com/office/drawing/2014/main" id="{ED308C98-EF56-41F1-A0BA-172E7C054BAF}"/>
+                <a16:creationId xmlns:a16="http://schemas.microsoft.com/office/drawing/2014/main" id="{F81FDEFA-578C-4B86-B9C9-F1EC538DFD67}"/>
               </a:ext>
             </a:extLst>
           </p:cNvPr>
@@ -4351,7 +4315,7 @@
           <a:p>
             <a:r>
               <a:rPr lang="en-US" dirty="0"/>
-              <a:t>Hardware </a:t>
+              <a:t>Major Sub systems</a:t>
             </a:r>
           </a:p>
         </p:txBody>
@@ -4361,7 +4325,7 @@
           <p:cNvPr id="3" name="Content Placeholder 2">
             <a:extLst>
               <a:ext uri="{FF2B5EF4-FFF2-40B4-BE49-F238E27FC236}">
-                <a16:creationId xmlns:a16="http://schemas.microsoft.com/office/drawing/2014/main" id="{59B7EA44-14AC-415A-9A50-73E272C69C44}"/>
+                <a16:creationId xmlns:a16="http://schemas.microsoft.com/office/drawing/2014/main" id="{1BBDA15E-F810-44B3-9EB2-8B08A5533C9D}"/>
               </a:ext>
             </a:extLst>
           </p:cNvPr>
@@ -4379,27 +4343,30 @@
           <a:p>
             <a:r>
               <a:rPr lang="en-US" dirty="0"/>
-              <a:t>Camera is installed on the classroom</a:t>
-            </a:r>
-          </a:p>
-          <a:p>
-            <a:r>
-              <a:rPr lang="en-US" dirty="0"/>
-              <a:t>The role of the camera is just to take pictures </a:t>
-            </a:r>
-          </a:p>
-          <a:p>
-            <a:r>
-              <a:rPr lang="en-US" dirty="0"/>
-              <a:t>But the process of facial recognition takes place in another computer </a:t>
-            </a:r>
+              <a:t>System Attached in the class to take photos (Image processing)</a:t>
+            </a:r>
+          </a:p>
+          <a:p>
+            <a:r>
+              <a:rPr lang="en-US" dirty="0"/>
+              <a:t>System that marks the attendance against the face in the photos(ML/DL)</a:t>
+            </a:r>
+          </a:p>
+          <a:p>
+            <a:pPr marL="0" indent="0">
+              <a:buNone/>
+            </a:pPr>
+            <a:endParaRPr lang="en-US" dirty="0"/>
+          </a:p>
+          <a:p>
+            <a:endParaRPr lang="en-US" dirty="0"/>
           </a:p>
         </p:txBody>
       </p:sp>
     </p:spTree>
     <p:extLst>
       <p:ext uri="{BB962C8B-B14F-4D97-AF65-F5344CB8AC3E}">
-        <p14:creationId xmlns:p14="http://schemas.microsoft.com/office/powerpoint/2010/main" val="936431316"/>
+        <p14:creationId xmlns:p14="http://schemas.microsoft.com/office/powerpoint/2010/main" val="334548514"/>
       </p:ext>
     </p:extLst>
   </p:cSld>
@@ -4428,10 +4395,10 @@
       </p:grpSpPr>
       <p:sp>
         <p:nvSpPr>
-          <p:cNvPr id="12" name="Title 11">
-            <a:extLst>
-              <a:ext uri="{FF2B5EF4-FFF2-40B4-BE49-F238E27FC236}">
-                <a16:creationId xmlns:a16="http://schemas.microsoft.com/office/drawing/2014/main" id="{0B0BF1E4-7AB7-4806-A1D7-CD319A3CCF90}"/>
+          <p:cNvPr id="2" name="Title 1">
+            <a:extLst>
+              <a:ext uri="{FF2B5EF4-FFF2-40B4-BE49-F238E27FC236}">
+                <a16:creationId xmlns:a16="http://schemas.microsoft.com/office/drawing/2014/main" id="{5E78E20A-D4A0-41FC-9B74-32803F6C3930}"/>
               </a:ext>
             </a:extLst>
           </p:cNvPr>
@@ -4442,64 +4409,74 @@
             <p:ph type="title"/>
           </p:nvPr>
         </p:nvSpPr>
-        <p:spPr>
-          <a:xfrm>
-            <a:off x="838200" y="365126"/>
-            <a:ext cx="9782908" cy="577410"/>
-          </a:xfrm>
-        </p:spPr>
-        <p:txBody>
-          <a:bodyPr>
-            <a:normAutofit fontScale="90000"/>
-          </a:bodyPr>
-          <a:lstStyle/>
-          <a:p>
-            <a:r>
-              <a:rPr lang="en-US" dirty="0"/>
-              <a:t>Facial recognition in class – an idea </a:t>
-            </a:r>
-          </a:p>
-        </p:txBody>
-      </p:sp>
-      <p:pic>
-        <p:nvPicPr>
-          <p:cNvPr id="11" name="Content Placeholder 10">
-            <a:extLst>
-              <a:ext uri="{FF2B5EF4-FFF2-40B4-BE49-F238E27FC236}">
-                <a16:creationId xmlns:a16="http://schemas.microsoft.com/office/drawing/2014/main" id="{DD93B6F9-4D5C-4163-9C5E-5C8C30EC7699}"/>
-              </a:ext>
-            </a:extLst>
-          </p:cNvPr>
-          <p:cNvPicPr>
-            <a:picLocks noGrp="1" noChangeAspect="1"/>
-          </p:cNvPicPr>
+        <p:spPr/>
+        <p:txBody>
+          <a:bodyPr/>
+          <a:lstStyle/>
+          <a:p>
+            <a:r>
+              <a:rPr lang="en-US" dirty="0"/>
+              <a:t>System that takes photo</a:t>
+            </a:r>
+          </a:p>
+        </p:txBody>
+      </p:sp>
+      <p:sp>
+        <p:nvSpPr>
+          <p:cNvPr id="3" name="Content Placeholder 2">
+            <a:extLst>
+              <a:ext uri="{FF2B5EF4-FFF2-40B4-BE49-F238E27FC236}">
+                <a16:creationId xmlns:a16="http://schemas.microsoft.com/office/drawing/2014/main" id="{A60DE3F7-4C94-4A61-8C4D-046A767E095F}"/>
+              </a:ext>
+            </a:extLst>
+          </p:cNvPr>
+          <p:cNvSpPr>
+            <a:spLocks noGrp="1"/>
+          </p:cNvSpPr>
           <p:nvPr>
             <p:ph idx="1"/>
           </p:nvPr>
-        </p:nvPicPr>
-        <p:blipFill>
-          <a:blip r:embed="rId2">
-            <a:extLst>
-              <a:ext uri="{28A0092B-C50C-407E-A947-70E740481C1C}">
-                <a14:useLocalDpi xmlns:a14="http://schemas.microsoft.com/office/drawing/2010/main" val="0"/>
-              </a:ext>
-            </a:extLst>
-          </a:blip>
-          <a:stretch>
-            <a:fillRect/>
-          </a:stretch>
-        </p:blipFill>
-        <p:spPr>
-          <a:xfrm>
-            <a:off x="1118953" y="1365455"/>
-            <a:ext cx="9954094" cy="4618594"/>
-          </a:xfrm>
-        </p:spPr>
-      </p:pic>
+        </p:nvSpPr>
+        <p:spPr/>
+        <p:txBody>
+          <a:bodyPr/>
+          <a:lstStyle/>
+          <a:p>
+            <a:pPr marL="0" indent="0">
+              <a:buNone/>
+            </a:pPr>
+            <a:r>
+              <a:rPr lang="en-US" dirty="0"/>
+              <a:t>Contains the following systems inside it </a:t>
+            </a:r>
+          </a:p>
+          <a:p>
+            <a:r>
+              <a:rPr lang="en-US" dirty="0"/>
+              <a:t>Camera </a:t>
+            </a:r>
+          </a:p>
+          <a:p>
+            <a:r>
+              <a:rPr lang="en-US" dirty="0"/>
+              <a:t>System that signals the camera</a:t>
+            </a:r>
+          </a:p>
+          <a:p>
+            <a:r>
+              <a:rPr lang="en-US" dirty="0"/>
+              <a:t>System that transports the photo to next system for processing the photos</a:t>
+            </a:r>
+          </a:p>
+          <a:p>
+            <a:endParaRPr lang="en-US" dirty="0"/>
+          </a:p>
+        </p:txBody>
+      </p:sp>
     </p:spTree>
     <p:extLst>
       <p:ext uri="{BB962C8B-B14F-4D97-AF65-F5344CB8AC3E}">
-        <p14:creationId xmlns:p14="http://schemas.microsoft.com/office/powerpoint/2010/main" val="130157418"/>
+        <p14:creationId xmlns:p14="http://schemas.microsoft.com/office/powerpoint/2010/main" val="4165119701"/>
       </p:ext>
     </p:extLst>
   </p:cSld>
@@ -4531,7 +4508,7 @@
           <p:cNvPr id="2" name="Title 1">
             <a:extLst>
               <a:ext uri="{FF2B5EF4-FFF2-40B4-BE49-F238E27FC236}">
-                <a16:creationId xmlns:a16="http://schemas.microsoft.com/office/drawing/2014/main" id="{7BC803E6-8F1F-45A2-A4AD-C711B834E5DF}"/>
+                <a16:creationId xmlns:a16="http://schemas.microsoft.com/office/drawing/2014/main" id="{CFA96AD7-1BDA-4E4F-88E3-E0D114F9F1F4}"/>
               </a:ext>
             </a:extLst>
           </p:cNvPr>
@@ -4542,29 +4519,80 @@
             <p:ph type="title"/>
           </p:nvPr>
         </p:nvSpPr>
-        <p:spPr>
-          <a:xfrm>
-            <a:off x="838199" y="365125"/>
-            <a:ext cx="10976429" cy="5963104"/>
-          </a:xfrm>
-        </p:spPr>
-        <p:txBody>
-          <a:bodyPr>
-            <a:noAutofit/>
-          </a:bodyPr>
-          <a:lstStyle/>
-          <a:p>
-            <a:r>
-              <a:rPr lang="en-US" sz="10000" dirty="0"/>
-              <a:t>Sub Systems</a:t>
-            </a:r>
+        <p:spPr/>
+        <p:txBody>
+          <a:bodyPr/>
+          <a:lstStyle/>
+          <a:p>
+            <a:r>
+              <a:rPr lang="en-US" dirty="0"/>
+              <a:t>System that marks the attendance</a:t>
+            </a:r>
+          </a:p>
+        </p:txBody>
+      </p:sp>
+      <p:sp>
+        <p:nvSpPr>
+          <p:cNvPr id="3" name="Content Placeholder 2">
+            <a:extLst>
+              <a:ext uri="{FF2B5EF4-FFF2-40B4-BE49-F238E27FC236}">
+                <a16:creationId xmlns:a16="http://schemas.microsoft.com/office/drawing/2014/main" id="{3F28A773-CC00-4A0E-B1A2-14E6DE494930}"/>
+              </a:ext>
+            </a:extLst>
+          </p:cNvPr>
+          <p:cNvSpPr>
+            <a:spLocks noGrp="1"/>
+          </p:cNvSpPr>
+          <p:nvPr>
+            <p:ph idx="1"/>
+          </p:nvPr>
+        </p:nvSpPr>
+        <p:spPr/>
+        <p:txBody>
+          <a:bodyPr/>
+          <a:lstStyle/>
+          <a:p>
+            <a:pPr marL="0" indent="0">
+              <a:buNone/>
+            </a:pPr>
+            <a:r>
+              <a:rPr lang="en-US" dirty="0"/>
+              <a:t>Contains the following systems inside it</a:t>
+            </a:r>
+          </a:p>
+          <a:p>
+            <a:r>
+              <a:rPr lang="en-US" dirty="0"/>
+              <a:t>System that receives the photo</a:t>
+            </a:r>
+          </a:p>
+          <a:p>
+            <a:r>
+              <a:rPr lang="en-US" dirty="0"/>
+              <a:t>System that runs the face detection algorithm that outputs “m” detected faces </a:t>
+            </a:r>
+          </a:p>
+          <a:p>
+            <a:r>
+              <a:rPr lang="en-US" dirty="0"/>
+              <a:t>System that outputs a descriptor for “m” faces</a:t>
+            </a:r>
+          </a:p>
+          <a:p>
+            <a:r>
+              <a:rPr lang="en-US" dirty="0"/>
+              <a:t>System that iterates through “m” descriptor and marks the attendance</a:t>
+            </a:r>
+          </a:p>
+          <a:p>
+            <a:endParaRPr lang="en-US" dirty="0"/>
           </a:p>
         </p:txBody>
       </p:sp>
     </p:spTree>
     <p:extLst>
       <p:ext uri="{BB962C8B-B14F-4D97-AF65-F5344CB8AC3E}">
-        <p14:creationId xmlns:p14="http://schemas.microsoft.com/office/powerpoint/2010/main" val="4012447857"/>
+        <p14:creationId xmlns:p14="http://schemas.microsoft.com/office/powerpoint/2010/main" val="2905998232"/>
       </p:ext>
     </p:extLst>
   </p:cSld>
@@ -4596,7 +4624,7 @@
           <p:cNvPr id="2" name="Title 1">
             <a:extLst>
               <a:ext uri="{FF2B5EF4-FFF2-40B4-BE49-F238E27FC236}">
-                <a16:creationId xmlns:a16="http://schemas.microsoft.com/office/drawing/2014/main" id="{F81FDEFA-578C-4B86-B9C9-F1EC538DFD67}"/>
+                <a16:creationId xmlns:a16="http://schemas.microsoft.com/office/drawing/2014/main" id="{6C724FD5-FCE3-4360-B66D-1A725C2377BB}"/>
               </a:ext>
             </a:extLst>
           </p:cNvPr>
@@ -4607,65 +4635,29 @@
             <p:ph type="title"/>
           </p:nvPr>
         </p:nvSpPr>
-        <p:spPr/>
-        <p:txBody>
-          <a:bodyPr/>
-          <a:lstStyle/>
-          <a:p>
-            <a:r>
-              <a:rPr lang="en-US" dirty="0"/>
-              <a:t>Major Sub systems</a:t>
-            </a:r>
-          </a:p>
-        </p:txBody>
-      </p:sp>
-      <p:sp>
-        <p:nvSpPr>
-          <p:cNvPr id="3" name="Content Placeholder 2">
-            <a:extLst>
-              <a:ext uri="{FF2B5EF4-FFF2-40B4-BE49-F238E27FC236}">
-                <a16:creationId xmlns:a16="http://schemas.microsoft.com/office/drawing/2014/main" id="{1BBDA15E-F810-44B3-9EB2-8B08A5533C9D}"/>
-              </a:ext>
-            </a:extLst>
-          </p:cNvPr>
-          <p:cNvSpPr>
-            <a:spLocks noGrp="1"/>
-          </p:cNvSpPr>
-          <p:nvPr>
-            <p:ph idx="1"/>
-          </p:nvPr>
-        </p:nvSpPr>
-        <p:spPr/>
-        <p:txBody>
-          <a:bodyPr/>
-          <a:lstStyle/>
-          <a:p>
-            <a:r>
-              <a:rPr lang="en-US" dirty="0"/>
-              <a:t>System Attached in the class to take photos (Image processing)</a:t>
-            </a:r>
-          </a:p>
-          <a:p>
-            <a:r>
-              <a:rPr lang="en-US" dirty="0"/>
-              <a:t>System that marks the attendance against the face in the photos(ML/DL)</a:t>
-            </a:r>
-          </a:p>
-          <a:p>
-            <a:pPr marL="0" indent="0">
-              <a:buNone/>
-            </a:pPr>
-            <a:endParaRPr lang="en-US" dirty="0"/>
-          </a:p>
-          <a:p>
-            <a:endParaRPr lang="en-US" dirty="0"/>
+        <p:spPr>
+          <a:xfrm>
+            <a:off x="838200" y="365125"/>
+            <a:ext cx="10975258" cy="6109417"/>
+          </a:xfrm>
+        </p:spPr>
+        <p:txBody>
+          <a:bodyPr>
+            <a:noAutofit/>
+          </a:bodyPr>
+          <a:lstStyle/>
+          <a:p>
+            <a:r>
+              <a:rPr lang="en-US" sz="8000" dirty="0"/>
+              <a:t>More explanation about a few systems that is inside the sub systems</a:t>
+            </a:r>
           </a:p>
         </p:txBody>
       </p:sp>
     </p:spTree>
     <p:extLst>
       <p:ext uri="{BB962C8B-B14F-4D97-AF65-F5344CB8AC3E}">
-        <p14:creationId xmlns:p14="http://schemas.microsoft.com/office/powerpoint/2010/main" val="334548514"/>
+        <p14:creationId xmlns:p14="http://schemas.microsoft.com/office/powerpoint/2010/main" val="776749036"/>
       </p:ext>
     </p:extLst>
   </p:cSld>
@@ -4697,7 +4689,7 @@
           <p:cNvPr id="2" name="Title 1">
             <a:extLst>
               <a:ext uri="{FF2B5EF4-FFF2-40B4-BE49-F238E27FC236}">
-                <a16:creationId xmlns:a16="http://schemas.microsoft.com/office/drawing/2014/main" id="{5E78E20A-D4A0-41FC-9B74-32803F6C3930}"/>
+                <a16:creationId xmlns:a16="http://schemas.microsoft.com/office/drawing/2014/main" id="{63FA2295-5DE4-42AA-8D27-A722B6FAEB70}"/>
               </a:ext>
             </a:extLst>
           </p:cNvPr>
@@ -4708,14 +4700,28 @@
             <p:ph type="title"/>
           </p:nvPr>
         </p:nvSpPr>
-        <p:spPr/>
-        <p:txBody>
-          <a:bodyPr/>
-          <a:lstStyle/>
-          <a:p>
-            <a:r>
-              <a:rPr lang="en-US" dirty="0"/>
-              <a:t>System that takes photo</a:t>
+        <p:spPr>
+          <a:xfrm>
+            <a:off x="838199" y="365125"/>
+            <a:ext cx="10515601" cy="1684900"/>
+          </a:xfrm>
+        </p:spPr>
+        <p:txBody>
+          <a:bodyPr>
+            <a:normAutofit fontScale="90000"/>
+          </a:bodyPr>
+          <a:lstStyle/>
+          <a:p>
+            <a:r>
+              <a:rPr lang="en-US" dirty="0"/>
+              <a:t>System that marks the attendance - </a:t>
+            </a:r>
+            <a:br>
+              <a:rPr lang="en-US" dirty="0"/>
+            </a:br>
+            <a:r>
+              <a:rPr lang="en-US" dirty="0"/>
+              <a:t>System that outputs a descriptor for “m” faces</a:t>
             </a:r>
           </a:p>
         </p:txBody>
@@ -4725,7 +4731,7 @@
           <p:cNvPr id="3" name="Content Placeholder 2">
             <a:extLst>
               <a:ext uri="{FF2B5EF4-FFF2-40B4-BE49-F238E27FC236}">
-                <a16:creationId xmlns:a16="http://schemas.microsoft.com/office/drawing/2014/main" id="{A60DE3F7-4C94-4A61-8C4D-046A767E095F}"/>
+                <a16:creationId xmlns:a16="http://schemas.microsoft.com/office/drawing/2014/main" id="{A30DA9CB-2A27-4B68-990B-767029736F7E}"/>
               </a:ext>
             </a:extLst>
           </p:cNvPr>
@@ -4736,35 +4742,31 @@
             <p:ph idx="1"/>
           </p:nvPr>
         </p:nvSpPr>
-        <p:spPr/>
-        <p:txBody>
-          <a:bodyPr/>
-          <a:lstStyle/>
-          <a:p>
-            <a:pPr marL="0" indent="0">
-              <a:buNone/>
-            </a:pPr>
-            <a:r>
-              <a:rPr lang="en-US" dirty="0"/>
-              <a:t>Contains the following systems inside it </a:t>
-            </a:r>
-          </a:p>
-          <a:p>
-            <a:r>
-              <a:rPr lang="en-US" dirty="0"/>
-              <a:t>Camera </a:t>
-            </a:r>
-          </a:p>
-          <a:p>
-            <a:r>
-              <a:rPr lang="en-US" dirty="0"/>
-              <a:t>System that signals the camera</a:t>
-            </a:r>
-          </a:p>
-          <a:p>
-            <a:r>
-              <a:rPr lang="en-US" dirty="0"/>
-              <a:t>System that transports the photo to next system for processing the photos</a:t>
+        <p:spPr>
+          <a:xfrm>
+            <a:off x="838200" y="2050025"/>
+            <a:ext cx="10515600" cy="4442849"/>
+          </a:xfrm>
+        </p:spPr>
+        <p:txBody>
+          <a:bodyPr/>
+          <a:lstStyle/>
+          <a:p>
+            <a:r>
+              <a:rPr lang="en-US" dirty="0"/>
+              <a:t>System that iterates through the “m” detected faces and calls the following sub systems</a:t>
+            </a:r>
+          </a:p>
+          <a:p>
+            <a:r>
+              <a:rPr lang="en-US" dirty="0"/>
+              <a:t>System that outputs a descriptor(fixed size) for one face (Facial recognition) </a:t>
+            </a:r>
+          </a:p>
+          <a:p>
+            <a:r>
+              <a:rPr lang="en-US" dirty="0"/>
+              <a:t>System that stores these “m” descriptors </a:t>
             </a:r>
           </a:p>
           <a:p>
@@ -4775,7 +4777,7 @@
     </p:spTree>
     <p:extLst>
       <p:ext uri="{BB962C8B-B14F-4D97-AF65-F5344CB8AC3E}">
-        <p14:creationId xmlns:p14="http://schemas.microsoft.com/office/powerpoint/2010/main" val="4165119701"/>
+        <p14:creationId xmlns:p14="http://schemas.microsoft.com/office/powerpoint/2010/main" val="3192779843"/>
       </p:ext>
     </p:extLst>
   </p:cSld>
@@ -4807,7 +4809,7 @@
           <p:cNvPr id="2" name="Title 1">
             <a:extLst>
               <a:ext uri="{FF2B5EF4-FFF2-40B4-BE49-F238E27FC236}">
-                <a16:creationId xmlns:a16="http://schemas.microsoft.com/office/drawing/2014/main" id="{CFA96AD7-1BDA-4E4F-88E3-E0D114F9F1F4}"/>
+                <a16:creationId xmlns:a16="http://schemas.microsoft.com/office/drawing/2014/main" id="{BC31AE2E-5951-4394-AD2F-0CCE4C714AC3}"/>
               </a:ext>
             </a:extLst>
           </p:cNvPr>
@@ -4818,15 +4820,36 @@
             <p:ph type="title"/>
           </p:nvPr>
         </p:nvSpPr>
-        <p:spPr/>
-        <p:txBody>
-          <a:bodyPr/>
-          <a:lstStyle/>
-          <a:p>
-            <a:r>
-              <a:rPr lang="en-US" dirty="0"/>
-              <a:t>System that marks the attendance</a:t>
-            </a:r>
+        <p:spPr>
+          <a:xfrm>
+            <a:off x="838200" y="365125"/>
+            <a:ext cx="10515600" cy="1950372"/>
+          </a:xfrm>
+        </p:spPr>
+        <p:txBody>
+          <a:bodyPr>
+            <a:normAutofit fontScale="90000"/>
+          </a:bodyPr>
+          <a:lstStyle/>
+          <a:p>
+            <a:br>
+              <a:rPr lang="en-US" dirty="0"/>
+            </a:br>
+            <a:r>
+              <a:rPr lang="en-US" dirty="0"/>
+              <a:t>System that marks the attendance – </a:t>
+            </a:r>
+            <a:br>
+              <a:rPr lang="en-US" dirty="0"/>
+            </a:br>
+            <a:r>
+              <a:rPr lang="en-US" dirty="0"/>
+              <a:t>System that iterates through “m” descriptors and marks the attendance</a:t>
+            </a:r>
+            <a:br>
+              <a:rPr lang="en-US" dirty="0"/>
+            </a:br>
+            <a:endParaRPr lang="en-US" dirty="0"/>
           </a:p>
         </p:txBody>
       </p:sp>
@@ -4835,7 +4858,7 @@
           <p:cNvPr id="3" name="Content Placeholder 2">
             <a:extLst>
               <a:ext uri="{FF2B5EF4-FFF2-40B4-BE49-F238E27FC236}">
-                <a16:creationId xmlns:a16="http://schemas.microsoft.com/office/drawing/2014/main" id="{3F28A773-CC00-4A0E-B1A2-14E6DE494930}"/>
+                <a16:creationId xmlns:a16="http://schemas.microsoft.com/office/drawing/2014/main" id="{B7A0EC86-95BA-4EF9-950D-054B3B7F161F}"/>
               </a:ext>
             </a:extLst>
           </p:cNvPr>
@@ -4846,52 +4869,45 @@
             <p:ph idx="1"/>
           </p:nvPr>
         </p:nvSpPr>
-        <p:spPr/>
-        <p:txBody>
-          <a:bodyPr/>
-          <a:lstStyle/>
-          <a:p>
-            <a:pPr marL="0" indent="0">
-              <a:buNone/>
-            </a:pPr>
-            <a:r>
-              <a:rPr lang="en-US" dirty="0"/>
-              <a:t>Contains the following systems inside it</a:t>
-            </a:r>
-          </a:p>
-          <a:p>
-            <a:r>
-              <a:rPr lang="en-US" dirty="0"/>
-              <a:t>System that receives the photo</a:t>
-            </a:r>
-          </a:p>
-          <a:p>
-            <a:r>
-              <a:rPr lang="en-US" dirty="0"/>
-              <a:t>System that runs the face detection algorithm that outputs “m” detected faces </a:t>
-            </a:r>
-          </a:p>
-          <a:p>
-            <a:r>
-              <a:rPr lang="en-US" dirty="0"/>
-              <a:t>System that outputs a descriptor for “m” faces</a:t>
-            </a:r>
-          </a:p>
-          <a:p>
-            <a:r>
-              <a:rPr lang="en-US" dirty="0"/>
-              <a:t>System that iterates through “m” descriptor and marks the attendance</a:t>
-            </a:r>
-          </a:p>
-          <a:p>
-            <a:endParaRPr lang="en-US" dirty="0"/>
+        <p:spPr>
+          <a:xfrm>
+            <a:off x="838200" y="2315497"/>
+            <a:ext cx="10515600" cy="4177378"/>
+          </a:xfrm>
+        </p:spPr>
+        <p:txBody>
+          <a:bodyPr/>
+          <a:lstStyle/>
+          <a:p>
+            <a:r>
+              <a:rPr lang="en-US" dirty="0"/>
+              <a:t>System that iterates through the database containing “n” descriptors </a:t>
+            </a:r>
+          </a:p>
+          <a:p>
+            <a:r>
+              <a:rPr lang="en-US" dirty="0"/>
+              <a:t>System that checks whether 2 descriptors are same</a:t>
+            </a:r>
+          </a:p>
+          <a:p>
+            <a:r>
+              <a:rPr lang="en-US" dirty="0"/>
+              <a:t>System that gives the register number of a given descriptor </a:t>
+            </a:r>
+          </a:p>
+          <a:p>
+            <a:r>
+              <a:rPr lang="en-US" dirty="0"/>
+              <a:t>System that marks the attendance against the register number </a:t>
+            </a:r>
           </a:p>
         </p:txBody>
       </p:sp>
     </p:spTree>
     <p:extLst>
       <p:ext uri="{BB962C8B-B14F-4D97-AF65-F5344CB8AC3E}">
-        <p14:creationId xmlns:p14="http://schemas.microsoft.com/office/powerpoint/2010/main" val="2905998232"/>
+        <p14:creationId xmlns:p14="http://schemas.microsoft.com/office/powerpoint/2010/main" val="352402098"/>
       </p:ext>
     </p:extLst>
   </p:cSld>
@@ -4923,7 +4939,7 @@
           <p:cNvPr id="2" name="Title 1">
             <a:extLst>
               <a:ext uri="{FF2B5EF4-FFF2-40B4-BE49-F238E27FC236}">
-                <a16:creationId xmlns:a16="http://schemas.microsoft.com/office/drawing/2014/main" id="{6C724FD5-FCE3-4360-B66D-1A725C2377BB}"/>
+                <a16:creationId xmlns:a16="http://schemas.microsoft.com/office/drawing/2014/main" id="{CD432508-6B86-4A7D-A45F-50F075877E79}"/>
               </a:ext>
             </a:extLst>
           </p:cNvPr>
@@ -4937,18 +4953,18 @@
         <p:spPr>
           <a:xfrm>
             <a:off x="838200" y="365125"/>
-            <a:ext cx="10975258" cy="6109417"/>
+            <a:ext cx="11063514" cy="6035675"/>
           </a:xfrm>
         </p:spPr>
         <p:txBody>
           <a:bodyPr>
-            <a:noAutofit/>
+            <a:normAutofit/>
           </a:bodyPr>
           <a:lstStyle/>
           <a:p>
             <a:r>
-              <a:rPr lang="en-US" sz="8000" dirty="0"/>
-              <a:t>More explanation about a few systems that is inside the sub systems</a:t>
+              <a:rPr lang="en-US" sz="10000" dirty="0"/>
+              <a:t>Mathematical Modelling</a:t>
             </a:r>
           </a:p>
         </p:txBody>
@@ -4956,7 +4972,7 @@
     </p:spTree>
     <p:extLst>
       <p:ext uri="{BB962C8B-B14F-4D97-AF65-F5344CB8AC3E}">
-        <p14:creationId xmlns:p14="http://schemas.microsoft.com/office/powerpoint/2010/main" val="776749036"/>
+        <p14:creationId xmlns:p14="http://schemas.microsoft.com/office/powerpoint/2010/main" val="885709930"/>
       </p:ext>
     </p:extLst>
   </p:cSld>
@@ -4988,7 +5004,7 @@
           <p:cNvPr id="2" name="Title 1">
             <a:extLst>
               <a:ext uri="{FF2B5EF4-FFF2-40B4-BE49-F238E27FC236}">
-                <a16:creationId xmlns:a16="http://schemas.microsoft.com/office/drawing/2014/main" id="{63FA2295-5DE4-42AA-8D27-A722B6FAEB70}"/>
+                <a16:creationId xmlns:a16="http://schemas.microsoft.com/office/drawing/2014/main" id="{FDB2E409-38FB-4688-8B6B-076497284139}"/>
               </a:ext>
             </a:extLst>
           </p:cNvPr>
@@ -5001,82 +5017,60 @@
         </p:nvSpPr>
         <p:spPr>
           <a:xfrm>
-            <a:off x="838199" y="365125"/>
-            <a:ext cx="10515601" cy="1684900"/>
+            <a:off x="838200" y="365125"/>
+            <a:ext cx="10515600" cy="1460500"/>
           </a:xfrm>
         </p:spPr>
         <p:txBody>
-          <a:bodyPr>
-            <a:normAutofit fontScale="90000"/>
-          </a:bodyPr>
-          <a:lstStyle/>
-          <a:p>
-            <a:r>
-              <a:rPr lang="en-US" dirty="0"/>
-              <a:t>System that marks the attendance - </a:t>
-            </a:r>
-            <a:br>
-              <a:rPr lang="en-US" dirty="0"/>
-            </a:br>
-            <a:r>
-              <a:rPr lang="en-US" dirty="0"/>
-              <a:t>System that outputs a descriptor for “m” faces</a:t>
-            </a:r>
-          </a:p>
-        </p:txBody>
-      </p:sp>
-      <p:sp>
-        <p:nvSpPr>
-          <p:cNvPr id="3" name="Content Placeholder 2">
-            <a:extLst>
-              <a:ext uri="{FF2B5EF4-FFF2-40B4-BE49-F238E27FC236}">
-                <a16:creationId xmlns:a16="http://schemas.microsoft.com/office/drawing/2014/main" id="{A30DA9CB-2A27-4B68-990B-767029736F7E}"/>
-              </a:ext>
-            </a:extLst>
-          </p:cNvPr>
-          <p:cNvSpPr>
-            <a:spLocks noGrp="1"/>
-          </p:cNvSpPr>
+          <a:bodyPr/>
+          <a:lstStyle/>
+          <a:p>
+            <a:r>
+              <a:rPr lang="en-US" dirty="0"/>
+              <a:t>System that takes photo - System that signals the camera</a:t>
+            </a:r>
+          </a:p>
+        </p:txBody>
+      </p:sp>
+      <p:pic>
+        <p:nvPicPr>
+          <p:cNvPr id="5" name="Content Placeholder 4">
+            <a:extLst>
+              <a:ext uri="{FF2B5EF4-FFF2-40B4-BE49-F238E27FC236}">
+                <a16:creationId xmlns:a16="http://schemas.microsoft.com/office/drawing/2014/main" id="{05FCD3E6-9C4C-4F0B-B332-464A5EB23A76}"/>
+              </a:ext>
+            </a:extLst>
+          </p:cNvPr>
+          <p:cNvPicPr>
+            <a:picLocks noGrp="1" noChangeAspect="1"/>
+          </p:cNvPicPr>
           <p:nvPr>
             <p:ph idx="1"/>
           </p:nvPr>
-        </p:nvSpPr>
+        </p:nvPicPr>
+        <p:blipFill>
+          <a:blip r:embed="rId2">
+            <a:extLst>
+              <a:ext uri="{28A0092B-C50C-407E-A947-70E740481C1C}">
+                <a14:useLocalDpi xmlns:a14="http://schemas.microsoft.com/office/drawing/2010/main" val="0"/>
+              </a:ext>
+            </a:extLst>
+          </a:blip>
+          <a:stretch>
+            <a:fillRect/>
+          </a:stretch>
+        </p:blipFill>
         <p:spPr>
           <a:xfrm>
-            <a:off x="838200" y="2050025"/>
-            <a:ext cx="10515600" cy="4442849"/>
+            <a:off x="1821151" y="1825625"/>
+            <a:ext cx="8549698" cy="4351338"/>
           </a:xfrm>
         </p:spPr>
-        <p:txBody>
-          <a:bodyPr/>
-          <a:lstStyle/>
-          <a:p>
-            <a:r>
-              <a:rPr lang="en-US" dirty="0"/>
-              <a:t>System that iterates through the “m” detected faces and calls the following sub systems</a:t>
-            </a:r>
-          </a:p>
-          <a:p>
-            <a:r>
-              <a:rPr lang="en-US" dirty="0"/>
-              <a:t>System that outputs a descriptor(fixed size) for one face (Facial recognition) </a:t>
-            </a:r>
-          </a:p>
-          <a:p>
-            <a:r>
-              <a:rPr lang="en-US" dirty="0"/>
-              <a:t>System that stores these “m” descriptors </a:t>
-            </a:r>
-          </a:p>
-          <a:p>
-            <a:endParaRPr lang="en-US" dirty="0"/>
-          </a:p>
-        </p:txBody>
-      </p:sp>
+      </p:pic>
     </p:spTree>
     <p:extLst>
       <p:ext uri="{BB962C8B-B14F-4D97-AF65-F5344CB8AC3E}">
-        <p14:creationId xmlns:p14="http://schemas.microsoft.com/office/powerpoint/2010/main" val="3192779843"/>
+        <p14:creationId xmlns:p14="http://schemas.microsoft.com/office/powerpoint/2010/main" val="1902410595"/>
       </p:ext>
     </p:extLst>
   </p:cSld>
@@ -5108,7 +5102,7 @@
           <p:cNvPr id="2" name="Title 1">
             <a:extLst>
               <a:ext uri="{FF2B5EF4-FFF2-40B4-BE49-F238E27FC236}">
-                <a16:creationId xmlns:a16="http://schemas.microsoft.com/office/drawing/2014/main" id="{BC31AE2E-5951-4394-AD2F-0CCE4C714AC3}"/>
+                <a16:creationId xmlns:a16="http://schemas.microsoft.com/office/drawing/2014/main" id="{4B5F80A6-03CF-43A4-9141-D1046C0C0F66}"/>
               </a:ext>
             </a:extLst>
           </p:cNvPr>
@@ -5119,12 +5113,7 @@
             <p:ph type="title"/>
           </p:nvPr>
         </p:nvSpPr>
-        <p:spPr>
-          <a:xfrm>
-            <a:off x="838200" y="365125"/>
-            <a:ext cx="10515600" cy="1950372"/>
-          </a:xfrm>
-        </p:spPr>
+        <p:spPr/>
         <p:txBody>
           <a:bodyPr>
             <a:normAutofit fontScale="90000"/>
@@ -5136,14 +5125,7 @@
             </a:br>
             <a:r>
               <a:rPr lang="en-US" dirty="0"/>
-              <a:t>System that marks the attendance – </a:t>
-            </a:r>
-            <a:br>
-              <a:rPr lang="en-US" dirty="0"/>
-            </a:br>
-            <a:r>
-              <a:rPr lang="en-US" dirty="0"/>
-              <a:t>System that iterates through “m” descriptors and marks the attendance</a:t>
+              <a:t>System that marks the attendance - System that outputs a descriptor(fixed size) for one face (Facial recognition) </a:t>
             </a:r>
             <a:br>
               <a:rPr lang="en-US" dirty="0"/>
@@ -5152,61 +5134,45 @@
           </a:p>
         </p:txBody>
       </p:sp>
-      <p:sp>
-        <p:nvSpPr>
-          <p:cNvPr id="3" name="Content Placeholder 2">
-            <a:extLst>
-              <a:ext uri="{FF2B5EF4-FFF2-40B4-BE49-F238E27FC236}">
-                <a16:creationId xmlns:a16="http://schemas.microsoft.com/office/drawing/2014/main" id="{B7A0EC86-95BA-4EF9-950D-054B3B7F161F}"/>
-              </a:ext>
-            </a:extLst>
-          </p:cNvPr>
-          <p:cNvSpPr>
-            <a:spLocks noGrp="1"/>
-          </p:cNvSpPr>
+      <p:pic>
+        <p:nvPicPr>
+          <p:cNvPr id="5" name="Content Placeholder 4">
+            <a:extLst>
+              <a:ext uri="{FF2B5EF4-FFF2-40B4-BE49-F238E27FC236}">
+                <a16:creationId xmlns:a16="http://schemas.microsoft.com/office/drawing/2014/main" id="{CC7B8565-B0EF-4A50-9E95-F54C10332229}"/>
+              </a:ext>
+            </a:extLst>
+          </p:cNvPr>
+          <p:cNvPicPr>
+            <a:picLocks noGrp="1" noChangeAspect="1"/>
+          </p:cNvPicPr>
           <p:nvPr>
             <p:ph idx="1"/>
           </p:nvPr>
-        </p:nvSpPr>
+        </p:nvPicPr>
+        <p:blipFill>
+          <a:blip r:embed="rId2">
+            <a:extLst>
+              <a:ext uri="{28A0092B-C50C-407E-A947-70E740481C1C}">
+                <a14:useLocalDpi xmlns:a14="http://schemas.microsoft.com/office/drawing/2010/main" val="0"/>
+              </a:ext>
+            </a:extLst>
+          </a:blip>
+          <a:stretch>
+            <a:fillRect/>
+          </a:stretch>
+        </p:blipFill>
         <p:spPr>
           <a:xfrm>
-            <a:off x="838200" y="2315497"/>
-            <a:ext cx="10515600" cy="4177378"/>
+            <a:off x="1108966" y="2372291"/>
+            <a:ext cx="9974067" cy="3258005"/>
           </a:xfrm>
         </p:spPr>
-        <p:txBody>
-          <a:bodyPr/>
-          <a:lstStyle/>
-          <a:p>
-            <a:r>
-              <a:rPr lang="en-US" dirty="0"/>
-              <a:t>System that iterates through the database containing “n” descriptors </a:t>
-            </a:r>
-          </a:p>
-          <a:p>
-            <a:r>
-              <a:rPr lang="en-US" dirty="0"/>
-              <a:t>System that checks whether 2 descriptors are same</a:t>
-            </a:r>
-          </a:p>
-          <a:p>
-            <a:r>
-              <a:rPr lang="en-US" dirty="0"/>
-              <a:t>System that gives the register number of a given descriptor </a:t>
-            </a:r>
-          </a:p>
-          <a:p>
-            <a:r>
-              <a:rPr lang="en-US" dirty="0"/>
-              <a:t>System that marks the attendance against the register number </a:t>
-            </a:r>
-          </a:p>
-        </p:txBody>
-      </p:sp>
+      </p:pic>
     </p:spTree>
     <p:extLst>
       <p:ext uri="{BB962C8B-B14F-4D97-AF65-F5344CB8AC3E}">
-        <p14:creationId xmlns:p14="http://schemas.microsoft.com/office/powerpoint/2010/main" val="352402098"/>
+        <p14:creationId xmlns:p14="http://schemas.microsoft.com/office/powerpoint/2010/main" val="3198791146"/>
       </p:ext>
     </p:extLst>
   </p:cSld>
@@ -5238,7 +5204,7 @@
           <p:cNvPr id="2" name="Title 1">
             <a:extLst>
               <a:ext uri="{FF2B5EF4-FFF2-40B4-BE49-F238E27FC236}">
-                <a16:creationId xmlns:a16="http://schemas.microsoft.com/office/drawing/2014/main" id="{CD432508-6B86-4A7D-A45F-50F075877E79}"/>
+                <a16:creationId xmlns:a16="http://schemas.microsoft.com/office/drawing/2014/main" id="{50BD2304-0136-4715-9EF5-C9237713BFCA}"/>
               </a:ext>
             </a:extLst>
           </p:cNvPr>
@@ -5249,29 +5215,66 @@
             <p:ph type="title"/>
           </p:nvPr>
         </p:nvSpPr>
+        <p:spPr/>
+        <p:txBody>
+          <a:bodyPr>
+            <a:normAutofit fontScale="90000"/>
+          </a:bodyPr>
+          <a:lstStyle/>
+          <a:p>
+            <a:br>
+              <a:rPr lang="en-US" dirty="0"/>
+            </a:br>
+            <a:r>
+              <a:rPr lang="en-US" dirty="0"/>
+              <a:t>System that marks the attendance - System that checks whether 2 descriptors are same</a:t>
+            </a:r>
+            <a:br>
+              <a:rPr lang="en-US" dirty="0"/>
+            </a:br>
+            <a:endParaRPr lang="en-US" dirty="0"/>
+          </a:p>
+        </p:txBody>
+      </p:sp>
+      <p:pic>
+        <p:nvPicPr>
+          <p:cNvPr id="5" name="Content Placeholder 4">
+            <a:extLst>
+              <a:ext uri="{FF2B5EF4-FFF2-40B4-BE49-F238E27FC236}">
+                <a16:creationId xmlns:a16="http://schemas.microsoft.com/office/drawing/2014/main" id="{D84398D9-5D82-408B-AA25-10D8ADF2DE27}"/>
+              </a:ext>
+            </a:extLst>
+          </p:cNvPr>
+          <p:cNvPicPr>
+            <a:picLocks noGrp="1" noChangeAspect="1"/>
+          </p:cNvPicPr>
+          <p:nvPr>
+            <p:ph idx="1"/>
+          </p:nvPr>
+        </p:nvPicPr>
+        <p:blipFill>
+          <a:blip r:embed="rId2">
+            <a:extLst>
+              <a:ext uri="{28A0092B-C50C-407E-A947-70E740481C1C}">
+                <a14:useLocalDpi xmlns:a14="http://schemas.microsoft.com/office/drawing/2010/main" val="0"/>
+              </a:ext>
+            </a:extLst>
+          </a:blip>
+          <a:stretch>
+            <a:fillRect/>
+          </a:stretch>
+        </p:blipFill>
         <p:spPr>
           <a:xfrm>
-            <a:off x="838200" y="365125"/>
-            <a:ext cx="11063514" cy="6035675"/>
+            <a:off x="2059759" y="1825625"/>
+            <a:ext cx="8658552" cy="4667250"/>
           </a:xfrm>
         </p:spPr>
-        <p:txBody>
-          <a:bodyPr>
-            <a:normAutofit/>
-          </a:bodyPr>
-          <a:lstStyle/>
-          <a:p>
-            <a:r>
-              <a:rPr lang="en-US" sz="10000" dirty="0"/>
-              <a:t>Mathematical Modelling</a:t>
-            </a:r>
-          </a:p>
-        </p:txBody>
-      </p:sp>
+      </p:pic>
     </p:spTree>
     <p:extLst>
       <p:ext uri="{BB962C8B-B14F-4D97-AF65-F5344CB8AC3E}">
-        <p14:creationId xmlns:p14="http://schemas.microsoft.com/office/powerpoint/2010/main" val="885709930"/>
+        <p14:creationId xmlns:p14="http://schemas.microsoft.com/office/powerpoint/2010/main" val="1783297979"/>
       </p:ext>
     </p:extLst>
   </p:cSld>
@@ -5413,7 +5416,7 @@
           <p:cNvPr id="2" name="Title 1">
             <a:extLst>
               <a:ext uri="{FF2B5EF4-FFF2-40B4-BE49-F238E27FC236}">
-                <a16:creationId xmlns:a16="http://schemas.microsoft.com/office/drawing/2014/main" id="{FDB2E409-38FB-4688-8B6B-076497284139}"/>
+                <a16:creationId xmlns:a16="http://schemas.microsoft.com/office/drawing/2014/main" id="{89E33410-CC78-427C-9443-2C1EF32AF06A}"/>
               </a:ext>
             </a:extLst>
           </p:cNvPr>
@@ -5427,59 +5430,26 @@
         <p:spPr>
           <a:xfrm>
             <a:off x="838200" y="365125"/>
-            <a:ext cx="10515600" cy="1460500"/>
+            <a:ext cx="10901516" cy="6006178"/>
           </a:xfrm>
         </p:spPr>
         <p:txBody>
-          <a:bodyPr/>
-          <a:lstStyle/>
-          <a:p>
-            <a:r>
-              <a:rPr lang="en-US" dirty="0"/>
-              <a:t>System that takes photo - System that signals the camera</a:t>
-            </a:r>
-          </a:p>
-        </p:txBody>
-      </p:sp>
-      <p:pic>
-        <p:nvPicPr>
-          <p:cNvPr id="5" name="Content Placeholder 4">
-            <a:extLst>
-              <a:ext uri="{FF2B5EF4-FFF2-40B4-BE49-F238E27FC236}">
-                <a16:creationId xmlns:a16="http://schemas.microsoft.com/office/drawing/2014/main" id="{05FCD3E6-9C4C-4F0B-B332-464A5EB23A76}"/>
-              </a:ext>
-            </a:extLst>
-          </p:cNvPr>
-          <p:cNvPicPr>
-            <a:picLocks noGrp="1" noChangeAspect="1"/>
-          </p:cNvPicPr>
-          <p:nvPr>
-            <p:ph idx="1"/>
-          </p:nvPr>
-        </p:nvPicPr>
-        <p:blipFill>
-          <a:blip r:embed="rId2">
-            <a:extLst>
-              <a:ext uri="{28A0092B-C50C-407E-A947-70E740481C1C}">
-                <a14:useLocalDpi xmlns:a14="http://schemas.microsoft.com/office/drawing/2010/main" val="0"/>
-              </a:ext>
-            </a:extLst>
-          </a:blip>
-          <a:stretch>
-            <a:fillRect/>
-          </a:stretch>
-        </p:blipFill>
-        <p:spPr>
-          <a:xfrm>
-            <a:off x="1821151" y="1825625"/>
-            <a:ext cx="8549698" cy="4351338"/>
-          </a:xfrm>
-        </p:spPr>
-      </p:pic>
+          <a:bodyPr>
+            <a:normAutofit/>
+          </a:bodyPr>
+          <a:lstStyle/>
+          <a:p>
+            <a:r>
+              <a:rPr lang="en-US" sz="10000" dirty="0"/>
+              <a:t>Objectives</a:t>
+            </a:r>
+          </a:p>
+        </p:txBody>
+      </p:sp>
     </p:spTree>
     <p:extLst>
       <p:ext uri="{BB962C8B-B14F-4D97-AF65-F5344CB8AC3E}">
-        <p14:creationId xmlns:p14="http://schemas.microsoft.com/office/powerpoint/2010/main" val="1902410595"/>
+        <p14:creationId xmlns:p14="http://schemas.microsoft.com/office/powerpoint/2010/main" val="1469367624"/>
       </p:ext>
     </p:extLst>
   </p:cSld>
@@ -5511,7 +5481,7 @@
           <p:cNvPr id="2" name="Title 1">
             <a:extLst>
               <a:ext uri="{FF2B5EF4-FFF2-40B4-BE49-F238E27FC236}">
-                <a16:creationId xmlns:a16="http://schemas.microsoft.com/office/drawing/2014/main" id="{4B5F80A6-03CF-43A4-9141-D1046C0C0F66}"/>
+                <a16:creationId xmlns:a16="http://schemas.microsoft.com/office/drawing/2014/main" id="{35C3B37A-8BA1-4040-84C9-096D7081FA8B}"/>
               </a:ext>
             </a:extLst>
           </p:cNvPr>
@@ -5524,64 +5494,68 @@
         </p:nvSpPr>
         <p:spPr/>
         <p:txBody>
-          <a:bodyPr>
-            <a:normAutofit fontScale="90000"/>
-          </a:bodyPr>
-          <a:lstStyle/>
-          <a:p>
-            <a:br>
-              <a:rPr lang="en-US" dirty="0"/>
-            </a:br>
-            <a:r>
-              <a:rPr lang="en-US" dirty="0"/>
-              <a:t>System that marks the attendance - System that outputs a descriptor(fixed size) for one face (Facial recognition) </a:t>
-            </a:r>
-            <a:br>
-              <a:rPr lang="en-US" dirty="0"/>
-            </a:br>
+          <a:bodyPr/>
+          <a:lstStyle/>
+          <a:p>
+            <a:r>
+              <a:rPr lang="en-US" dirty="0"/>
+              <a:t>1</a:t>
+            </a:r>
+            <a:r>
+              <a:rPr lang="en-US" baseline="30000" dirty="0"/>
+              <a:t>ST  Objective</a:t>
+            </a:r>
             <a:endParaRPr lang="en-US" dirty="0"/>
           </a:p>
         </p:txBody>
       </p:sp>
-      <p:pic>
-        <p:nvPicPr>
-          <p:cNvPr id="5" name="Content Placeholder 4">
-            <a:extLst>
-              <a:ext uri="{FF2B5EF4-FFF2-40B4-BE49-F238E27FC236}">
-                <a16:creationId xmlns:a16="http://schemas.microsoft.com/office/drawing/2014/main" id="{CC7B8565-B0EF-4A50-9E95-F54C10332229}"/>
-              </a:ext>
-            </a:extLst>
-          </p:cNvPr>
-          <p:cNvPicPr>
-            <a:picLocks noGrp="1" noChangeAspect="1"/>
-          </p:cNvPicPr>
+      <p:sp>
+        <p:nvSpPr>
+          <p:cNvPr id="3" name="Content Placeholder 2">
+            <a:extLst>
+              <a:ext uri="{FF2B5EF4-FFF2-40B4-BE49-F238E27FC236}">
+                <a16:creationId xmlns:a16="http://schemas.microsoft.com/office/drawing/2014/main" id="{9DC412A5-21A0-4E6B-AEB9-68EDB678AF4B}"/>
+              </a:ext>
+            </a:extLst>
+          </p:cNvPr>
+          <p:cNvSpPr>
+            <a:spLocks noGrp="1"/>
+          </p:cNvSpPr>
           <p:nvPr>
             <p:ph idx="1"/>
           </p:nvPr>
-        </p:nvPicPr>
-        <p:blipFill>
-          <a:blip r:embed="rId2">
-            <a:extLst>
-              <a:ext uri="{28A0092B-C50C-407E-A947-70E740481C1C}">
-                <a14:useLocalDpi xmlns:a14="http://schemas.microsoft.com/office/drawing/2010/main" val="0"/>
-              </a:ext>
-            </a:extLst>
-          </a:blip>
-          <a:stretch>
-            <a:fillRect/>
-          </a:stretch>
-        </p:blipFill>
-        <p:spPr>
-          <a:xfrm>
-            <a:off x="1108966" y="2372291"/>
-            <a:ext cx="9974067" cy="3258005"/>
-          </a:xfrm>
-        </p:spPr>
-      </p:pic>
+        </p:nvSpPr>
+        <p:spPr/>
+        <p:txBody>
+          <a:bodyPr/>
+          <a:lstStyle/>
+          <a:p>
+            <a:r>
+              <a:rPr lang="en-US" dirty="0"/>
+              <a:t>One camera </a:t>
+            </a:r>
+          </a:p>
+          <a:p>
+            <a:r>
+              <a:rPr lang="en-US" dirty="0"/>
+              <a:t>One person to stand before the camera </a:t>
+            </a:r>
+          </a:p>
+          <a:p>
+            <a:r>
+              <a:rPr lang="en-US" dirty="0"/>
+              <a:t>Detect the face in the image and run the face recognition</a:t>
+            </a:r>
+          </a:p>
+          <a:p>
+            <a:endParaRPr lang="en-US" dirty="0"/>
+          </a:p>
+        </p:txBody>
+      </p:sp>
     </p:spTree>
     <p:extLst>
       <p:ext uri="{BB962C8B-B14F-4D97-AF65-F5344CB8AC3E}">
-        <p14:creationId xmlns:p14="http://schemas.microsoft.com/office/powerpoint/2010/main" val="3198791146"/>
+        <p14:creationId xmlns:p14="http://schemas.microsoft.com/office/powerpoint/2010/main" val="1079939939"/>
       </p:ext>
     </p:extLst>
   </p:cSld>
@@ -5613,7 +5587,7 @@
           <p:cNvPr id="2" name="Title 1">
             <a:extLst>
               <a:ext uri="{FF2B5EF4-FFF2-40B4-BE49-F238E27FC236}">
-                <a16:creationId xmlns:a16="http://schemas.microsoft.com/office/drawing/2014/main" id="{50BD2304-0136-4715-9EF5-C9237713BFCA}"/>
+                <a16:creationId xmlns:a16="http://schemas.microsoft.com/office/drawing/2014/main" id="{FB7EB5FB-5907-4CC7-BFE6-0FAC371FA4C0}"/>
               </a:ext>
             </a:extLst>
           </p:cNvPr>
@@ -5626,64 +5600,68 @@
         </p:nvSpPr>
         <p:spPr/>
         <p:txBody>
-          <a:bodyPr>
-            <a:normAutofit fontScale="90000"/>
-          </a:bodyPr>
-          <a:lstStyle/>
-          <a:p>
-            <a:br>
-              <a:rPr lang="en-US" dirty="0"/>
-            </a:br>
-            <a:r>
-              <a:rPr lang="en-US" dirty="0"/>
-              <a:t>System that marks the attendance - System that checks whether 2 descriptors are same</a:t>
-            </a:r>
-            <a:br>
-              <a:rPr lang="en-US" dirty="0"/>
-            </a:br>
-            <a:endParaRPr lang="en-US" dirty="0"/>
-          </a:p>
-        </p:txBody>
-      </p:sp>
-      <p:pic>
-        <p:nvPicPr>
-          <p:cNvPr id="5" name="Content Placeholder 4">
-            <a:extLst>
-              <a:ext uri="{FF2B5EF4-FFF2-40B4-BE49-F238E27FC236}">
-                <a16:creationId xmlns:a16="http://schemas.microsoft.com/office/drawing/2014/main" id="{D84398D9-5D82-408B-AA25-10D8ADF2DE27}"/>
-              </a:ext>
-            </a:extLst>
-          </p:cNvPr>
-          <p:cNvPicPr>
-            <a:picLocks noGrp="1" noChangeAspect="1"/>
-          </p:cNvPicPr>
+          <a:bodyPr/>
+          <a:lstStyle/>
+          <a:p>
+            <a:r>
+              <a:rPr lang="en-US" dirty="0"/>
+              <a:t>2</a:t>
+            </a:r>
+            <a:r>
+              <a:rPr lang="en-US" baseline="30000" dirty="0"/>
+              <a:t>nd</a:t>
+            </a:r>
+            <a:r>
+              <a:rPr lang="en-US" dirty="0"/>
+              <a:t> Objective </a:t>
+            </a:r>
+          </a:p>
+        </p:txBody>
+      </p:sp>
+      <p:sp>
+        <p:nvSpPr>
+          <p:cNvPr id="3" name="Content Placeholder 2">
+            <a:extLst>
+              <a:ext uri="{FF2B5EF4-FFF2-40B4-BE49-F238E27FC236}">
+                <a16:creationId xmlns:a16="http://schemas.microsoft.com/office/drawing/2014/main" id="{16C43A03-4F2B-4ACC-818C-A6B0F72E3C6F}"/>
+              </a:ext>
+            </a:extLst>
+          </p:cNvPr>
+          <p:cNvSpPr>
+            <a:spLocks noGrp="1"/>
+          </p:cNvSpPr>
           <p:nvPr>
             <p:ph idx="1"/>
           </p:nvPr>
-        </p:nvPicPr>
-        <p:blipFill>
-          <a:blip r:embed="rId2">
-            <a:extLst>
-              <a:ext uri="{28A0092B-C50C-407E-A947-70E740481C1C}">
-                <a14:useLocalDpi xmlns:a14="http://schemas.microsoft.com/office/drawing/2010/main" val="0"/>
-              </a:ext>
-            </a:extLst>
-          </a:blip>
-          <a:stretch>
-            <a:fillRect/>
-          </a:stretch>
-        </p:blipFill>
-        <p:spPr>
-          <a:xfrm>
-            <a:off x="2059759" y="1825625"/>
-            <a:ext cx="8658552" cy="4667250"/>
-          </a:xfrm>
-        </p:spPr>
-      </p:pic>
+        </p:nvSpPr>
+        <p:spPr/>
+        <p:txBody>
+          <a:bodyPr/>
+          <a:lstStyle/>
+          <a:p>
+            <a:r>
+              <a:rPr lang="en-US" dirty="0"/>
+              <a:t>One person </a:t>
+            </a:r>
+          </a:p>
+          <a:p>
+            <a:r>
+              <a:rPr lang="en-US" dirty="0"/>
+              <a:t>A group of people </a:t>
+            </a:r>
+          </a:p>
+          <a:p>
+            <a:r>
+              <a:rPr lang="en-US" dirty="0"/>
+              <a:t>Run a face detection model to find the faces in the picture and face recognition algorithm against it</a:t>
+            </a:r>
+          </a:p>
+        </p:txBody>
+      </p:sp>
     </p:spTree>
     <p:extLst>
       <p:ext uri="{BB962C8B-B14F-4D97-AF65-F5344CB8AC3E}">
-        <p14:creationId xmlns:p14="http://schemas.microsoft.com/office/powerpoint/2010/main" val="1783297979"/>
+        <p14:creationId xmlns:p14="http://schemas.microsoft.com/office/powerpoint/2010/main" val="4184157174"/>
       </p:ext>
     </p:extLst>
   </p:cSld>
@@ -5715,7 +5693,7 @@
           <p:cNvPr id="2" name="Title 1">
             <a:extLst>
               <a:ext uri="{FF2B5EF4-FFF2-40B4-BE49-F238E27FC236}">
-                <a16:creationId xmlns:a16="http://schemas.microsoft.com/office/drawing/2014/main" id="{89E33410-CC78-427C-9443-2C1EF32AF06A}"/>
+                <a16:creationId xmlns:a16="http://schemas.microsoft.com/office/drawing/2014/main" id="{F2D302F5-BC8A-4AFF-822A-323C9644CA4D}"/>
               </a:ext>
             </a:extLst>
           </p:cNvPr>
@@ -5726,21 +5704,69 @@
             <p:ph type="title"/>
           </p:nvPr>
         </p:nvSpPr>
-        <p:spPr>
-          <a:xfrm>
-            <a:off x="838200" y="365125"/>
-            <a:ext cx="10901516" cy="6006178"/>
-          </a:xfrm>
-        </p:spPr>
-        <p:txBody>
-          <a:bodyPr>
-            <a:normAutofit/>
-          </a:bodyPr>
-          <a:lstStyle/>
-          <a:p>
-            <a:r>
-              <a:rPr lang="en-US" sz="10000" dirty="0"/>
-              <a:t>Objectives</a:t>
+        <p:spPr/>
+        <p:txBody>
+          <a:bodyPr/>
+          <a:lstStyle/>
+          <a:p>
+            <a:r>
+              <a:rPr lang="en-US" dirty="0"/>
+              <a:t>3</a:t>
+            </a:r>
+            <a:r>
+              <a:rPr lang="en-US" baseline="30000" dirty="0"/>
+              <a:t>rd</a:t>
+            </a:r>
+            <a:r>
+              <a:rPr lang="en-US" dirty="0"/>
+              <a:t> Objective </a:t>
+            </a:r>
+          </a:p>
+        </p:txBody>
+      </p:sp>
+      <p:sp>
+        <p:nvSpPr>
+          <p:cNvPr id="3" name="Content Placeholder 2">
+            <a:extLst>
+              <a:ext uri="{FF2B5EF4-FFF2-40B4-BE49-F238E27FC236}">
+                <a16:creationId xmlns:a16="http://schemas.microsoft.com/office/drawing/2014/main" id="{D17D23C6-D4BE-4AB4-AF2A-24DE668C9867}"/>
+              </a:ext>
+            </a:extLst>
+          </p:cNvPr>
+          <p:cNvSpPr>
+            <a:spLocks noGrp="1"/>
+          </p:cNvSpPr>
+          <p:nvPr>
+            <p:ph idx="1"/>
+          </p:nvPr>
+        </p:nvSpPr>
+        <p:spPr/>
+        <p:txBody>
+          <a:bodyPr/>
+          <a:lstStyle/>
+          <a:p>
+            <a:r>
+              <a:rPr lang="en-US" dirty="0"/>
+              <a:t>Try different face detection algorithms </a:t>
+            </a:r>
+          </a:p>
+          <a:p>
+            <a:r>
+              <a:rPr lang="en-US" dirty="0"/>
+              <a:t>Select the algorithm which has lowest false negatives </a:t>
+            </a:r>
+          </a:p>
+          <a:p>
+            <a:r>
+              <a:rPr lang="en-US" dirty="0"/>
+              <a:t>Note down other metrics like </a:t>
+            </a:r>
+          </a:p>
+          <a:p>
+            <a:pPr lvl="1"/>
+            <a:r>
+              <a:rPr lang="en-US" dirty="0"/>
+              <a:t>The least dimension of the facial image that is required for the face detection algorithm </a:t>
             </a:r>
           </a:p>
         </p:txBody>
@@ -5748,7 +5774,7 @@
     </p:spTree>
     <p:extLst>
       <p:ext uri="{BB962C8B-B14F-4D97-AF65-F5344CB8AC3E}">
-        <p14:creationId xmlns:p14="http://schemas.microsoft.com/office/powerpoint/2010/main" val="1469367624"/>
+        <p14:creationId xmlns:p14="http://schemas.microsoft.com/office/powerpoint/2010/main" val="832009256"/>
       </p:ext>
     </p:extLst>
   </p:cSld>
@@ -5780,7 +5806,7 @@
           <p:cNvPr id="2" name="Title 1">
             <a:extLst>
               <a:ext uri="{FF2B5EF4-FFF2-40B4-BE49-F238E27FC236}">
-                <a16:creationId xmlns:a16="http://schemas.microsoft.com/office/drawing/2014/main" id="{35C3B37A-8BA1-4040-84C9-096D7081FA8B}"/>
+                <a16:creationId xmlns:a16="http://schemas.microsoft.com/office/drawing/2014/main" id="{7B3117DA-016C-4D50-8E69-F0A6035C295D}"/>
               </a:ext>
             </a:extLst>
           </p:cNvPr>
@@ -5798,53 +5824,64 @@
           <a:p>
             <a:r>
               <a:rPr lang="en-US" dirty="0"/>
-              <a:t>1</a:t>
+              <a:t>4</a:t>
             </a:r>
             <a:r>
               <a:rPr lang="en-US" baseline="30000" dirty="0"/>
-              <a:t>ST  Objective</a:t>
-            </a:r>
+              <a:t>th</a:t>
+            </a:r>
+            <a:r>
+              <a:rPr lang="en-US" dirty="0"/>
+              <a:t> Objective </a:t>
+            </a:r>
+          </a:p>
+        </p:txBody>
+      </p:sp>
+      <p:sp>
+        <p:nvSpPr>
+          <p:cNvPr id="3" name="Content Placeholder 2">
+            <a:extLst>
+              <a:ext uri="{FF2B5EF4-FFF2-40B4-BE49-F238E27FC236}">
+                <a16:creationId xmlns:a16="http://schemas.microsoft.com/office/drawing/2014/main" id="{F401B27B-1C13-462A-97F1-B320722D48BE}"/>
+              </a:ext>
+            </a:extLst>
+          </p:cNvPr>
+          <p:cNvSpPr>
+            <a:spLocks noGrp="1"/>
+          </p:cNvSpPr>
+          <p:nvPr>
+            <p:ph idx="1"/>
+          </p:nvPr>
+        </p:nvSpPr>
+        <p:spPr/>
+        <p:txBody>
+          <a:bodyPr/>
+          <a:lstStyle/>
+          <a:p>
+            <a:r>
+              <a:rPr lang="en-US" dirty="0"/>
+              <a:t>Design the camera position , the angle etc.</a:t>
+            </a:r>
+          </a:p>
+          <a:p>
+            <a:r>
+              <a:rPr lang="en-US" dirty="0"/>
+              <a:t>The algorithm that was decided on 3</a:t>
+            </a:r>
+            <a:r>
+              <a:rPr lang="en-US" baseline="30000" dirty="0"/>
+              <a:t>rd</a:t>
+            </a:r>
+            <a:r>
+              <a:rPr lang="en-US" dirty="0"/>
+              <a:t> objective to be used here to test  the camera angle and other metrics like finding how many persons can be covered</a:t>
+            </a:r>
+          </a:p>
+          <a:p>
+            <a:pPr marL="0" indent="0">
+              <a:buNone/>
+            </a:pPr>
             <a:endParaRPr lang="en-US" dirty="0"/>
-          </a:p>
-        </p:txBody>
-      </p:sp>
-      <p:sp>
-        <p:nvSpPr>
-          <p:cNvPr id="3" name="Content Placeholder 2">
-            <a:extLst>
-              <a:ext uri="{FF2B5EF4-FFF2-40B4-BE49-F238E27FC236}">
-                <a16:creationId xmlns:a16="http://schemas.microsoft.com/office/drawing/2014/main" id="{9DC412A5-21A0-4E6B-AEB9-68EDB678AF4B}"/>
-              </a:ext>
-            </a:extLst>
-          </p:cNvPr>
-          <p:cNvSpPr>
-            <a:spLocks noGrp="1"/>
-          </p:cNvSpPr>
-          <p:nvPr>
-            <p:ph idx="1"/>
-          </p:nvPr>
-        </p:nvSpPr>
-        <p:spPr/>
-        <p:txBody>
-          <a:bodyPr/>
-          <a:lstStyle/>
-          <a:p>
-            <a:r>
-              <a:rPr lang="en-US" dirty="0"/>
-              <a:t>One camera </a:t>
-            </a:r>
-          </a:p>
-          <a:p>
-            <a:r>
-              <a:rPr lang="en-US" dirty="0"/>
-              <a:t>One person to stand before the camera </a:t>
-            </a:r>
-          </a:p>
-          <a:p>
-            <a:r>
-              <a:rPr lang="en-US" dirty="0"/>
-              <a:t>Detect the face in the image and run the face recognition</a:t>
-            </a:r>
           </a:p>
           <a:p>
             <a:endParaRPr lang="en-US" dirty="0"/>
@@ -5854,7 +5891,7 @@
     </p:spTree>
     <p:extLst>
       <p:ext uri="{BB962C8B-B14F-4D97-AF65-F5344CB8AC3E}">
-        <p14:creationId xmlns:p14="http://schemas.microsoft.com/office/powerpoint/2010/main" val="1079939939"/>
+        <p14:creationId xmlns:p14="http://schemas.microsoft.com/office/powerpoint/2010/main" val="4146658703"/>
       </p:ext>
     </p:extLst>
   </p:cSld>
@@ -5886,7 +5923,7 @@
           <p:cNvPr id="2" name="Title 1">
             <a:extLst>
               <a:ext uri="{FF2B5EF4-FFF2-40B4-BE49-F238E27FC236}">
-                <a16:creationId xmlns:a16="http://schemas.microsoft.com/office/drawing/2014/main" id="{FB7EB5FB-5907-4CC7-BFE6-0FAC371FA4C0}"/>
+                <a16:creationId xmlns:a16="http://schemas.microsoft.com/office/drawing/2014/main" id="{BF705B5D-60D1-4F70-A1E3-8318785F6C75}"/>
               </a:ext>
             </a:extLst>
           </p:cNvPr>
@@ -5904,15 +5941,15 @@
           <a:p>
             <a:r>
               <a:rPr lang="en-US" dirty="0"/>
-              <a:t>2</a:t>
+              <a:t>5</a:t>
             </a:r>
             <a:r>
               <a:rPr lang="en-US" baseline="30000" dirty="0"/>
-              <a:t>nd</a:t>
-            </a:r>
-            <a:r>
-              <a:rPr lang="en-US" dirty="0"/>
-              <a:t> Objective </a:t>
+              <a:t>th</a:t>
+            </a:r>
+            <a:r>
+              <a:rPr lang="en-US" dirty="0"/>
+              <a:t> objective </a:t>
             </a:r>
           </a:p>
         </p:txBody>
@@ -5922,7 +5959,7 @@
           <p:cNvPr id="3" name="Content Placeholder 2">
             <a:extLst>
               <a:ext uri="{FF2B5EF4-FFF2-40B4-BE49-F238E27FC236}">
-                <a16:creationId xmlns:a16="http://schemas.microsoft.com/office/drawing/2014/main" id="{16C43A03-4F2B-4ACC-818C-A6B0F72E3C6F}"/>
+                <a16:creationId xmlns:a16="http://schemas.microsoft.com/office/drawing/2014/main" id="{5CC9FC1D-AD0E-4548-B97F-C2126D943F45}"/>
               </a:ext>
             </a:extLst>
           </p:cNvPr>
@@ -5940,19 +5977,21 @@
           <a:p>
             <a:r>
               <a:rPr lang="en-US" dirty="0"/>
-              <a:t>One person </a:t>
-            </a:r>
-          </a:p>
-          <a:p>
-            <a:r>
-              <a:rPr lang="en-US" dirty="0"/>
-              <a:t>A group of people </a:t>
-            </a:r>
-          </a:p>
-          <a:p>
-            <a:r>
-              <a:rPr lang="en-US" dirty="0"/>
-              <a:t>Run a face detection model to find the faces in the picture and face recognition algorithm against it</a:t>
+              <a:t>Find the best camera angle and algorithm (both face detection and face recognition) that has reduced false negatives, is fast </a:t>
+            </a:r>
+            <a:r>
+              <a:rPr lang="en-US" dirty="0" err="1"/>
+              <a:t>etc</a:t>
+            </a:r>
+            <a:r>
+              <a:rPr lang="en-US" dirty="0"/>
+              <a:t> </a:t>
+            </a:r>
+          </a:p>
+          <a:p>
+            <a:r>
+              <a:rPr lang="en-US" dirty="0"/>
+              <a:t>Iterate through 3 and 4 objective to find the best combination of camera and algorithm</a:t>
             </a:r>
           </a:p>
         </p:txBody>
@@ -5960,7 +5999,7 @@
     </p:spTree>
     <p:extLst>
       <p:ext uri="{BB962C8B-B14F-4D97-AF65-F5344CB8AC3E}">
-        <p14:creationId xmlns:p14="http://schemas.microsoft.com/office/powerpoint/2010/main" val="4184157174"/>
+        <p14:creationId xmlns:p14="http://schemas.microsoft.com/office/powerpoint/2010/main" val="1891443787"/>
       </p:ext>
     </p:extLst>
   </p:cSld>
@@ -5992,7 +6031,7 @@
           <p:cNvPr id="2" name="Title 1">
             <a:extLst>
               <a:ext uri="{FF2B5EF4-FFF2-40B4-BE49-F238E27FC236}">
-                <a16:creationId xmlns:a16="http://schemas.microsoft.com/office/drawing/2014/main" id="{F2D302F5-BC8A-4AFF-822A-323C9644CA4D}"/>
+                <a16:creationId xmlns:a16="http://schemas.microsoft.com/office/drawing/2014/main" id="{04D1FA27-C5C7-4A78-A1F2-5CE87A8F6E0F}"/>
               </a:ext>
             </a:extLst>
           </p:cNvPr>
@@ -6003,69 +6042,21 @@
             <p:ph type="title"/>
           </p:nvPr>
         </p:nvSpPr>
-        <p:spPr/>
-        <p:txBody>
-          <a:bodyPr/>
-          <a:lstStyle/>
-          <a:p>
-            <a:r>
-              <a:rPr lang="en-US" dirty="0"/>
-              <a:t>3</a:t>
-            </a:r>
-            <a:r>
-              <a:rPr lang="en-US" baseline="30000" dirty="0"/>
-              <a:t>rd</a:t>
-            </a:r>
-            <a:r>
-              <a:rPr lang="en-US" dirty="0"/>
-              <a:t> Objective </a:t>
-            </a:r>
-          </a:p>
-        </p:txBody>
-      </p:sp>
-      <p:sp>
-        <p:nvSpPr>
-          <p:cNvPr id="3" name="Content Placeholder 2">
-            <a:extLst>
-              <a:ext uri="{FF2B5EF4-FFF2-40B4-BE49-F238E27FC236}">
-                <a16:creationId xmlns:a16="http://schemas.microsoft.com/office/drawing/2014/main" id="{D17D23C6-D4BE-4AB4-AF2A-24DE668C9867}"/>
-              </a:ext>
-            </a:extLst>
-          </p:cNvPr>
-          <p:cNvSpPr>
-            <a:spLocks noGrp="1"/>
-          </p:cNvSpPr>
-          <p:nvPr>
-            <p:ph idx="1"/>
-          </p:nvPr>
-        </p:nvSpPr>
-        <p:spPr/>
-        <p:txBody>
-          <a:bodyPr/>
-          <a:lstStyle/>
-          <a:p>
-            <a:r>
-              <a:rPr lang="en-US" dirty="0"/>
-              <a:t>Try different face detection algorithms </a:t>
-            </a:r>
-          </a:p>
-          <a:p>
-            <a:r>
-              <a:rPr lang="en-US" dirty="0"/>
-              <a:t>Select the algorithm which has lowest false negatives </a:t>
-            </a:r>
-          </a:p>
-          <a:p>
-            <a:r>
-              <a:rPr lang="en-US" dirty="0"/>
-              <a:t>Note down other metrics like </a:t>
-            </a:r>
-          </a:p>
-          <a:p>
-            <a:pPr lvl="1"/>
-            <a:r>
-              <a:rPr lang="en-US" dirty="0"/>
-              <a:t>The least dimension of the facial image that is required for the face detection algorithm </a:t>
+        <p:spPr>
+          <a:xfrm>
+            <a:off x="838199" y="365125"/>
+            <a:ext cx="10916265" cy="6212656"/>
+          </a:xfrm>
+        </p:spPr>
+        <p:txBody>
+          <a:bodyPr>
+            <a:normAutofit/>
+          </a:bodyPr>
+          <a:lstStyle/>
+          <a:p>
+            <a:r>
+              <a:rPr lang="en-US" sz="10000" dirty="0"/>
+              <a:t>Constraints</a:t>
             </a:r>
           </a:p>
         </p:txBody>
@@ -6073,7 +6064,7 @@
     </p:spTree>
     <p:extLst>
       <p:ext uri="{BB962C8B-B14F-4D97-AF65-F5344CB8AC3E}">
-        <p14:creationId xmlns:p14="http://schemas.microsoft.com/office/powerpoint/2010/main" val="832009256"/>
+        <p14:creationId xmlns:p14="http://schemas.microsoft.com/office/powerpoint/2010/main" val="100912058"/>
       </p:ext>
     </p:extLst>
   </p:cSld>
@@ -6105,7 +6096,7 @@
           <p:cNvPr id="2" name="Title 1">
             <a:extLst>
               <a:ext uri="{FF2B5EF4-FFF2-40B4-BE49-F238E27FC236}">
-                <a16:creationId xmlns:a16="http://schemas.microsoft.com/office/drawing/2014/main" id="{7B3117DA-016C-4D50-8E69-F0A6035C295D}"/>
+                <a16:creationId xmlns:a16="http://schemas.microsoft.com/office/drawing/2014/main" id="{CAA8DF6D-B878-48A2-AF9C-E1E9CE8F9F99}"/>
               </a:ext>
             </a:extLst>
           </p:cNvPr>
@@ -6123,15 +6114,7 @@
           <a:p>
             <a:r>
               <a:rPr lang="en-US" dirty="0"/>
-              <a:t>4</a:t>
-            </a:r>
-            <a:r>
-              <a:rPr lang="en-US" baseline="30000" dirty="0"/>
-              <a:t>th</a:t>
-            </a:r>
-            <a:r>
-              <a:rPr lang="en-US" dirty="0"/>
-              <a:t> Objective </a:t>
+              <a:t>Camera</a:t>
             </a:r>
           </a:p>
         </p:txBody>
@@ -6141,7 +6124,7 @@
           <p:cNvPr id="3" name="Content Placeholder 2">
             <a:extLst>
               <a:ext uri="{FF2B5EF4-FFF2-40B4-BE49-F238E27FC236}">
-                <a16:creationId xmlns:a16="http://schemas.microsoft.com/office/drawing/2014/main" id="{F401B27B-1C13-462A-97F1-B320722D48BE}"/>
+                <a16:creationId xmlns:a16="http://schemas.microsoft.com/office/drawing/2014/main" id="{2CDDB82C-21AD-4ED1-A86F-6DE6E32A675D}"/>
               </a:ext>
             </a:extLst>
           </p:cNvPr>
@@ -6159,21 +6142,19 @@
           <a:p>
             <a:r>
               <a:rPr lang="en-US" dirty="0"/>
-              <a:t>Design the camera position , the angle etc.</a:t>
-            </a:r>
-          </a:p>
-          <a:p>
-            <a:r>
-              <a:rPr lang="en-US" dirty="0"/>
-              <a:t>The algorithm that was decided on 3</a:t>
-            </a:r>
-            <a:r>
-              <a:rPr lang="en-US" baseline="30000" dirty="0"/>
-              <a:t>rd</a:t>
-            </a:r>
-            <a:r>
-              <a:rPr lang="en-US" dirty="0"/>
-              <a:t> objective to be used here to test  the camera angle and other metrics like finding how many persons can be covered</a:t>
+              <a:t>Proper lighting should be there.</a:t>
+            </a:r>
+          </a:p>
+          <a:p>
+            <a:r>
+              <a:rPr lang="en-US" dirty="0"/>
+              <a:t>The position of camera should not be changed as it is fixed (depends on the algorithm ).</a:t>
+            </a:r>
+          </a:p>
+          <a:p>
+            <a:r>
+              <a:rPr lang="en-US" dirty="0"/>
+              <a:t>As when the distance increases the image resolution of detected face decreases.</a:t>
             </a:r>
           </a:p>
           <a:p>
@@ -6182,15 +6163,12 @@
             </a:pPr>
             <a:endParaRPr lang="en-US" dirty="0"/>
           </a:p>
-          <a:p>
-            <a:endParaRPr lang="en-US" dirty="0"/>
-          </a:p>
         </p:txBody>
       </p:sp>
     </p:spTree>
     <p:extLst>
       <p:ext uri="{BB962C8B-B14F-4D97-AF65-F5344CB8AC3E}">
-        <p14:creationId xmlns:p14="http://schemas.microsoft.com/office/powerpoint/2010/main" val="4146658703"/>
+        <p14:creationId xmlns:p14="http://schemas.microsoft.com/office/powerpoint/2010/main" val="3009879419"/>
       </p:ext>
     </p:extLst>
   </p:cSld>
@@ -6222,7 +6200,7 @@
           <p:cNvPr id="2" name="Title 1">
             <a:extLst>
               <a:ext uri="{FF2B5EF4-FFF2-40B4-BE49-F238E27FC236}">
-                <a16:creationId xmlns:a16="http://schemas.microsoft.com/office/drawing/2014/main" id="{BF705B5D-60D1-4F70-A1E3-8318785F6C75}"/>
+                <a16:creationId xmlns:a16="http://schemas.microsoft.com/office/drawing/2014/main" id="{9D6D73AC-0356-4B99-832F-31B3CE95398C}"/>
               </a:ext>
             </a:extLst>
           </p:cNvPr>
@@ -6240,15 +6218,7 @@
           <a:p>
             <a:r>
               <a:rPr lang="en-US" dirty="0"/>
-              <a:t>5</a:t>
-            </a:r>
-            <a:r>
-              <a:rPr lang="en-US" baseline="30000" dirty="0"/>
-              <a:t>th</a:t>
-            </a:r>
-            <a:r>
-              <a:rPr lang="en-US" dirty="0"/>
-              <a:t> objective </a:t>
+              <a:t>Face detection and recognition</a:t>
             </a:r>
           </a:p>
         </p:txBody>
@@ -6258,7 +6228,7 @@
           <p:cNvPr id="3" name="Content Placeholder 2">
             <a:extLst>
               <a:ext uri="{FF2B5EF4-FFF2-40B4-BE49-F238E27FC236}">
-                <a16:creationId xmlns:a16="http://schemas.microsoft.com/office/drawing/2014/main" id="{5CC9FC1D-AD0E-4548-B97F-C2126D943F45}"/>
+                <a16:creationId xmlns:a16="http://schemas.microsoft.com/office/drawing/2014/main" id="{F5F812ED-8D69-4469-AE75-A350758C8F21}"/>
               </a:ext>
             </a:extLst>
           </p:cNvPr>
@@ -6276,21 +6246,25 @@
           <a:p>
             <a:r>
               <a:rPr lang="en-US" dirty="0"/>
-              <a:t>Find the best camera angle and algorithm (both face detection and face recognition) that has reduced false negatives, is fast </a:t>
-            </a:r>
-            <a:r>
-              <a:rPr lang="en-US" dirty="0" err="1"/>
-              <a:t>etc</a:t>
-            </a:r>
-            <a:r>
-              <a:rPr lang="en-US" dirty="0"/>
-              <a:t> </a:t>
-            </a:r>
-          </a:p>
-          <a:p>
-            <a:r>
-              <a:rPr lang="en-US" dirty="0"/>
-              <a:t>Iterate through 3 and 4 objective to find the best combination of camera and algorithm</a:t>
+              <a:t>The face or faces should not be covered.</a:t>
+            </a:r>
+          </a:p>
+          <a:p>
+            <a:r>
+              <a:rPr lang="en-US" dirty="0"/>
+              <a:t>There is a maximum distance till which a student can sit for the camera to detect the face beyond that facial recognition wont work.</a:t>
+            </a:r>
+          </a:p>
+          <a:p>
+            <a:r>
+              <a:rPr lang="en-US" dirty="0"/>
+              <a:t>When the photo is taken if he/she covers their face then the algorithm can miss the attendance of the person in that time frame.</a:t>
+            </a:r>
+          </a:p>
+          <a:p>
+            <a:r>
+              <a:rPr lang="en-US" dirty="0"/>
+              <a:t>If physical characteristics of people change over time — if they gain weight, lose their hair, grow a beard or start wearing glasses, it is tough for face recognition.</a:t>
             </a:r>
           </a:p>
         </p:txBody>
@@ -6298,7 +6272,7 @@
     </p:spTree>
     <p:extLst>
       <p:ext uri="{BB962C8B-B14F-4D97-AF65-F5344CB8AC3E}">
-        <p14:creationId xmlns:p14="http://schemas.microsoft.com/office/powerpoint/2010/main" val="1891443787"/>
+        <p14:creationId xmlns:p14="http://schemas.microsoft.com/office/powerpoint/2010/main" val="530119667"/>
       </p:ext>
     </p:extLst>
   </p:cSld>
@@ -6330,7 +6304,7 @@
           <p:cNvPr id="2" name="Title 1">
             <a:extLst>
               <a:ext uri="{FF2B5EF4-FFF2-40B4-BE49-F238E27FC236}">
-                <a16:creationId xmlns:a16="http://schemas.microsoft.com/office/drawing/2014/main" id="{04D1FA27-C5C7-4A78-A1F2-5CE87A8F6E0F}"/>
+                <a16:creationId xmlns:a16="http://schemas.microsoft.com/office/drawing/2014/main" id="{68154D5F-4656-401F-9EC3-506C78D8CE01}"/>
               </a:ext>
             </a:extLst>
           </p:cNvPr>
@@ -6343,8 +6317,8 @@
         </p:nvSpPr>
         <p:spPr>
           <a:xfrm>
-            <a:off x="838199" y="365125"/>
-            <a:ext cx="10916265" cy="6212656"/>
+            <a:off x="838200" y="365125"/>
+            <a:ext cx="10577052" cy="6035675"/>
           </a:xfrm>
         </p:spPr>
         <p:txBody>
@@ -6355,7 +6329,7 @@
           <a:p>
             <a:r>
               <a:rPr lang="en-US" sz="10000" dirty="0"/>
-              <a:t>Constraints</a:t>
+              <a:t>Conceptual Design</a:t>
             </a:r>
           </a:p>
         </p:txBody>
@@ -6363,7 +6337,7 @@
     </p:spTree>
     <p:extLst>
       <p:ext uri="{BB962C8B-B14F-4D97-AF65-F5344CB8AC3E}">
-        <p14:creationId xmlns:p14="http://schemas.microsoft.com/office/powerpoint/2010/main" val="100912058"/>
+        <p14:creationId xmlns:p14="http://schemas.microsoft.com/office/powerpoint/2010/main" val="430654066"/>
       </p:ext>
     </p:extLst>
   </p:cSld>
@@ -6496,7 +6470,7 @@
           <p:cNvPr id="2" name="Title 1">
             <a:extLst>
               <a:ext uri="{FF2B5EF4-FFF2-40B4-BE49-F238E27FC236}">
-                <a16:creationId xmlns:a16="http://schemas.microsoft.com/office/drawing/2014/main" id="{CAA8DF6D-B878-48A2-AF9C-E1E9CE8F9F99}"/>
+                <a16:creationId xmlns:a16="http://schemas.microsoft.com/office/drawing/2014/main" id="{7C2D85A2-03C7-4068-9742-7DFB61A47545}"/>
               </a:ext>
             </a:extLst>
           </p:cNvPr>
@@ -6514,7 +6488,7 @@
           <a:p>
             <a:r>
               <a:rPr lang="en-US" dirty="0"/>
-              <a:t>Camera</a:t>
+              <a:t>3 questions </a:t>
             </a:r>
           </a:p>
         </p:txBody>
@@ -6524,7 +6498,7 @@
           <p:cNvPr id="3" name="Content Placeholder 2">
             <a:extLst>
               <a:ext uri="{FF2B5EF4-FFF2-40B4-BE49-F238E27FC236}">
-                <a16:creationId xmlns:a16="http://schemas.microsoft.com/office/drawing/2014/main" id="{2CDDB82C-21AD-4ED1-A86F-6DE6E32A675D}"/>
+                <a16:creationId xmlns:a16="http://schemas.microsoft.com/office/drawing/2014/main" id="{F8DB19DF-261D-4C86-A8C8-BB98DB26384D}"/>
               </a:ext>
             </a:extLst>
           </p:cNvPr>
@@ -6542,25 +6516,52 @@
           <a:p>
             <a:r>
               <a:rPr lang="en-US" dirty="0"/>
-              <a:t>Proper lighting should be there</a:t>
-            </a:r>
-          </a:p>
-          <a:p>
-            <a:r>
-              <a:rPr lang="en-US" dirty="0"/>
-              <a:t>The position of camera should not be changed as it is fixed (depends on the algorithm )</a:t>
-            </a:r>
-          </a:p>
-          <a:p>
-            <a:r>
-              <a:rPr lang="en-US" dirty="0"/>
-              <a:t>As when the distance increases we will reduce the image resolution of detected face</a:t>
-            </a:r>
-          </a:p>
-          <a:p>
-            <a:pPr marL="0" indent="0">
-              <a:buNone/>
-            </a:pPr>
+              <a:t>What are the needs</a:t>
+            </a:r>
+          </a:p>
+          <a:p>
+            <a:pPr lvl="1"/>
+            <a:r>
+              <a:rPr lang="en-US" dirty="0"/>
+              <a:t>A reliable system which identifies which student is present in the classroom and gives the attendance based on his presence </a:t>
+            </a:r>
+          </a:p>
+          <a:p>
+            <a:r>
+              <a:rPr lang="en-US" dirty="0"/>
+              <a:t>How can the needs be met </a:t>
+            </a:r>
+          </a:p>
+          <a:p>
+            <a:pPr lvl="1"/>
+            <a:r>
+              <a:rPr lang="en-US" dirty="0"/>
+              <a:t>uses a camera that takes photo of a group of students, and then uses facial recognition for marking attendance for a student</a:t>
+            </a:r>
+          </a:p>
+          <a:p>
+            <a:r>
+              <a:rPr lang="en-US" dirty="0"/>
+              <a:t>How well the needs are met</a:t>
+            </a:r>
+          </a:p>
+          <a:p>
+            <a:pPr lvl="1"/>
+            <a:r>
+              <a:rPr lang="en-US" dirty="0"/>
+              <a:t>found that facial recognition overcomes some of the problems that exist in the previously mentioned bio metric attendance systems subjected to the constraints mentioned in the previous slides</a:t>
+            </a:r>
+          </a:p>
+          <a:p>
+            <a:pPr lvl="1"/>
+            <a:endParaRPr lang="en-US" dirty="0"/>
+          </a:p>
+          <a:p>
+            <a:pPr lvl="1"/>
+            <a:endParaRPr lang="en-US" dirty="0"/>
+          </a:p>
+          <a:p>
+            <a:pPr lvl="1"/>
             <a:endParaRPr lang="en-US" dirty="0"/>
           </a:p>
         </p:txBody>
@@ -6568,7 +6569,7 @@
     </p:spTree>
     <p:extLst>
       <p:ext uri="{BB962C8B-B14F-4D97-AF65-F5344CB8AC3E}">
-        <p14:creationId xmlns:p14="http://schemas.microsoft.com/office/powerpoint/2010/main" val="3009879419"/>
+        <p14:creationId xmlns:p14="http://schemas.microsoft.com/office/powerpoint/2010/main" val="1396136375"/>
       </p:ext>
     </p:extLst>
   </p:cSld>
@@ -6600,306 +6601,6 @@
           <p:cNvPr id="2" name="Title 1">
             <a:extLst>
               <a:ext uri="{FF2B5EF4-FFF2-40B4-BE49-F238E27FC236}">
-                <a16:creationId xmlns:a16="http://schemas.microsoft.com/office/drawing/2014/main" id="{9D6D73AC-0356-4B99-832F-31B3CE95398C}"/>
-              </a:ext>
-            </a:extLst>
-          </p:cNvPr>
-          <p:cNvSpPr>
-            <a:spLocks noGrp="1"/>
-          </p:cNvSpPr>
-          <p:nvPr>
-            <p:ph type="title"/>
-          </p:nvPr>
-        </p:nvSpPr>
-        <p:spPr/>
-        <p:txBody>
-          <a:bodyPr/>
-          <a:lstStyle/>
-          <a:p>
-            <a:r>
-              <a:rPr lang="en-US" dirty="0"/>
-              <a:t>Face detection and recognition</a:t>
-            </a:r>
-          </a:p>
-        </p:txBody>
-      </p:sp>
-      <p:sp>
-        <p:nvSpPr>
-          <p:cNvPr id="3" name="Content Placeholder 2">
-            <a:extLst>
-              <a:ext uri="{FF2B5EF4-FFF2-40B4-BE49-F238E27FC236}">
-                <a16:creationId xmlns:a16="http://schemas.microsoft.com/office/drawing/2014/main" id="{F5F812ED-8D69-4469-AE75-A350758C8F21}"/>
-              </a:ext>
-            </a:extLst>
-          </p:cNvPr>
-          <p:cNvSpPr>
-            <a:spLocks noGrp="1"/>
-          </p:cNvSpPr>
-          <p:nvPr>
-            <p:ph idx="1"/>
-          </p:nvPr>
-        </p:nvSpPr>
-        <p:spPr/>
-        <p:txBody>
-          <a:bodyPr/>
-          <a:lstStyle/>
-          <a:p>
-            <a:r>
-              <a:rPr lang="en-US" dirty="0"/>
-              <a:t>The face or faces should not be covered </a:t>
-            </a:r>
-          </a:p>
-          <a:p>
-            <a:r>
-              <a:rPr lang="en-US" dirty="0"/>
-              <a:t>There is a maximum distance till which a student can sit for the camera to detect the face beyond that facial recognition wont work</a:t>
-            </a:r>
-          </a:p>
-          <a:p>
-            <a:r>
-              <a:rPr lang="en-US" dirty="0"/>
-              <a:t>When the photo is taken if he/she covers their face then the algorithm can miss the attendance of the person in that time frame</a:t>
-            </a:r>
-          </a:p>
-          <a:p>
-            <a:r>
-              <a:rPr lang="en-US" dirty="0"/>
-              <a:t>If physical characteristics of people change over time — if they gain weight, lose their hair, grow a beard or start wearing glasses, it is tough for face recognition</a:t>
-            </a:r>
-          </a:p>
-        </p:txBody>
-      </p:sp>
-    </p:spTree>
-    <p:extLst>
-      <p:ext uri="{BB962C8B-B14F-4D97-AF65-F5344CB8AC3E}">
-        <p14:creationId xmlns:p14="http://schemas.microsoft.com/office/powerpoint/2010/main" val="530119667"/>
-      </p:ext>
-    </p:extLst>
-  </p:cSld>
-  <p:clrMapOvr>
-    <a:masterClrMapping/>
-  </p:clrMapOvr>
-</p:sld>
-</file>
-
-<file path=ppt/slides/slide32.xml><?xml version="1.0" encoding="utf-8"?>
-<p:sld xmlns:a="http://schemas.openxmlformats.org/drawingml/2006/main" xmlns:r="http://schemas.openxmlformats.org/officeDocument/2006/relationships" xmlns:p="http://schemas.openxmlformats.org/presentationml/2006/main">
-  <p:cSld>
-    <p:spTree>
-      <p:nvGrpSpPr>
-        <p:cNvPr id="1" name=""/>
-        <p:cNvGrpSpPr/>
-        <p:nvPr/>
-      </p:nvGrpSpPr>
-      <p:grpSpPr>
-        <a:xfrm>
-          <a:off x="0" y="0"/>
-          <a:ext cx="0" cy="0"/>
-          <a:chOff x="0" y="0"/>
-          <a:chExt cx="0" cy="0"/>
-        </a:xfrm>
-      </p:grpSpPr>
-      <p:sp>
-        <p:nvSpPr>
-          <p:cNvPr id="2" name="Title 1">
-            <a:extLst>
-              <a:ext uri="{FF2B5EF4-FFF2-40B4-BE49-F238E27FC236}">
-                <a16:creationId xmlns:a16="http://schemas.microsoft.com/office/drawing/2014/main" id="{68154D5F-4656-401F-9EC3-506C78D8CE01}"/>
-              </a:ext>
-            </a:extLst>
-          </p:cNvPr>
-          <p:cNvSpPr>
-            <a:spLocks noGrp="1"/>
-          </p:cNvSpPr>
-          <p:nvPr>
-            <p:ph type="title"/>
-          </p:nvPr>
-        </p:nvSpPr>
-        <p:spPr>
-          <a:xfrm>
-            <a:off x="838200" y="365125"/>
-            <a:ext cx="10577052" cy="6035675"/>
-          </a:xfrm>
-        </p:spPr>
-        <p:txBody>
-          <a:bodyPr>
-            <a:normAutofit/>
-          </a:bodyPr>
-          <a:lstStyle/>
-          <a:p>
-            <a:r>
-              <a:rPr lang="en-US" sz="10000" dirty="0"/>
-              <a:t>Conceptual Design</a:t>
-            </a:r>
-          </a:p>
-        </p:txBody>
-      </p:sp>
-    </p:spTree>
-    <p:extLst>
-      <p:ext uri="{BB962C8B-B14F-4D97-AF65-F5344CB8AC3E}">
-        <p14:creationId xmlns:p14="http://schemas.microsoft.com/office/powerpoint/2010/main" val="430654066"/>
-      </p:ext>
-    </p:extLst>
-  </p:cSld>
-  <p:clrMapOvr>
-    <a:masterClrMapping/>
-  </p:clrMapOvr>
-</p:sld>
-</file>
-
-<file path=ppt/slides/slide33.xml><?xml version="1.0" encoding="utf-8"?>
-<p:sld xmlns:a="http://schemas.openxmlformats.org/drawingml/2006/main" xmlns:r="http://schemas.openxmlformats.org/officeDocument/2006/relationships" xmlns:p="http://schemas.openxmlformats.org/presentationml/2006/main">
-  <p:cSld>
-    <p:spTree>
-      <p:nvGrpSpPr>
-        <p:cNvPr id="1" name=""/>
-        <p:cNvGrpSpPr/>
-        <p:nvPr/>
-      </p:nvGrpSpPr>
-      <p:grpSpPr>
-        <a:xfrm>
-          <a:off x="0" y="0"/>
-          <a:ext cx="0" cy="0"/>
-          <a:chOff x="0" y="0"/>
-          <a:chExt cx="0" cy="0"/>
-        </a:xfrm>
-      </p:grpSpPr>
-      <p:sp>
-        <p:nvSpPr>
-          <p:cNvPr id="2" name="Title 1">
-            <a:extLst>
-              <a:ext uri="{FF2B5EF4-FFF2-40B4-BE49-F238E27FC236}">
-                <a16:creationId xmlns:a16="http://schemas.microsoft.com/office/drawing/2014/main" id="{7C2D85A2-03C7-4068-9742-7DFB61A47545}"/>
-              </a:ext>
-            </a:extLst>
-          </p:cNvPr>
-          <p:cNvSpPr>
-            <a:spLocks noGrp="1"/>
-          </p:cNvSpPr>
-          <p:nvPr>
-            <p:ph type="title"/>
-          </p:nvPr>
-        </p:nvSpPr>
-        <p:spPr/>
-        <p:txBody>
-          <a:bodyPr/>
-          <a:lstStyle/>
-          <a:p>
-            <a:r>
-              <a:rPr lang="en-US" dirty="0"/>
-              <a:t>3 questions </a:t>
-            </a:r>
-          </a:p>
-        </p:txBody>
-      </p:sp>
-      <p:sp>
-        <p:nvSpPr>
-          <p:cNvPr id="3" name="Content Placeholder 2">
-            <a:extLst>
-              <a:ext uri="{FF2B5EF4-FFF2-40B4-BE49-F238E27FC236}">
-                <a16:creationId xmlns:a16="http://schemas.microsoft.com/office/drawing/2014/main" id="{F8DB19DF-261D-4C86-A8C8-BB98DB26384D}"/>
-              </a:ext>
-            </a:extLst>
-          </p:cNvPr>
-          <p:cNvSpPr>
-            <a:spLocks noGrp="1"/>
-          </p:cNvSpPr>
-          <p:nvPr>
-            <p:ph idx="1"/>
-          </p:nvPr>
-        </p:nvSpPr>
-        <p:spPr/>
-        <p:txBody>
-          <a:bodyPr/>
-          <a:lstStyle/>
-          <a:p>
-            <a:r>
-              <a:rPr lang="en-US" dirty="0"/>
-              <a:t>What are the needs</a:t>
-            </a:r>
-          </a:p>
-          <a:p>
-            <a:pPr lvl="1"/>
-            <a:r>
-              <a:rPr lang="en-US" dirty="0"/>
-              <a:t>A reliable system which identifies which student is present in the classroom and gives the attendance based on his presence </a:t>
-            </a:r>
-          </a:p>
-          <a:p>
-            <a:r>
-              <a:rPr lang="en-US" dirty="0"/>
-              <a:t>How can the needs be met </a:t>
-            </a:r>
-          </a:p>
-          <a:p>
-            <a:pPr lvl="1"/>
-            <a:r>
-              <a:rPr lang="en-US" dirty="0"/>
-              <a:t>uses a camera that takes photo of a group of students, and then uses facial recognition for marking attendance for a student</a:t>
-            </a:r>
-          </a:p>
-          <a:p>
-            <a:r>
-              <a:rPr lang="en-US" dirty="0"/>
-              <a:t>How well the needs are met</a:t>
-            </a:r>
-          </a:p>
-          <a:p>
-            <a:pPr lvl="1"/>
-            <a:r>
-              <a:rPr lang="en-US" dirty="0"/>
-              <a:t>found that facial recognition overcomes some of the problems that exist in the previously mentioned bio metric attendance systems subjected to the constraints mentioned in the previous slides</a:t>
-            </a:r>
-          </a:p>
-          <a:p>
-            <a:pPr lvl="1"/>
-            <a:endParaRPr lang="en-US" dirty="0"/>
-          </a:p>
-          <a:p>
-            <a:pPr lvl="1"/>
-            <a:endParaRPr lang="en-US" dirty="0"/>
-          </a:p>
-          <a:p>
-            <a:pPr lvl="1"/>
-            <a:endParaRPr lang="en-US" dirty="0"/>
-          </a:p>
-        </p:txBody>
-      </p:sp>
-    </p:spTree>
-    <p:extLst>
-      <p:ext uri="{BB962C8B-B14F-4D97-AF65-F5344CB8AC3E}">
-        <p14:creationId xmlns:p14="http://schemas.microsoft.com/office/powerpoint/2010/main" val="1396136375"/>
-      </p:ext>
-    </p:extLst>
-  </p:cSld>
-  <p:clrMapOvr>
-    <a:masterClrMapping/>
-  </p:clrMapOvr>
-</p:sld>
-</file>
-
-<file path=ppt/slides/slide34.xml><?xml version="1.0" encoding="utf-8"?>
-<p:sld xmlns:a="http://schemas.openxmlformats.org/drawingml/2006/main" xmlns:r="http://schemas.openxmlformats.org/officeDocument/2006/relationships" xmlns:p="http://schemas.openxmlformats.org/presentationml/2006/main">
-  <p:cSld>
-    <p:spTree>
-      <p:nvGrpSpPr>
-        <p:cNvPr id="1" name=""/>
-        <p:cNvGrpSpPr/>
-        <p:nvPr/>
-      </p:nvGrpSpPr>
-      <p:grpSpPr>
-        <a:xfrm>
-          <a:off x="0" y="0"/>
-          <a:ext cx="0" cy="0"/>
-          <a:chOff x="0" y="0"/>
-          <a:chExt cx="0" cy="0"/>
-        </a:xfrm>
-      </p:grpSpPr>
-      <p:sp>
-        <p:nvSpPr>
-          <p:cNvPr id="2" name="Title 1">
-            <a:extLst>
-              <a:ext uri="{FF2B5EF4-FFF2-40B4-BE49-F238E27FC236}">
                 <a16:creationId xmlns:a16="http://schemas.microsoft.com/office/drawing/2014/main" id="{588D848A-DDE7-4672-BFE8-B0DB5EF30929}"/>
               </a:ext>
             </a:extLst>
@@ -6943,7 +6644,7 @@
 </p:sld>
 </file>
 
-<file path=ppt/slides/slide35.xml><?xml version="1.0" encoding="utf-8"?>
+<file path=ppt/slides/slide32.xml><?xml version="1.0" encoding="utf-8"?>
 <p:sld xmlns:a="http://schemas.openxmlformats.org/drawingml/2006/main" xmlns:r="http://schemas.openxmlformats.org/officeDocument/2006/relationships" xmlns:p="http://schemas.openxmlformats.org/presentationml/2006/main">
   <p:cSld>
     <p:spTree>
@@ -7009,7 +6710,768 @@
 </p:sld>
 </file>
 
+<file path=ppt/slides/slide33.xml><?xml version="1.0" encoding="utf-8"?>
+<p:sld xmlns:a="http://schemas.openxmlformats.org/drawingml/2006/main" xmlns:r="http://schemas.openxmlformats.org/officeDocument/2006/relationships" xmlns:p="http://schemas.openxmlformats.org/presentationml/2006/main">
+  <p:cSld>
+    <p:spTree>
+      <p:nvGrpSpPr>
+        <p:cNvPr id="1" name=""/>
+        <p:cNvGrpSpPr/>
+        <p:nvPr/>
+      </p:nvGrpSpPr>
+      <p:grpSpPr>
+        <a:xfrm>
+          <a:off x="0" y="0"/>
+          <a:ext cx="0" cy="0"/>
+          <a:chOff x="0" y="0"/>
+          <a:chExt cx="0" cy="0"/>
+        </a:xfrm>
+      </p:grpSpPr>
+      <p:sp>
+        <p:nvSpPr>
+          <p:cNvPr id="2" name="Title 1">
+            <a:extLst>
+              <a:ext uri="{FF2B5EF4-FFF2-40B4-BE49-F238E27FC236}">
+                <a16:creationId xmlns:a16="http://schemas.microsoft.com/office/drawing/2014/main" id="{E7624FCE-BE33-414A-B187-470CBF4FA24E}"/>
+              </a:ext>
+            </a:extLst>
+          </p:cNvPr>
+          <p:cNvSpPr>
+            <a:spLocks noGrp="1"/>
+          </p:cNvSpPr>
+          <p:nvPr>
+            <p:ph type="title"/>
+          </p:nvPr>
+        </p:nvSpPr>
+        <p:spPr/>
+        <p:txBody>
+          <a:bodyPr/>
+          <a:lstStyle/>
+          <a:p>
+            <a:r>
+              <a:rPr lang="en-US" dirty="0"/>
+              <a:t>Our implementation</a:t>
+            </a:r>
+          </a:p>
+        </p:txBody>
+      </p:sp>
+      <p:sp>
+        <p:nvSpPr>
+          <p:cNvPr id="3" name="Content Placeholder 2">
+            <a:extLst>
+              <a:ext uri="{FF2B5EF4-FFF2-40B4-BE49-F238E27FC236}">
+                <a16:creationId xmlns:a16="http://schemas.microsoft.com/office/drawing/2014/main" id="{0DBFC830-B96F-4C7A-A131-17CD6CAC4E3B}"/>
+              </a:ext>
+            </a:extLst>
+          </p:cNvPr>
+          <p:cNvSpPr>
+            <a:spLocks noGrp="1"/>
+          </p:cNvSpPr>
+          <p:nvPr>
+            <p:ph idx="1"/>
+          </p:nvPr>
+        </p:nvSpPr>
+        <p:spPr/>
+        <p:txBody>
+          <a:bodyPr/>
+          <a:lstStyle/>
+          <a:p>
+            <a:r>
+              <a:rPr lang="en-US" dirty="0"/>
+              <a:t>Using this 2 algorithms </a:t>
+            </a:r>
+          </a:p>
+          <a:p>
+            <a:pPr lvl="1"/>
+            <a:r>
+              <a:rPr lang="en-US" dirty="0"/>
+              <a:t>Facial detection - DLIB HOG (Histogram of Oriented Gradients) </a:t>
+            </a:r>
+          </a:p>
+          <a:p>
+            <a:pPr lvl="1"/>
+            <a:r>
+              <a:rPr lang="en-US" dirty="0"/>
+              <a:t>Facial recognition – </a:t>
+            </a:r>
+            <a:r>
+              <a:rPr lang="en-US" dirty="0" err="1"/>
+              <a:t>Facenet</a:t>
+            </a:r>
+            <a:r>
+              <a:rPr lang="en-US" dirty="0"/>
+              <a:t> (A deep learning based model that has 128 descriptors ) </a:t>
+            </a:r>
+          </a:p>
+          <a:p>
+            <a:r>
+              <a:rPr lang="en-US" dirty="0"/>
+              <a:t>Raspberry pi can be programmed to perform the role of all the major sub systems discussed before </a:t>
+            </a:r>
+          </a:p>
+          <a:p>
+            <a:endParaRPr lang="en-US" dirty="0"/>
+          </a:p>
+        </p:txBody>
+      </p:sp>
+    </p:spTree>
+    <p:extLst>
+      <p:ext uri="{BB962C8B-B14F-4D97-AF65-F5344CB8AC3E}">
+        <p14:creationId xmlns:p14="http://schemas.microsoft.com/office/powerpoint/2010/main" val="20348620"/>
+      </p:ext>
+    </p:extLst>
+  </p:cSld>
+  <p:clrMapOvr>
+    <a:masterClrMapping/>
+  </p:clrMapOvr>
+</p:sld>
+</file>
+
+<file path=ppt/slides/slide34.xml><?xml version="1.0" encoding="utf-8"?>
+<p:sld xmlns:a="http://schemas.openxmlformats.org/drawingml/2006/main" xmlns:r="http://schemas.openxmlformats.org/officeDocument/2006/relationships" xmlns:p="http://schemas.openxmlformats.org/presentationml/2006/main">
+  <p:cSld>
+    <p:spTree>
+      <p:nvGrpSpPr>
+        <p:cNvPr id="1" name=""/>
+        <p:cNvGrpSpPr/>
+        <p:nvPr/>
+      </p:nvGrpSpPr>
+      <p:grpSpPr>
+        <a:xfrm>
+          <a:off x="0" y="0"/>
+          <a:ext cx="0" cy="0"/>
+          <a:chOff x="0" y="0"/>
+          <a:chExt cx="0" cy="0"/>
+        </a:xfrm>
+      </p:grpSpPr>
+      <p:sp>
+        <p:nvSpPr>
+          <p:cNvPr id="2" name="Title 1">
+            <a:extLst>
+              <a:ext uri="{FF2B5EF4-FFF2-40B4-BE49-F238E27FC236}">
+                <a16:creationId xmlns:a16="http://schemas.microsoft.com/office/drawing/2014/main" id="{0A10C38D-B3C2-4721-ACF7-59EE3519008B}"/>
+              </a:ext>
+            </a:extLst>
+          </p:cNvPr>
+          <p:cNvSpPr>
+            <a:spLocks noGrp="1"/>
+          </p:cNvSpPr>
+          <p:nvPr>
+            <p:ph type="title"/>
+          </p:nvPr>
+        </p:nvSpPr>
+        <p:spPr/>
+        <p:txBody>
+          <a:bodyPr>
+            <a:normAutofit fontScale="90000"/>
+          </a:bodyPr>
+          <a:lstStyle/>
+          <a:p>
+            <a:pPr algn="l"/>
+            <a:br>
+              <a:rPr lang="en-US" b="0" i="0" dirty="0">
+                <a:solidFill>
+                  <a:srgbClr val="212121"/>
+                </a:solidFill>
+                <a:effectLst/>
+                <a:latin typeface="Open Sans"/>
+              </a:rPr>
+            </a:br>
+            <a:br>
+              <a:rPr lang="en-US" b="0" i="0" dirty="0">
+                <a:solidFill>
+                  <a:srgbClr val="212121"/>
+                </a:solidFill>
+                <a:effectLst/>
+                <a:latin typeface="Open Sans"/>
+              </a:rPr>
+            </a:br>
+            <a:r>
+              <a:rPr lang="en-US" b="0" i="0" dirty="0">
+                <a:solidFill>
+                  <a:srgbClr val="212121"/>
+                </a:solidFill>
+                <a:effectLst/>
+                <a:latin typeface="Open Sans"/>
+              </a:rPr>
+              <a:t>Raspberry Pi 8MP Camera Module V2 with Cable</a:t>
+            </a:r>
+            <a:br>
+              <a:rPr lang="en-US" b="0" i="0" dirty="0">
+                <a:solidFill>
+                  <a:srgbClr val="212121"/>
+                </a:solidFill>
+                <a:effectLst/>
+                <a:latin typeface="Open Sans"/>
+              </a:rPr>
+            </a:br>
+            <a:br>
+              <a:rPr lang="en-US" b="0" i="0" dirty="0">
+                <a:solidFill>
+                  <a:srgbClr val="666666"/>
+                </a:solidFill>
+                <a:effectLst/>
+                <a:latin typeface="Open Sans"/>
+              </a:rPr>
+            </a:br>
+            <a:r>
+              <a:rPr lang="en-US" dirty="0"/>
+              <a:t> </a:t>
+            </a:r>
+          </a:p>
+        </p:txBody>
+      </p:sp>
+      <p:pic>
+        <p:nvPicPr>
+          <p:cNvPr id="1026" name="Picture 2">
+            <a:extLst>
+              <a:ext uri="{FF2B5EF4-FFF2-40B4-BE49-F238E27FC236}">
+                <a16:creationId xmlns:a16="http://schemas.microsoft.com/office/drawing/2014/main" id="{69C5087E-7289-48BF-937D-42007DBD5241}"/>
+              </a:ext>
+            </a:extLst>
+          </p:cNvPr>
+          <p:cNvPicPr>
+            <a:picLocks noGrp="1" noChangeAspect="1" noChangeArrowheads="1"/>
+          </p:cNvPicPr>
+          <p:nvPr>
+            <p:ph idx="1"/>
+          </p:nvPr>
+        </p:nvPicPr>
+        <p:blipFill>
+          <a:blip r:embed="rId2">
+            <a:extLst>
+              <a:ext uri="{28A0092B-C50C-407E-A947-70E740481C1C}">
+                <a14:useLocalDpi xmlns:a14="http://schemas.microsoft.com/office/drawing/2010/main" val="0"/>
+              </a:ext>
+            </a:extLst>
+          </a:blip>
+          <a:srcRect/>
+          <a:stretch>
+            <a:fillRect/>
+          </a:stretch>
+        </p:blipFill>
+        <p:spPr bwMode="auto">
+          <a:xfrm>
+            <a:off x="3920331" y="1825625"/>
+            <a:ext cx="4351338" cy="4351338"/>
+          </a:xfrm>
+          <a:prstGeom prst="rect">
+            <a:avLst/>
+          </a:prstGeom>
+          <a:noFill/>
+          <a:extLst>
+            <a:ext uri="{909E8E84-426E-40DD-AFC4-6F175D3DCCD1}">
+              <a14:hiddenFill xmlns:a14="http://schemas.microsoft.com/office/drawing/2010/main">
+                <a:solidFill>
+                  <a:srgbClr val="FFFFFF"/>
+                </a:solidFill>
+              </a14:hiddenFill>
+            </a:ext>
+          </a:extLst>
+        </p:spPr>
+      </p:pic>
+    </p:spTree>
+    <p:extLst>
+      <p:ext uri="{BB962C8B-B14F-4D97-AF65-F5344CB8AC3E}">
+        <p14:creationId xmlns:p14="http://schemas.microsoft.com/office/powerpoint/2010/main" val="415860919"/>
+      </p:ext>
+    </p:extLst>
+  </p:cSld>
+  <p:clrMapOvr>
+    <a:masterClrMapping/>
+  </p:clrMapOvr>
+</p:sld>
+</file>
+
+<file path=ppt/slides/slide35.xml><?xml version="1.0" encoding="utf-8"?>
+<p:sld xmlns:a="http://schemas.openxmlformats.org/drawingml/2006/main" xmlns:r="http://schemas.openxmlformats.org/officeDocument/2006/relationships" xmlns:p="http://schemas.openxmlformats.org/presentationml/2006/main">
+  <p:cSld>
+    <p:spTree>
+      <p:nvGrpSpPr>
+        <p:cNvPr id="1" name=""/>
+        <p:cNvGrpSpPr/>
+        <p:nvPr/>
+      </p:nvGrpSpPr>
+      <p:grpSpPr>
+        <a:xfrm>
+          <a:off x="0" y="0"/>
+          <a:ext cx="0" cy="0"/>
+          <a:chOff x="0" y="0"/>
+          <a:chExt cx="0" cy="0"/>
+        </a:xfrm>
+      </p:grpSpPr>
+      <p:sp>
+        <p:nvSpPr>
+          <p:cNvPr id="2" name="Title 1">
+            <a:extLst>
+              <a:ext uri="{FF2B5EF4-FFF2-40B4-BE49-F238E27FC236}">
+                <a16:creationId xmlns:a16="http://schemas.microsoft.com/office/drawing/2014/main" id="{BF7F6EA2-7A5E-4C7C-8C8F-51AB275ACA5C}"/>
+              </a:ext>
+            </a:extLst>
+          </p:cNvPr>
+          <p:cNvSpPr>
+            <a:spLocks noGrp="1"/>
+          </p:cNvSpPr>
+          <p:nvPr>
+            <p:ph type="title"/>
+          </p:nvPr>
+        </p:nvSpPr>
+        <p:spPr/>
+        <p:txBody>
+          <a:bodyPr/>
+          <a:lstStyle/>
+          <a:p>
+            <a:r>
+              <a:rPr lang="en-US" dirty="0"/>
+              <a:t>Raspberry pi 4 (4GB RAM)</a:t>
+            </a:r>
+          </a:p>
+        </p:txBody>
+      </p:sp>
+      <p:pic>
+        <p:nvPicPr>
+          <p:cNvPr id="2050" name="Picture 2" descr="Raspberry Pi 4, 4GB RAM, Your Tiny, Dual-Display, Desktop Computer">
+            <a:extLst>
+              <a:ext uri="{FF2B5EF4-FFF2-40B4-BE49-F238E27FC236}">
+                <a16:creationId xmlns:a16="http://schemas.microsoft.com/office/drawing/2014/main" id="{C325537F-C870-4113-8720-034E1FE642AE}"/>
+              </a:ext>
+            </a:extLst>
+          </p:cNvPr>
+          <p:cNvPicPr>
+            <a:picLocks noGrp="1" noChangeAspect="1" noChangeArrowheads="1"/>
+          </p:cNvPicPr>
+          <p:nvPr>
+            <p:ph idx="1"/>
+          </p:nvPr>
+        </p:nvPicPr>
+        <p:blipFill>
+          <a:blip r:embed="rId2">
+            <a:extLst>
+              <a:ext uri="{28A0092B-C50C-407E-A947-70E740481C1C}">
+                <a14:useLocalDpi xmlns:a14="http://schemas.microsoft.com/office/drawing/2010/main" val="0"/>
+              </a:ext>
+            </a:extLst>
+          </a:blip>
+          <a:srcRect/>
+          <a:stretch>
+            <a:fillRect/>
+          </a:stretch>
+        </p:blipFill>
+        <p:spPr bwMode="auto">
+          <a:xfrm>
+            <a:off x="2831690" y="1905607"/>
+            <a:ext cx="7145276" cy="4587268"/>
+          </a:xfrm>
+          <a:prstGeom prst="rect">
+            <a:avLst/>
+          </a:prstGeom>
+          <a:noFill/>
+          <a:extLst>
+            <a:ext uri="{909E8E84-426E-40DD-AFC4-6F175D3DCCD1}">
+              <a14:hiddenFill xmlns:a14="http://schemas.microsoft.com/office/drawing/2010/main">
+                <a:solidFill>
+                  <a:srgbClr val="FFFFFF"/>
+                </a:solidFill>
+              </a14:hiddenFill>
+            </a:ext>
+          </a:extLst>
+        </p:spPr>
+      </p:pic>
+    </p:spTree>
+    <p:extLst>
+      <p:ext uri="{BB962C8B-B14F-4D97-AF65-F5344CB8AC3E}">
+        <p14:creationId xmlns:p14="http://schemas.microsoft.com/office/powerpoint/2010/main" val="2435168346"/>
+      </p:ext>
+    </p:extLst>
+  </p:cSld>
+  <p:clrMapOvr>
+    <a:masterClrMapping/>
+  </p:clrMapOvr>
+</p:sld>
+</file>
+
 <file path=ppt/slides/slide36.xml><?xml version="1.0" encoding="utf-8"?>
+<p:sld xmlns:a="http://schemas.openxmlformats.org/drawingml/2006/main" xmlns:r="http://schemas.openxmlformats.org/officeDocument/2006/relationships" xmlns:p="http://schemas.openxmlformats.org/presentationml/2006/main">
+  <p:cSld>
+    <p:spTree>
+      <p:nvGrpSpPr>
+        <p:cNvPr id="1" name=""/>
+        <p:cNvGrpSpPr/>
+        <p:nvPr/>
+      </p:nvGrpSpPr>
+      <p:grpSpPr>
+        <a:xfrm>
+          <a:off x="0" y="0"/>
+          <a:ext cx="0" cy="0"/>
+          <a:chOff x="0" y="0"/>
+          <a:chExt cx="0" cy="0"/>
+        </a:xfrm>
+      </p:grpSpPr>
+      <p:sp>
+        <p:nvSpPr>
+          <p:cNvPr id="2" name="Title 1">
+            <a:extLst>
+              <a:ext uri="{FF2B5EF4-FFF2-40B4-BE49-F238E27FC236}">
+                <a16:creationId xmlns:a16="http://schemas.microsoft.com/office/drawing/2014/main" id="{9148174B-5377-4E72-9B2C-197178267763}"/>
+              </a:ext>
+            </a:extLst>
+          </p:cNvPr>
+          <p:cNvSpPr>
+            <a:spLocks noGrp="1"/>
+          </p:cNvSpPr>
+          <p:nvPr>
+            <p:ph type="title"/>
+          </p:nvPr>
+        </p:nvSpPr>
+        <p:spPr/>
+        <p:txBody>
+          <a:bodyPr/>
+          <a:lstStyle/>
+          <a:p>
+            <a:r>
+              <a:rPr lang="en-US" dirty="0"/>
+              <a:t>Estimated Cost</a:t>
+            </a:r>
+          </a:p>
+        </p:txBody>
+      </p:sp>
+      <p:pic>
+        <p:nvPicPr>
+          <p:cNvPr id="5" name="Content Placeholder 4">
+            <a:extLst>
+              <a:ext uri="{FF2B5EF4-FFF2-40B4-BE49-F238E27FC236}">
+                <a16:creationId xmlns:a16="http://schemas.microsoft.com/office/drawing/2014/main" id="{E932DE81-D796-4D50-B3A6-2669AC007E5D}"/>
+              </a:ext>
+            </a:extLst>
+          </p:cNvPr>
+          <p:cNvPicPr>
+            <a:picLocks noGrp="1" noChangeAspect="1"/>
+          </p:cNvPicPr>
+          <p:nvPr>
+            <p:ph idx="1"/>
+          </p:nvPr>
+        </p:nvPicPr>
+        <p:blipFill>
+          <a:blip r:embed="rId2">
+            <a:extLst>
+              <a:ext uri="{28A0092B-C50C-407E-A947-70E740481C1C}">
+                <a14:useLocalDpi xmlns:a14="http://schemas.microsoft.com/office/drawing/2010/main" val="0"/>
+              </a:ext>
+            </a:extLst>
+          </a:blip>
+          <a:stretch>
+            <a:fillRect/>
+          </a:stretch>
+        </p:blipFill>
+        <p:spPr>
+          <a:xfrm>
+            <a:off x="838200" y="2431991"/>
+            <a:ext cx="10515600" cy="3138606"/>
+          </a:xfrm>
+        </p:spPr>
+      </p:pic>
+    </p:spTree>
+    <p:extLst>
+      <p:ext uri="{BB962C8B-B14F-4D97-AF65-F5344CB8AC3E}">
+        <p14:creationId xmlns:p14="http://schemas.microsoft.com/office/powerpoint/2010/main" val="2477559594"/>
+      </p:ext>
+    </p:extLst>
+  </p:cSld>
+  <p:clrMapOvr>
+    <a:masterClrMapping/>
+  </p:clrMapOvr>
+</p:sld>
+</file>
+
+<file path=ppt/slides/slide37.xml><?xml version="1.0" encoding="utf-8"?>
+<p:sld xmlns:a="http://schemas.openxmlformats.org/drawingml/2006/main" xmlns:r="http://schemas.openxmlformats.org/officeDocument/2006/relationships" xmlns:p="http://schemas.openxmlformats.org/presentationml/2006/main">
+  <p:cSld>
+    <p:spTree>
+      <p:nvGrpSpPr>
+        <p:cNvPr id="1" name=""/>
+        <p:cNvGrpSpPr/>
+        <p:nvPr/>
+      </p:nvGrpSpPr>
+      <p:grpSpPr>
+        <a:xfrm>
+          <a:off x="0" y="0"/>
+          <a:ext cx="0" cy="0"/>
+          <a:chOff x="0" y="0"/>
+          <a:chExt cx="0" cy="0"/>
+        </a:xfrm>
+      </p:grpSpPr>
+      <p:sp>
+        <p:nvSpPr>
+          <p:cNvPr id="2" name="Title 1">
+            <a:extLst>
+              <a:ext uri="{FF2B5EF4-FFF2-40B4-BE49-F238E27FC236}">
+                <a16:creationId xmlns:a16="http://schemas.microsoft.com/office/drawing/2014/main" id="{69E9EC14-645B-497C-9F88-D5583807E051}"/>
+              </a:ext>
+            </a:extLst>
+          </p:cNvPr>
+          <p:cNvSpPr>
+            <a:spLocks noGrp="1"/>
+          </p:cNvSpPr>
+          <p:nvPr>
+            <p:ph type="title"/>
+          </p:nvPr>
+        </p:nvSpPr>
+        <p:spPr/>
+        <p:txBody>
+          <a:bodyPr/>
+          <a:lstStyle/>
+          <a:p>
+            <a:r>
+              <a:rPr lang="en-US" dirty="0"/>
+              <a:t>Future work</a:t>
+            </a:r>
+          </a:p>
+        </p:txBody>
+      </p:sp>
+      <p:sp>
+        <p:nvSpPr>
+          <p:cNvPr id="3" name="Content Placeholder 2">
+            <a:extLst>
+              <a:ext uri="{FF2B5EF4-FFF2-40B4-BE49-F238E27FC236}">
+                <a16:creationId xmlns:a16="http://schemas.microsoft.com/office/drawing/2014/main" id="{01A0C41D-03BB-441C-83C0-0DA554219250}"/>
+              </a:ext>
+            </a:extLst>
+          </p:cNvPr>
+          <p:cNvSpPr>
+            <a:spLocks noGrp="1"/>
+          </p:cNvSpPr>
+          <p:nvPr>
+            <p:ph idx="1"/>
+          </p:nvPr>
+        </p:nvSpPr>
+        <p:spPr/>
+        <p:txBody>
+          <a:bodyPr/>
+          <a:lstStyle/>
+          <a:p>
+            <a:r>
+              <a:rPr lang="en-US" dirty="0"/>
+              <a:t>In the future we can implement a separate system for running face recognition, connecting the system in class with the other system wirelessly </a:t>
+            </a:r>
+          </a:p>
+          <a:p>
+            <a:r>
+              <a:rPr lang="en-US" dirty="0"/>
+              <a:t>Using lidar we can try to improve the facial recognition algorithm which depends on 2D image </a:t>
+            </a:r>
+          </a:p>
+          <a:p>
+            <a:r>
+              <a:rPr lang="en-US" dirty="0"/>
+              <a:t>An IR lidar will enable us to detect face even in darkness </a:t>
+            </a:r>
+          </a:p>
+          <a:p>
+            <a:r>
+              <a:rPr lang="en-US" dirty="0"/>
+              <a:t>Also we will try to integrate surveillance into this system </a:t>
+            </a:r>
+          </a:p>
+        </p:txBody>
+      </p:sp>
+    </p:spTree>
+    <p:extLst>
+      <p:ext uri="{BB962C8B-B14F-4D97-AF65-F5344CB8AC3E}">
+        <p14:creationId xmlns:p14="http://schemas.microsoft.com/office/powerpoint/2010/main" val="2010260393"/>
+      </p:ext>
+    </p:extLst>
+  </p:cSld>
+  <p:clrMapOvr>
+    <a:masterClrMapping/>
+  </p:clrMapOvr>
+</p:sld>
+</file>
+
+<file path=ppt/slides/slide38.xml><?xml version="1.0" encoding="utf-8"?>
+<p:sld xmlns:a="http://schemas.openxmlformats.org/drawingml/2006/main" xmlns:r="http://schemas.openxmlformats.org/officeDocument/2006/relationships" xmlns:p="http://schemas.openxmlformats.org/presentationml/2006/main">
+  <p:cSld>
+    <p:spTree>
+      <p:nvGrpSpPr>
+        <p:cNvPr id="1" name=""/>
+        <p:cNvGrpSpPr/>
+        <p:nvPr/>
+      </p:nvGrpSpPr>
+      <p:grpSpPr>
+        <a:xfrm>
+          <a:off x="0" y="0"/>
+          <a:ext cx="0" cy="0"/>
+          <a:chOff x="0" y="0"/>
+          <a:chExt cx="0" cy="0"/>
+        </a:xfrm>
+      </p:grpSpPr>
+      <p:sp>
+        <p:nvSpPr>
+          <p:cNvPr id="2" name="Title 1">
+            <a:extLst>
+              <a:ext uri="{FF2B5EF4-FFF2-40B4-BE49-F238E27FC236}">
+                <a16:creationId xmlns:a16="http://schemas.microsoft.com/office/drawing/2014/main" id="{54F8EBEF-4A61-4605-B5A1-076D208E7459}"/>
+              </a:ext>
+            </a:extLst>
+          </p:cNvPr>
+          <p:cNvSpPr>
+            <a:spLocks noGrp="1"/>
+          </p:cNvSpPr>
+          <p:nvPr>
+            <p:ph type="title"/>
+          </p:nvPr>
+        </p:nvSpPr>
+        <p:spPr/>
+        <p:txBody>
+          <a:bodyPr/>
+          <a:lstStyle/>
+          <a:p>
+            <a:r>
+              <a:rPr lang="en-US" dirty="0"/>
+              <a:t>References </a:t>
+            </a:r>
+          </a:p>
+        </p:txBody>
+      </p:sp>
+      <p:sp>
+        <p:nvSpPr>
+          <p:cNvPr id="3" name="Content Placeholder 2">
+            <a:extLst>
+              <a:ext uri="{FF2B5EF4-FFF2-40B4-BE49-F238E27FC236}">
+                <a16:creationId xmlns:a16="http://schemas.microsoft.com/office/drawing/2014/main" id="{37418A99-6C8D-4AF5-8F96-84A8599CEA3E}"/>
+              </a:ext>
+            </a:extLst>
+          </p:cNvPr>
+          <p:cNvSpPr>
+            <a:spLocks noGrp="1"/>
+          </p:cNvSpPr>
+          <p:nvPr>
+            <p:ph idx="1"/>
+          </p:nvPr>
+        </p:nvSpPr>
+        <p:spPr/>
+        <p:txBody>
+          <a:bodyPr/>
+          <a:lstStyle/>
+          <a:p>
+            <a:pPr algn="l"/>
+            <a:r>
+              <a:rPr lang="en-US" sz="1800" b="0" i="0" u="none" strike="noStrike" baseline="0" dirty="0">
+                <a:latin typeface="NimbusRomNo9L-Regu"/>
+              </a:rPr>
+              <a:t>C. Ding and D. Tao. Trunk-branch ensemble convolutional neural networks for video-based face recognition. </a:t>
+            </a:r>
+            <a:r>
+              <a:rPr lang="en-US" sz="1800" b="0" i="0" u="none" strike="noStrike" baseline="0" dirty="0">
+                <a:latin typeface="NimbusRomNo9L-ReguItal"/>
+              </a:rPr>
+              <a:t>IEEE Trans Pattern Anal Mach </a:t>
+            </a:r>
+            <a:r>
+              <a:rPr lang="en-US" sz="1800" b="0" i="0" u="none" strike="noStrike" baseline="0" dirty="0" err="1">
+                <a:latin typeface="NimbusRomNo9L-ReguItal"/>
+              </a:rPr>
+              <a:t>Intell</a:t>
+            </a:r>
+            <a:r>
+              <a:rPr lang="en-US" sz="1800" b="0" i="0" u="none" strike="noStrike" baseline="0" dirty="0">
+                <a:latin typeface="NimbusRomNo9L-Regu"/>
+              </a:rPr>
+              <a:t>, 40(4):1002–1014, </a:t>
+            </a:r>
+            <a:r>
+              <a:rPr lang="en-US" sz="1800" b="0" i="0" u="none" strike="noStrike" baseline="0" dirty="0" err="1">
+                <a:latin typeface="NimbusRomNo9L-Regu"/>
+              </a:rPr>
+              <a:t>apr</a:t>
+            </a:r>
+            <a:r>
+              <a:rPr lang="en-US" sz="1800" b="0" i="0" u="none" strike="noStrike" baseline="0" dirty="0">
+                <a:latin typeface="NimbusRomNo9L-Regu"/>
+              </a:rPr>
+              <a:t> 2018.</a:t>
+            </a:r>
+          </a:p>
+          <a:p>
+            <a:pPr algn="l"/>
+            <a:r>
+              <a:rPr lang="en-US" sz="1800" b="0" i="0" u="none" strike="noStrike" baseline="0" dirty="0">
+                <a:latin typeface="NimbusRomNo9L-Regu"/>
+              </a:rPr>
+              <a:t>Y. Chen, Y. Tai, X. Liu, C. Shen, and J. Yang. </a:t>
+            </a:r>
+            <a:r>
+              <a:rPr lang="en-US" sz="1800" b="0" i="0" u="none" strike="noStrike" baseline="0" dirty="0" err="1">
+                <a:latin typeface="NimbusRomNo9L-Regu"/>
+              </a:rPr>
+              <a:t>FSRNet</a:t>
+            </a:r>
+            <a:r>
+              <a:rPr lang="en-US" sz="1800" b="0" i="0" u="none" strike="noStrike" baseline="0" dirty="0">
+                <a:latin typeface="NimbusRomNo9L-Regu"/>
+              </a:rPr>
+              <a:t>: End-to-end learning face super-resolution with facial priors. In </a:t>
+            </a:r>
+            <a:r>
+              <a:rPr lang="en-US" sz="1800" b="0" i="0" u="none" strike="noStrike" baseline="0" dirty="0">
+                <a:latin typeface="NimbusRomNo9L-ReguItal"/>
+              </a:rPr>
+              <a:t>2018 IEEE Conference on Computer Vision and Pattern Recognition (CVPR)</a:t>
+            </a:r>
+            <a:r>
+              <a:rPr lang="en-US" sz="1800" b="0" i="0" u="none" strike="noStrike" baseline="0" dirty="0">
+                <a:latin typeface="NimbusRomNo9L-Regu"/>
+              </a:rPr>
+              <a:t>. IEEE, 2018.</a:t>
+            </a:r>
+          </a:p>
+          <a:p>
+            <a:pPr algn="l"/>
+            <a:r>
+              <a:rPr lang="en-US" sz="1800" b="0" i="0" u="none" strike="noStrike" baseline="0" dirty="0">
+                <a:latin typeface="NimbusRomNo9L-Regu"/>
+                <a:hlinkClick r:id="rId2"/>
+              </a:rPr>
+              <a:t>https://www.learnopencv.com/face-detection-opencv-dlib-and-deep-learning-c-python/</a:t>
+            </a:r>
+            <a:endParaRPr lang="en-US" sz="1800" b="0" i="0" u="none" strike="noStrike" baseline="0" dirty="0">
+              <a:latin typeface="NimbusRomNo9L-Regu"/>
+            </a:endParaRPr>
+          </a:p>
+          <a:p>
+            <a:pPr algn="l"/>
+            <a:r>
+              <a:rPr lang="en-US" sz="1800" b="0" i="0" u="none" strike="noStrike" baseline="0" dirty="0">
+                <a:latin typeface="NimbusRomNo9L-Regu"/>
+                <a:hlinkClick r:id="rId3"/>
+              </a:rPr>
+              <a:t>https://www.electronicscomp.com/raspberry-pi-8mp-noir-camera-module-v2-india?gclid=CjwKCAiA2O39BRBjEiwApB2Ikjhc_K3Lxq-xtrgZNZA4mhJy12pRJj8mdGWV0sX2t-iGZRdeBfWyRBoCfuAQAvD_BwE</a:t>
+            </a:r>
+            <a:endParaRPr lang="en-US" sz="1800" b="0" i="0" u="none" strike="noStrike" baseline="0" dirty="0">
+              <a:latin typeface="NimbusRomNo9L-Regu"/>
+            </a:endParaRPr>
+          </a:p>
+          <a:p>
+            <a:pPr algn="l"/>
+            <a:endParaRPr lang="en-US" sz="1800" b="0" i="0" u="none" strike="noStrike" baseline="0" dirty="0">
+              <a:latin typeface="NimbusRomNo9L-Regu"/>
+            </a:endParaRPr>
+          </a:p>
+        </p:txBody>
+      </p:sp>
+    </p:spTree>
+    <p:extLst>
+      <p:ext uri="{BB962C8B-B14F-4D97-AF65-F5344CB8AC3E}">
+        <p14:creationId xmlns:p14="http://schemas.microsoft.com/office/powerpoint/2010/main" val="2397548883"/>
+      </p:ext>
+    </p:extLst>
+  </p:cSld>
+  <p:clrMapOvr>
+    <a:masterClrMapping/>
+  </p:clrMapOvr>
+</p:sld>
+</file>
+
+<file path=ppt/slides/slide39.xml><?xml version="1.0" encoding="utf-8"?>
 <p:sld xmlns:a="http://schemas.openxmlformats.org/drawingml/2006/main" xmlns:r="http://schemas.openxmlformats.org/officeDocument/2006/relationships" xmlns:p="http://schemas.openxmlformats.org/presentationml/2006/main">
   <p:cSld>
     <p:spTree>
@@ -7099,7 +7561,7 @@
           <p:cNvPr id="2" name="Title 1">
             <a:extLst>
               <a:ext uri="{FF2B5EF4-FFF2-40B4-BE49-F238E27FC236}">
-                <a16:creationId xmlns:a16="http://schemas.microsoft.com/office/drawing/2014/main" id="{DD54632F-9F74-4508-BFBA-B6EE6BA0678E}"/>
+                <a16:creationId xmlns:a16="http://schemas.microsoft.com/office/drawing/2014/main" id="{2B357AE2-59C8-434F-8D14-8F7D1A172640}"/>
               </a:ext>
             </a:extLst>
           </p:cNvPr>
@@ -7110,56 +7572,19 @@
             <p:ph type="title"/>
           </p:nvPr>
         </p:nvSpPr>
-        <p:spPr/>
-        <p:txBody>
-          <a:bodyPr/>
-          <a:lstStyle/>
-          <a:p>
-            <a:r>
-              <a:rPr lang="en-US" dirty="0"/>
-              <a:t>Existing Recognition systems</a:t>
-            </a:r>
-          </a:p>
-        </p:txBody>
-      </p:sp>
-      <p:sp>
-        <p:nvSpPr>
-          <p:cNvPr id="3" name="Content Placeholder 2">
-            <a:extLst>
-              <a:ext uri="{FF2B5EF4-FFF2-40B4-BE49-F238E27FC236}">
-                <a16:creationId xmlns:a16="http://schemas.microsoft.com/office/drawing/2014/main" id="{81FDC898-D715-4F2E-B2BA-977FCBCBB71E}"/>
-              </a:ext>
-            </a:extLst>
-          </p:cNvPr>
-          <p:cNvSpPr>
-            <a:spLocks noGrp="1"/>
-          </p:cNvSpPr>
-          <p:nvPr>
-            <p:ph idx="1"/>
-          </p:nvPr>
-        </p:nvSpPr>
-        <p:spPr/>
-        <p:txBody>
-          <a:bodyPr/>
-          <a:lstStyle/>
-          <a:p>
-            <a:r>
-              <a:rPr lang="en-US" dirty="0"/>
-              <a:t>The systems can be broadly classified : </a:t>
-            </a:r>
-          </a:p>
-          <a:p>
-            <a:pPr lvl="1"/>
-            <a:r>
-              <a:rPr lang="en-US" dirty="0"/>
-              <a:t>Systems that uses human characteristics like fingerprint </a:t>
-            </a:r>
-          </a:p>
-          <a:p>
-            <a:pPr lvl="1"/>
-            <a:r>
-              <a:rPr lang="en-US" dirty="0"/>
-              <a:t>Systems that uses unique objects that the person carries like ID card </a:t>
+        <p:spPr>
+          <a:xfrm>
+            <a:off x="838199" y="365125"/>
+            <a:ext cx="10931013" cy="5917688"/>
+          </a:xfrm>
+        </p:spPr>
+        <p:txBody>
+          <a:bodyPr/>
+          <a:lstStyle/>
+          <a:p>
+            <a:r>
+              <a:rPr lang="en-US" dirty="0"/>
+              <a:t>Literature Survey </a:t>
             </a:r>
           </a:p>
         </p:txBody>
@@ -7167,7 +7592,7 @@
     </p:spTree>
     <p:extLst>
       <p:ext uri="{BB962C8B-B14F-4D97-AF65-F5344CB8AC3E}">
-        <p14:creationId xmlns:p14="http://schemas.microsoft.com/office/powerpoint/2010/main" val="3236920408"/>
+        <p14:creationId xmlns:p14="http://schemas.microsoft.com/office/powerpoint/2010/main" val="1926603535"/>
       </p:ext>
     </p:extLst>
   </p:cSld>
@@ -7217,42 +7642,111 @@
           <a:p>
             <a:r>
               <a:rPr lang="en-US" dirty="0"/>
+              <a:t>Existing Recognition systems</a:t>
+            </a:r>
+          </a:p>
+        </p:txBody>
+      </p:sp>
+      <p:sp>
+        <p:nvSpPr>
+          <p:cNvPr id="3" name="Content Placeholder 2">
+            <a:extLst>
+              <a:ext uri="{FF2B5EF4-FFF2-40B4-BE49-F238E27FC236}">
+                <a16:creationId xmlns:a16="http://schemas.microsoft.com/office/drawing/2014/main" id="{9EF272F5-93A5-445D-B1C4-18C2BB06A3C3}"/>
+              </a:ext>
+            </a:extLst>
+          </p:cNvPr>
+          <p:cNvSpPr>
+            <a:spLocks noGrp="1"/>
+          </p:cNvSpPr>
+          <p:nvPr>
+            <p:ph idx="1"/>
+          </p:nvPr>
+        </p:nvSpPr>
+        <p:spPr/>
+        <p:txBody>
+          <a:bodyPr>
+            <a:normAutofit/>
+          </a:bodyPr>
+          <a:lstStyle/>
+          <a:p>
+            <a:r>
+              <a:rPr lang="en-US" dirty="0"/>
               <a:t>Fingerprint based recognition system</a:t>
             </a:r>
           </a:p>
-        </p:txBody>
-      </p:sp>
-      <p:sp>
-        <p:nvSpPr>
-          <p:cNvPr id="3" name="Content Placeholder 2">
-            <a:extLst>
-              <a:ext uri="{FF2B5EF4-FFF2-40B4-BE49-F238E27FC236}">
-                <a16:creationId xmlns:a16="http://schemas.microsoft.com/office/drawing/2014/main" id="{9EF272F5-93A5-445D-B1C4-18C2BB06A3C3}"/>
-              </a:ext>
-            </a:extLst>
-          </p:cNvPr>
-          <p:cNvSpPr>
-            <a:spLocks noGrp="1"/>
-          </p:cNvSpPr>
-          <p:nvPr>
-            <p:ph idx="1"/>
-          </p:nvPr>
-        </p:nvSpPr>
-        <p:spPr/>
-        <p:txBody>
-          <a:bodyPr/>
-          <a:lstStyle/>
-          <a:p>
+          <a:p>
+            <a:pPr lvl="1"/>
             <a:r>
               <a:rPr lang="en-US" dirty="0"/>
               <a:t>Distracts the attention of students during lecture time </a:t>
             </a:r>
           </a:p>
           <a:p>
+            <a:pPr lvl="1"/>
             <a:r>
               <a:rPr lang="en-US" dirty="0"/>
               <a:t>Queuing takes place </a:t>
             </a:r>
+          </a:p>
+          <a:p>
+            <a:r>
+              <a:rPr lang="en-US" dirty="0"/>
+              <a:t>RFID based recognition</a:t>
+            </a:r>
+          </a:p>
+          <a:p>
+            <a:pPr lvl="1"/>
+            <a:r>
+              <a:rPr lang="en-US" dirty="0"/>
+              <a:t>Possibilities that Fraudulent may occur</a:t>
+            </a:r>
+          </a:p>
+          <a:p>
+            <a:pPr lvl="1"/>
+            <a:r>
+              <a:rPr lang="en-US" dirty="0"/>
+              <a:t>Cheat the system by giving proxy (for example a student misuse it by wearing another student’s ID card ) </a:t>
+            </a:r>
+          </a:p>
+          <a:p>
+            <a:r>
+              <a:rPr lang="en-US" dirty="0"/>
+              <a:t>IRIS based recognition system </a:t>
+            </a:r>
+          </a:p>
+          <a:p>
+            <a:pPr lvl="1"/>
+            <a:r>
+              <a:rPr lang="en-US" dirty="0"/>
+              <a:t>Cant use a regular camera </a:t>
+            </a:r>
+          </a:p>
+          <a:p>
+            <a:pPr lvl="1"/>
+            <a:r>
+              <a:rPr lang="en-US" dirty="0"/>
+              <a:t>Visible light must be minimized for maximum accuracy</a:t>
+            </a:r>
+          </a:p>
+          <a:p>
+            <a:pPr lvl="1"/>
+            <a:endParaRPr lang="en-US" dirty="0"/>
+          </a:p>
+          <a:p>
+            <a:pPr lvl="1"/>
+            <a:endParaRPr lang="en-US" dirty="0"/>
+          </a:p>
+          <a:p>
+            <a:endParaRPr lang="en-US" dirty="0"/>
+          </a:p>
+          <a:p>
+            <a:pPr lvl="1"/>
+            <a:endParaRPr lang="en-US" dirty="0"/>
+          </a:p>
+          <a:p>
+            <a:pPr lvl="1"/>
+            <a:endParaRPr lang="en-US" dirty="0"/>
           </a:p>
           <a:p>
             <a:endParaRPr lang="en-US" dirty="0"/>
@@ -7294,7 +7788,7 @@
           <p:cNvPr id="2" name="Title 1">
             <a:extLst>
               <a:ext uri="{FF2B5EF4-FFF2-40B4-BE49-F238E27FC236}">
-                <a16:creationId xmlns:a16="http://schemas.microsoft.com/office/drawing/2014/main" id="{243D4FE6-1920-4284-890C-F4D3CE972990}"/>
+                <a16:creationId xmlns:a16="http://schemas.microsoft.com/office/drawing/2014/main" id="{34891684-A0C7-4743-A992-FC7093E62660}"/>
               </a:ext>
             </a:extLst>
           </p:cNvPr>
@@ -7312,7 +7806,7 @@
           <a:p>
             <a:r>
               <a:rPr lang="en-US" dirty="0"/>
-              <a:t>RFID based recognition</a:t>
+              <a:t>Proposed work </a:t>
             </a:r>
           </a:p>
         </p:txBody>
@@ -7322,7 +7816,7 @@
           <p:cNvPr id="3" name="Content Placeholder 2">
             <a:extLst>
               <a:ext uri="{FF2B5EF4-FFF2-40B4-BE49-F238E27FC236}">
-                <a16:creationId xmlns:a16="http://schemas.microsoft.com/office/drawing/2014/main" id="{7C4D2BD7-81F9-4FDB-8E4A-25CFDF997547}"/>
+                <a16:creationId xmlns:a16="http://schemas.microsoft.com/office/drawing/2014/main" id="{08375C99-22A3-4E02-A0CE-3B340668EFED}"/>
               </a:ext>
             </a:extLst>
           </p:cNvPr>
@@ -7340,13 +7834,25 @@
           <a:p>
             <a:r>
               <a:rPr lang="en-US" dirty="0"/>
-              <a:t>Possibilities that 	Fraudulent may occur</a:t>
-            </a:r>
-          </a:p>
-          <a:p>
-            <a:r>
-              <a:rPr lang="en-US" dirty="0"/>
-              <a:t>Cheat the system by giving proxy (for example a student misuse it by wearing another student’s ID card ) </a:t>
+              <a:t>Attendance is monitored and marked present or absent depending upon the presence of the student inside the class at the particular time of lecture </a:t>
+            </a:r>
+          </a:p>
+          <a:p>
+            <a:r>
+              <a:rPr lang="en-US" dirty="0"/>
+              <a:t>Our solution uses a camera that takes photo of a group of students, and then uses facial recognition for marking attendance for a student</a:t>
+            </a:r>
+          </a:p>
+          <a:p>
+            <a:r>
+              <a:rPr lang="en-US" dirty="0"/>
+              <a:t>We found that facial recognition overcomes some of the problems that exist in the previously mentioned attendance systems </a:t>
+            </a:r>
+          </a:p>
+          <a:p>
+            <a:r>
+              <a:rPr lang="en-US" dirty="0"/>
+              <a:t>Our solution makes sure that there is a minimal interaction between students and the attendance monitoring system </a:t>
             </a:r>
           </a:p>
         </p:txBody>
@@ -7354,7 +7860,7 @@
     </p:spTree>
     <p:extLst>
       <p:ext uri="{BB962C8B-B14F-4D97-AF65-F5344CB8AC3E}">
-        <p14:creationId xmlns:p14="http://schemas.microsoft.com/office/powerpoint/2010/main" val="670647158"/>
+        <p14:creationId xmlns:p14="http://schemas.microsoft.com/office/powerpoint/2010/main" val="3892907736"/>
       </p:ext>
     </p:extLst>
   </p:cSld>
@@ -7386,7 +7892,7 @@
           <p:cNvPr id="2" name="Title 1">
             <a:extLst>
               <a:ext uri="{FF2B5EF4-FFF2-40B4-BE49-F238E27FC236}">
-                <a16:creationId xmlns:a16="http://schemas.microsoft.com/office/drawing/2014/main" id="{AA138FD9-CD6D-4510-B391-B248E0EC5C2D}"/>
+                <a16:creationId xmlns:a16="http://schemas.microsoft.com/office/drawing/2014/main" id="{FAECB4BF-4DC2-4DB3-8B05-BE3B10A75DED}"/>
               </a:ext>
             </a:extLst>
           </p:cNvPr>
@@ -7404,7 +7910,7 @@
           <a:p>
             <a:r>
               <a:rPr lang="en-US" dirty="0"/>
-              <a:t>IRIS based recognition system </a:t>
+              <a:t>Facial recognition </a:t>
             </a:r>
           </a:p>
         </p:txBody>
@@ -7414,7 +7920,7 @@
           <p:cNvPr id="3" name="Content Placeholder 2">
             <a:extLst>
               <a:ext uri="{FF2B5EF4-FFF2-40B4-BE49-F238E27FC236}">
-                <a16:creationId xmlns:a16="http://schemas.microsoft.com/office/drawing/2014/main" id="{719AD651-61FA-4F32-A29D-34715D5F6F77}"/>
+                <a16:creationId xmlns:a16="http://schemas.microsoft.com/office/drawing/2014/main" id="{CBB325D4-93A8-4354-B463-E34A83284DB8}"/>
               </a:ext>
             </a:extLst>
           </p:cNvPr>
@@ -7432,13 +7938,33 @@
           <a:p>
             <a:r>
               <a:rPr lang="en-US" dirty="0"/>
-              <a:t>Cant use a regular camera </a:t>
-            </a:r>
-          </a:p>
-          <a:p>
-            <a:r>
-              <a:rPr lang="en-US" dirty="0"/>
-              <a:t>Visible light must be minimized for maximum accuracy</a:t>
+              <a:t>Any facial recognition has 2 steps </a:t>
+            </a:r>
+          </a:p>
+          <a:p>
+            <a:pPr lvl="1"/>
+            <a:r>
+              <a:rPr lang="en-US" dirty="0"/>
+              <a:t>Facial detection – the process of finding a face in a given image </a:t>
+            </a:r>
+          </a:p>
+          <a:p>
+            <a:pPr lvl="1"/>
+            <a:r>
+              <a:rPr lang="en-US" dirty="0"/>
+              <a:t>Facial recognition – the process of identifying the person from the image of a face (example : face id in apple )</a:t>
+            </a:r>
+          </a:p>
+          <a:p>
+            <a:r>
+              <a:rPr lang="en-US" dirty="0"/>
+              <a:t>Every 5 minutes the camera takes the picture and facial recognition is done on the picture.</a:t>
+            </a:r>
+          </a:p>
+          <a:p>
+            <a:r>
+              <a:rPr lang="en-US" dirty="0"/>
+              <a:t>The process of facial recognition can be implemented in a separate computer as the burden on the camera system must be reduced. </a:t>
             </a:r>
           </a:p>
         </p:txBody>
@@ -7446,7 +7972,7 @@
     </p:spTree>
     <p:extLst>
       <p:ext uri="{BB962C8B-B14F-4D97-AF65-F5344CB8AC3E}">
-        <p14:creationId xmlns:p14="http://schemas.microsoft.com/office/powerpoint/2010/main" val="3973309270"/>
+        <p14:creationId xmlns:p14="http://schemas.microsoft.com/office/powerpoint/2010/main" val="725567215"/>
       </p:ext>
     </p:extLst>
   </p:cSld>
@@ -7475,10 +8001,10 @@
       </p:grpSpPr>
       <p:sp>
         <p:nvSpPr>
-          <p:cNvPr id="2" name="Title 1">
-            <a:extLst>
-              <a:ext uri="{FF2B5EF4-FFF2-40B4-BE49-F238E27FC236}">
-                <a16:creationId xmlns:a16="http://schemas.microsoft.com/office/drawing/2014/main" id="{34891684-A0C7-4743-A992-FC7093E62660}"/>
+          <p:cNvPr id="12" name="Title 11">
+            <a:extLst>
+              <a:ext uri="{FF2B5EF4-FFF2-40B4-BE49-F238E27FC236}">
+                <a16:creationId xmlns:a16="http://schemas.microsoft.com/office/drawing/2014/main" id="{0B0BF1E4-7AB7-4806-A1D7-CD319A3CCF90}"/>
               </a:ext>
             </a:extLst>
           </p:cNvPr>
@@ -7489,68 +8015,64 @@
             <p:ph type="title"/>
           </p:nvPr>
         </p:nvSpPr>
-        <p:spPr/>
-        <p:txBody>
-          <a:bodyPr/>
-          <a:lstStyle/>
-          <a:p>
-            <a:r>
-              <a:rPr lang="en-US" dirty="0"/>
-              <a:t>Proposed work </a:t>
-            </a:r>
-          </a:p>
-        </p:txBody>
-      </p:sp>
-      <p:sp>
-        <p:nvSpPr>
-          <p:cNvPr id="3" name="Content Placeholder 2">
-            <a:extLst>
-              <a:ext uri="{FF2B5EF4-FFF2-40B4-BE49-F238E27FC236}">
-                <a16:creationId xmlns:a16="http://schemas.microsoft.com/office/drawing/2014/main" id="{08375C99-22A3-4E02-A0CE-3B340668EFED}"/>
-              </a:ext>
-            </a:extLst>
-          </p:cNvPr>
-          <p:cNvSpPr>
-            <a:spLocks noGrp="1"/>
-          </p:cNvSpPr>
+        <p:spPr>
+          <a:xfrm>
+            <a:off x="838200" y="365126"/>
+            <a:ext cx="9782908" cy="577410"/>
+          </a:xfrm>
+        </p:spPr>
+        <p:txBody>
+          <a:bodyPr>
+            <a:normAutofit fontScale="90000"/>
+          </a:bodyPr>
+          <a:lstStyle/>
+          <a:p>
+            <a:r>
+              <a:rPr lang="en-US" dirty="0"/>
+              <a:t>An example of Facial recognition in class </a:t>
+            </a:r>
+          </a:p>
+        </p:txBody>
+      </p:sp>
+      <p:pic>
+        <p:nvPicPr>
+          <p:cNvPr id="11" name="Content Placeholder 10">
+            <a:extLst>
+              <a:ext uri="{FF2B5EF4-FFF2-40B4-BE49-F238E27FC236}">
+                <a16:creationId xmlns:a16="http://schemas.microsoft.com/office/drawing/2014/main" id="{DD93B6F9-4D5C-4163-9C5E-5C8C30EC7699}"/>
+              </a:ext>
+            </a:extLst>
+          </p:cNvPr>
+          <p:cNvPicPr>
+            <a:picLocks noGrp="1" noChangeAspect="1"/>
+          </p:cNvPicPr>
           <p:nvPr>
             <p:ph idx="1"/>
           </p:nvPr>
-        </p:nvSpPr>
-        <p:spPr/>
-        <p:txBody>
-          <a:bodyPr/>
-          <a:lstStyle/>
-          <a:p>
-            <a:r>
-              <a:rPr lang="en-US" dirty="0"/>
-              <a:t>Attendance is monitored and marked present or absent depending upon the presence of the student inside the class at the particular time of lecture </a:t>
-            </a:r>
-          </a:p>
-          <a:p>
-            <a:r>
-              <a:rPr lang="en-US" dirty="0"/>
-              <a:t>Our solution uses a camera that takes photo of a group of students, and then uses facial recognition for marking attendance for a student</a:t>
-            </a:r>
-          </a:p>
-          <a:p>
-            <a:r>
-              <a:rPr lang="en-US" dirty="0"/>
-              <a:t>We found that facial recognition overcomes some of the problems that exist in the previously mentioned attendance systems </a:t>
-            </a:r>
-          </a:p>
-          <a:p>
-            <a:r>
-              <a:rPr lang="en-US" dirty="0"/>
-              <a:t>Our solution makes sure that there is a minimal interaction between students and the attendance monitoring system </a:t>
-            </a:r>
-          </a:p>
-        </p:txBody>
-      </p:sp>
+        </p:nvPicPr>
+        <p:blipFill>
+          <a:blip r:embed="rId2">
+            <a:extLst>
+              <a:ext uri="{28A0092B-C50C-407E-A947-70E740481C1C}">
+                <a14:useLocalDpi xmlns:a14="http://schemas.microsoft.com/office/drawing/2010/main" val="0"/>
+              </a:ext>
+            </a:extLst>
+          </a:blip>
+          <a:stretch>
+            <a:fillRect/>
+          </a:stretch>
+        </p:blipFill>
+        <p:spPr>
+          <a:xfrm>
+            <a:off x="1118953" y="1365455"/>
+            <a:ext cx="9954094" cy="4618594"/>
+          </a:xfrm>
+        </p:spPr>
+      </p:pic>
     </p:spTree>
     <p:extLst>
       <p:ext uri="{BB962C8B-B14F-4D97-AF65-F5344CB8AC3E}">
-        <p14:creationId xmlns:p14="http://schemas.microsoft.com/office/powerpoint/2010/main" val="3892907736"/>
+        <p14:creationId xmlns:p14="http://schemas.microsoft.com/office/powerpoint/2010/main" val="130157418"/>
       </p:ext>
     </p:extLst>
   </p:cSld>
@@ -7582,7 +8104,7 @@
           <p:cNvPr id="2" name="Title 1">
             <a:extLst>
               <a:ext uri="{FF2B5EF4-FFF2-40B4-BE49-F238E27FC236}">
-                <a16:creationId xmlns:a16="http://schemas.microsoft.com/office/drawing/2014/main" id="{FAECB4BF-4DC2-4DB3-8B05-BE3B10A75DED}"/>
+                <a16:creationId xmlns:a16="http://schemas.microsoft.com/office/drawing/2014/main" id="{7BC803E6-8F1F-45A2-A4AD-C711B834E5DF}"/>
               </a:ext>
             </a:extLst>
           </p:cNvPr>
@@ -7593,62 +8115,21 @@
             <p:ph type="title"/>
           </p:nvPr>
         </p:nvSpPr>
-        <p:spPr/>
-        <p:txBody>
-          <a:bodyPr/>
-          <a:lstStyle/>
-          <a:p>
-            <a:r>
-              <a:rPr lang="en-US" dirty="0"/>
-              <a:t>Facial recognition </a:t>
-            </a:r>
-          </a:p>
-        </p:txBody>
-      </p:sp>
-      <p:sp>
-        <p:nvSpPr>
-          <p:cNvPr id="3" name="Content Placeholder 2">
-            <a:extLst>
-              <a:ext uri="{FF2B5EF4-FFF2-40B4-BE49-F238E27FC236}">
-                <a16:creationId xmlns:a16="http://schemas.microsoft.com/office/drawing/2014/main" id="{CBB325D4-93A8-4354-B463-E34A83284DB8}"/>
-              </a:ext>
-            </a:extLst>
-          </p:cNvPr>
-          <p:cNvSpPr>
-            <a:spLocks noGrp="1"/>
-          </p:cNvSpPr>
-          <p:nvPr>
-            <p:ph idx="1"/>
-          </p:nvPr>
-        </p:nvSpPr>
-        <p:spPr/>
-        <p:txBody>
-          <a:bodyPr/>
-          <a:lstStyle/>
-          <a:p>
-            <a:r>
-              <a:rPr lang="en-US" dirty="0"/>
-              <a:t>Any facial recognition has 2 steps </a:t>
-            </a:r>
-          </a:p>
-          <a:p>
-            <a:pPr lvl="1"/>
-            <a:r>
-              <a:rPr lang="en-US" dirty="0"/>
-              <a:t>Facial detection – the process of finding a face in a given image </a:t>
-            </a:r>
-          </a:p>
-          <a:p>
-            <a:pPr lvl="1"/>
-            <a:r>
-              <a:rPr lang="en-US" dirty="0"/>
-              <a:t>Facial recognition – the process of identifying the person from the image of a face (example : face id in apple )</a:t>
-            </a:r>
-          </a:p>
-          <a:p>
-            <a:r>
-              <a:rPr lang="en-US" dirty="0"/>
-              <a:t>The process of facial recognition occurs in a separate computer as the burden on the camera system must be reduced </a:t>
+        <p:spPr>
+          <a:xfrm>
+            <a:off x="838199" y="365125"/>
+            <a:ext cx="10976429" cy="5963104"/>
+          </a:xfrm>
+        </p:spPr>
+        <p:txBody>
+          <a:bodyPr>
+            <a:noAutofit/>
+          </a:bodyPr>
+          <a:lstStyle/>
+          <a:p>
+            <a:r>
+              <a:rPr lang="en-US" sz="10000" dirty="0"/>
+              <a:t>Sub Systems</a:t>
             </a:r>
           </a:p>
         </p:txBody>
@@ -7656,7 +8137,7 @@
     </p:spTree>
     <p:extLst>
       <p:ext uri="{BB962C8B-B14F-4D97-AF65-F5344CB8AC3E}">
-        <p14:creationId xmlns:p14="http://schemas.microsoft.com/office/powerpoint/2010/main" val="725567215"/>
+        <p14:creationId xmlns:p14="http://schemas.microsoft.com/office/powerpoint/2010/main" val="4012447857"/>
       </p:ext>
     </p:extLst>
   </p:cSld>

</xml_diff>